<commit_message>
feat: userController siginUp test
</commit_message>
<xml_diff>
--- a/DB 설계.pptx
+++ b/DB 설계.pptx
@@ -261,7 +261,7 @@
           <a:p>
             <a:fld id="{7D8F4FFF-DD39-4147-9444-0392D5B07285}" type="datetimeFigureOut">
               <a:rPr kumimoji="1" lang="ko-Kore-KR" altLang="en-US" smtClean="0"/>
-              <a:t>2022. 7. 13.</a:t>
+              <a:t>2022. 7. 25.</a:t>
             </a:fld>
             <a:endParaRPr kumimoji="1" lang="ko-Kore-KR" altLang="en-US"/>
           </a:p>
@@ -461,7 +461,7 @@
           <a:p>
             <a:fld id="{7D8F4FFF-DD39-4147-9444-0392D5B07285}" type="datetimeFigureOut">
               <a:rPr kumimoji="1" lang="ko-Kore-KR" altLang="en-US" smtClean="0"/>
-              <a:t>2022. 7. 13.</a:t>
+              <a:t>2022. 7. 25.</a:t>
             </a:fld>
             <a:endParaRPr kumimoji="1" lang="ko-Kore-KR" altLang="en-US"/>
           </a:p>
@@ -671,7 +671,7 @@
           <a:p>
             <a:fld id="{7D8F4FFF-DD39-4147-9444-0392D5B07285}" type="datetimeFigureOut">
               <a:rPr kumimoji="1" lang="ko-Kore-KR" altLang="en-US" smtClean="0"/>
-              <a:t>2022. 7. 13.</a:t>
+              <a:t>2022. 7. 25.</a:t>
             </a:fld>
             <a:endParaRPr kumimoji="1" lang="ko-Kore-KR" altLang="en-US"/>
           </a:p>
@@ -871,7 +871,7 @@
           <a:p>
             <a:fld id="{7D8F4FFF-DD39-4147-9444-0392D5B07285}" type="datetimeFigureOut">
               <a:rPr kumimoji="1" lang="ko-Kore-KR" altLang="en-US" smtClean="0"/>
-              <a:t>2022. 7. 13.</a:t>
+              <a:t>2022. 7. 25.</a:t>
             </a:fld>
             <a:endParaRPr kumimoji="1" lang="ko-Kore-KR" altLang="en-US"/>
           </a:p>
@@ -1147,7 +1147,7 @@
           <a:p>
             <a:fld id="{7D8F4FFF-DD39-4147-9444-0392D5B07285}" type="datetimeFigureOut">
               <a:rPr kumimoji="1" lang="ko-Kore-KR" altLang="en-US" smtClean="0"/>
-              <a:t>2022. 7. 13.</a:t>
+              <a:t>2022. 7. 25.</a:t>
             </a:fld>
             <a:endParaRPr kumimoji="1" lang="ko-Kore-KR" altLang="en-US"/>
           </a:p>
@@ -1415,7 +1415,7 @@
           <a:p>
             <a:fld id="{7D8F4FFF-DD39-4147-9444-0392D5B07285}" type="datetimeFigureOut">
               <a:rPr kumimoji="1" lang="ko-Kore-KR" altLang="en-US" smtClean="0"/>
-              <a:t>2022. 7. 13.</a:t>
+              <a:t>2022. 7. 25.</a:t>
             </a:fld>
             <a:endParaRPr kumimoji="1" lang="ko-Kore-KR" altLang="en-US"/>
           </a:p>
@@ -1830,7 +1830,7 @@
           <a:p>
             <a:fld id="{7D8F4FFF-DD39-4147-9444-0392D5B07285}" type="datetimeFigureOut">
               <a:rPr kumimoji="1" lang="ko-Kore-KR" altLang="en-US" smtClean="0"/>
-              <a:t>2022. 7. 13.</a:t>
+              <a:t>2022. 7. 25.</a:t>
             </a:fld>
             <a:endParaRPr kumimoji="1" lang="ko-Kore-KR" altLang="en-US"/>
           </a:p>
@@ -1972,7 +1972,7 @@
           <a:p>
             <a:fld id="{7D8F4FFF-DD39-4147-9444-0392D5B07285}" type="datetimeFigureOut">
               <a:rPr kumimoji="1" lang="ko-Kore-KR" altLang="en-US" smtClean="0"/>
-              <a:t>2022. 7. 13.</a:t>
+              <a:t>2022. 7. 25.</a:t>
             </a:fld>
             <a:endParaRPr kumimoji="1" lang="ko-Kore-KR" altLang="en-US"/>
           </a:p>
@@ -2085,7 +2085,7 @@
           <a:p>
             <a:fld id="{7D8F4FFF-DD39-4147-9444-0392D5B07285}" type="datetimeFigureOut">
               <a:rPr kumimoji="1" lang="ko-Kore-KR" altLang="en-US" smtClean="0"/>
-              <a:t>2022. 7. 13.</a:t>
+              <a:t>2022. 7. 25.</a:t>
             </a:fld>
             <a:endParaRPr kumimoji="1" lang="ko-Kore-KR" altLang="en-US"/>
           </a:p>
@@ -2398,7 +2398,7 @@
           <a:p>
             <a:fld id="{7D8F4FFF-DD39-4147-9444-0392D5B07285}" type="datetimeFigureOut">
               <a:rPr kumimoji="1" lang="ko-Kore-KR" altLang="en-US" smtClean="0"/>
-              <a:t>2022. 7. 13.</a:t>
+              <a:t>2022. 7. 25.</a:t>
             </a:fld>
             <a:endParaRPr kumimoji="1" lang="ko-Kore-KR" altLang="en-US"/>
           </a:p>
@@ -2687,7 +2687,7 @@
           <a:p>
             <a:fld id="{7D8F4FFF-DD39-4147-9444-0392D5B07285}" type="datetimeFigureOut">
               <a:rPr kumimoji="1" lang="ko-Kore-KR" altLang="en-US" smtClean="0"/>
-              <a:t>2022. 7. 13.</a:t>
+              <a:t>2022. 7. 25.</a:t>
             </a:fld>
             <a:endParaRPr kumimoji="1" lang="ko-Kore-KR" altLang="en-US"/>
           </a:p>
@@ -2930,7 +2930,7 @@
           <a:p>
             <a:fld id="{7D8F4FFF-DD39-4147-9444-0392D5B07285}" type="datetimeFigureOut">
               <a:rPr kumimoji="1" lang="ko-Kore-KR" altLang="en-US" smtClean="0"/>
-              <a:t>2022. 7. 13.</a:t>
+              <a:t>2022. 7. 25.</a:t>
             </a:fld>
             <a:endParaRPr kumimoji="1" lang="ko-Kore-KR" altLang="en-US"/>
           </a:p>
@@ -3362,14 +3362,14 @@
           <p:nvPr>
             <p:extLst>
               <p:ext uri="{D42A27DB-BD31-4B8C-83A1-F6EECF244321}">
-                <p14:modId xmlns:p14="http://schemas.microsoft.com/office/powerpoint/2010/main" val="1789673308"/>
+                <p14:modId xmlns:p14="http://schemas.microsoft.com/office/powerpoint/2010/main" val="2228370597"/>
               </p:ext>
             </p:extLst>
           </p:nvPr>
         </p:nvGraphicFramePr>
         <p:xfrm>
-          <a:off x="2354637" y="97407"/>
-          <a:ext cx="2551581" cy="3386670"/>
+          <a:off x="1786089" y="90395"/>
+          <a:ext cx="2551581" cy="3048003"/>
         </p:xfrm>
         <a:graphic>
           <a:graphicData uri="http://schemas.openxmlformats.org/drawingml/2006/table">
@@ -3517,12 +3517,12 @@
                     <a:p>
                       <a:pPr algn="ctr"/>
                       <a:r>
-                        <a:rPr lang="en-US" altLang="ko-Kore-KR" sz="1100" dirty="0" err="1">
+                        <a:rPr lang="en-US" altLang="ko-Kore-KR" sz="1100" dirty="0">
                           <a:solidFill>
                             <a:srgbClr val="FF0000"/>
                           </a:solidFill>
                         </a:rPr>
-                        <a:t>user_id</a:t>
+                        <a:t>id</a:t>
                       </a:r>
                       <a:endParaRPr lang="ko-Kore-KR" altLang="en-US" sz="1100" dirty="0">
                         <a:solidFill>
@@ -3775,81 +3775,73 @@
                     <a:p>
                       <a:pPr algn="ctr"/>
                       <a:r>
+                        <a:rPr lang="en-US" altLang="ko-Kore-KR" sz="1100" dirty="0" err="1">
+                          <a:solidFill>
+                            <a:schemeClr val="tx1"/>
+                          </a:solidFill>
+                        </a:rPr>
+                        <a:t>AccountType</a:t>
+                      </a:r>
+                      <a:endParaRPr lang="ko-Kore-KR" altLang="en-US" sz="1100" dirty="0">
+                        <a:solidFill>
+                          <a:schemeClr val="tx1"/>
+                        </a:solidFill>
+                      </a:endParaRPr>
+                    </a:p>
+                  </a:txBody>
+                  <a:tcPr anchor="ctr">
+                    <a:lnL w="12700" cap="flat" cmpd="sng" algn="ctr">
+                      <a:solidFill>
+                        <a:schemeClr val="tx1"/>
+                      </a:solidFill>
+                      <a:prstDash val="solid"/>
+                      <a:round/>
+                      <a:headEnd type="none" w="med" len="med"/>
+                      <a:tailEnd type="none" w="med" len="med"/>
+                    </a:lnL>
+                    <a:lnR w="12700" cap="flat" cmpd="sng" algn="ctr">
+                      <a:solidFill>
+                        <a:schemeClr val="tx1"/>
+                      </a:solidFill>
+                      <a:prstDash val="solid"/>
+                      <a:round/>
+                      <a:headEnd type="none" w="med" len="med"/>
+                      <a:tailEnd type="none" w="med" len="med"/>
+                    </a:lnR>
+                    <a:lnT w="12700" cap="flat" cmpd="sng" algn="ctr">
+                      <a:solidFill>
+                        <a:schemeClr val="tx1"/>
+                      </a:solidFill>
+                      <a:prstDash val="solid"/>
+                      <a:round/>
+                      <a:headEnd type="none" w="med" len="med"/>
+                      <a:tailEnd type="none" w="med" len="med"/>
+                    </a:lnT>
+                    <a:lnB w="12700" cap="flat" cmpd="sng" algn="ctr">
+                      <a:solidFill>
+                        <a:schemeClr val="tx1"/>
+                      </a:solidFill>
+                      <a:prstDash val="solid"/>
+                      <a:round/>
+                      <a:headEnd type="none" w="med" len="med"/>
+                      <a:tailEnd type="none" w="med" len="med"/>
+                    </a:lnB>
+                    <a:noFill/>
+                  </a:tcPr>
+                </a:tc>
+                <a:tc>
+                  <a:txBody>
+                    <a:bodyPr/>
+                    <a:lstStyle/>
+                    <a:p>
+                      <a:pPr algn="ctr"/>
+                      <a:r>
                         <a:rPr lang="en-US" altLang="ko-Kore-KR" sz="1100" dirty="0">
                           <a:solidFill>
                             <a:schemeClr val="tx1"/>
                           </a:solidFill>
                         </a:rPr>
-                        <a:t>password</a:t>
-                      </a:r>
-                      <a:endParaRPr lang="ko-Kore-KR" altLang="en-US" sz="1100" dirty="0">
-                        <a:solidFill>
-                          <a:schemeClr val="tx1"/>
-                        </a:solidFill>
-                      </a:endParaRPr>
-                    </a:p>
-                  </a:txBody>
-                  <a:tcPr anchor="ctr">
-                    <a:lnL w="12700" cap="flat" cmpd="sng" algn="ctr">
-                      <a:solidFill>
-                        <a:schemeClr val="tx1"/>
-                      </a:solidFill>
-                      <a:prstDash val="solid"/>
-                      <a:round/>
-                      <a:headEnd type="none" w="med" len="med"/>
-                      <a:tailEnd type="none" w="med" len="med"/>
-                    </a:lnL>
-                    <a:lnR w="12700" cap="flat" cmpd="sng" algn="ctr">
-                      <a:solidFill>
-                        <a:schemeClr val="tx1"/>
-                      </a:solidFill>
-                      <a:prstDash val="solid"/>
-                      <a:round/>
-                      <a:headEnd type="none" w="med" len="med"/>
-                      <a:tailEnd type="none" w="med" len="med"/>
-                    </a:lnR>
-                    <a:lnT w="12700" cap="flat" cmpd="sng" algn="ctr">
-                      <a:solidFill>
-                        <a:schemeClr val="tx1"/>
-                      </a:solidFill>
-                      <a:prstDash val="solid"/>
-                      <a:round/>
-                      <a:headEnd type="none" w="med" len="med"/>
-                      <a:tailEnd type="none" w="med" len="med"/>
-                    </a:lnT>
-                    <a:lnB w="12700" cap="flat" cmpd="sng" algn="ctr">
-                      <a:solidFill>
-                        <a:schemeClr val="tx1"/>
-                      </a:solidFill>
-                      <a:prstDash val="solid"/>
-                      <a:round/>
-                      <a:headEnd type="none" w="med" len="med"/>
-                      <a:tailEnd type="none" w="med" len="med"/>
-                    </a:lnB>
-                    <a:noFill/>
-                  </a:tcPr>
-                </a:tc>
-                <a:tc>
-                  <a:txBody>
-                    <a:bodyPr/>
-                    <a:lstStyle/>
-                    <a:p>
-                      <a:pPr algn="ctr"/>
-                      <a:r>
-                        <a:rPr lang="en-US" altLang="ko-Kore-KR" sz="1100" dirty="0">
-                          <a:solidFill>
-                            <a:schemeClr val="tx1"/>
-                          </a:solidFill>
-                        </a:rPr>
-                        <a:t>String(</a:t>
-                      </a:r>
-                      <a:r>
-                        <a:rPr lang="ko-KR" altLang="en-US" sz="1100" dirty="0">
-                          <a:solidFill>
-                            <a:schemeClr val="tx1"/>
-                          </a:solidFill>
-                        </a:rPr>
-                        <a:t>암호화</a:t>
+                        <a:t>String(Enum</a:t>
                       </a:r>
                       <a:r>
                         <a:rPr lang="en-US" altLang="ko-KR" sz="1100" dirty="0">
@@ -4436,16 +4428,16 @@
                     <a:p>
                       <a:pPr algn="ctr"/>
                       <a:r>
-                        <a:rPr lang="en-US" altLang="ko-Kore-KR" sz="1100" dirty="0" err="1">
+                        <a:rPr lang="en-US" altLang="ko-Kore-KR" sz="1100" dirty="0">
                           <a:solidFill>
-                            <a:srgbClr val="0070C0"/>
+                            <a:schemeClr val="tx1"/>
                           </a:solidFill>
                         </a:rPr>
-                        <a:t>student_detail_id</a:t>
+                        <a:t>DTYPE</a:t>
                       </a:r>
                       <a:endParaRPr lang="ko-Kore-KR" altLang="en-US" sz="1100" dirty="0">
                         <a:solidFill>
-                          <a:srgbClr val="0070C0"/>
+                          <a:schemeClr val="tx1"/>
                         </a:solidFill>
                       </a:endParaRPr>
                     </a:p>
@@ -4496,17 +4488,9 @@
                     <a:lstStyle/>
                     <a:p>
                       <a:pPr algn="ctr"/>
-                      <a:r>
-                        <a:rPr lang="en-US" altLang="ko-Kore-KR" sz="1100" dirty="0">
-                          <a:solidFill>
-                            <a:srgbClr val="0070C0"/>
-                          </a:solidFill>
-                        </a:rPr>
-                        <a:t>Long(FK)</a:t>
-                      </a:r>
                       <a:endParaRPr lang="ko-Kore-KR" altLang="en-US" sz="1100" dirty="0">
                         <a:solidFill>
-                          <a:srgbClr val="0070C0"/>
+                          <a:schemeClr val="tx1"/>
                         </a:solidFill>
                       </a:endParaRPr>
                     </a:p>
@@ -4553,136 +4537,7 @@
                 </a:tc>
                 <a:extLst>
                   <a:ext uri="{0D108BD9-81ED-4DB2-BD59-A6C34878D82A}">
-                    <a16:rowId xmlns:a16="http://schemas.microsoft.com/office/drawing/2014/main" val="4243327915"/>
-                  </a:ext>
-                </a:extLst>
-              </a:tr>
-              <a:tr h="338667">
-                <a:tc>
-                  <a:txBody>
-                    <a:bodyPr/>
-                    <a:lstStyle/>
-                    <a:p>
-                      <a:pPr algn="ctr"/>
-                      <a:r>
-                        <a:rPr lang="en-US" altLang="ko-Kore-KR" sz="1100" dirty="0" err="1">
-                          <a:solidFill>
-                            <a:srgbClr val="0070C0"/>
-                          </a:solidFill>
-                        </a:rPr>
-                        <a:t>storemanager_detail_id</a:t>
-                      </a:r>
-                      <a:endParaRPr lang="ko-Kore-KR" altLang="en-US" sz="1100" dirty="0">
-                        <a:solidFill>
-                          <a:srgbClr val="0070C0"/>
-                        </a:solidFill>
-                      </a:endParaRPr>
-                    </a:p>
-                  </a:txBody>
-                  <a:tcPr anchor="ctr">
-                    <a:lnL w="12700" cap="flat" cmpd="sng" algn="ctr">
-                      <a:solidFill>
-                        <a:schemeClr val="tx1"/>
-                      </a:solidFill>
-                      <a:prstDash val="solid"/>
-                      <a:round/>
-                      <a:headEnd type="none" w="med" len="med"/>
-                      <a:tailEnd type="none" w="med" len="med"/>
-                    </a:lnL>
-                    <a:lnR w="12700" cap="flat" cmpd="sng" algn="ctr">
-                      <a:solidFill>
-                        <a:schemeClr val="tx1"/>
-                      </a:solidFill>
-                      <a:prstDash val="solid"/>
-                      <a:round/>
-                      <a:headEnd type="none" w="med" len="med"/>
-                      <a:tailEnd type="none" w="med" len="med"/>
-                    </a:lnR>
-                    <a:lnT w="12700" cap="flat" cmpd="sng" algn="ctr">
-                      <a:solidFill>
-                        <a:schemeClr val="tx1"/>
-                      </a:solidFill>
-                      <a:prstDash val="solid"/>
-                      <a:round/>
-                      <a:headEnd type="none" w="med" len="med"/>
-                      <a:tailEnd type="none" w="med" len="med"/>
-                    </a:lnT>
-                    <a:lnB w="12700" cap="flat" cmpd="sng" algn="ctr">
-                      <a:solidFill>
-                        <a:schemeClr val="tx1"/>
-                      </a:solidFill>
-                      <a:prstDash val="solid"/>
-                      <a:round/>
-                      <a:headEnd type="none" w="med" len="med"/>
-                      <a:tailEnd type="none" w="med" len="med"/>
-                    </a:lnB>
-                    <a:noFill/>
-                  </a:tcPr>
-                </a:tc>
-                <a:tc>
-                  <a:txBody>
-                    <a:bodyPr/>
-                    <a:lstStyle/>
-                    <a:p>
-                      <a:pPr algn="ctr"/>
-                      <a:r>
-                        <a:rPr lang="en-US" altLang="ko-Kore-KR" sz="1100" dirty="0">
-                          <a:solidFill>
-                            <a:srgbClr val="0070C0"/>
-                          </a:solidFill>
-                        </a:rPr>
-                        <a:t>Long(FK)</a:t>
-                      </a:r>
-                      <a:endParaRPr lang="ko-Kore-KR" altLang="en-US" sz="1100" dirty="0">
-                        <a:solidFill>
-                          <a:srgbClr val="0070C0"/>
-                        </a:solidFill>
-                      </a:endParaRPr>
-                    </a:p>
-                  </a:txBody>
-                  <a:tcPr anchor="ctr">
-                    <a:lnL w="12700" cap="flat" cmpd="sng" algn="ctr">
-                      <a:solidFill>
-                        <a:schemeClr val="tx1"/>
-                      </a:solidFill>
-                      <a:prstDash val="solid"/>
-                      <a:round/>
-                      <a:headEnd type="none" w="med" len="med"/>
-                      <a:tailEnd type="none" w="med" len="med"/>
-                    </a:lnL>
-                    <a:lnR w="12700" cap="flat" cmpd="sng" algn="ctr">
-                      <a:solidFill>
-                        <a:schemeClr val="tx1"/>
-                      </a:solidFill>
-                      <a:prstDash val="solid"/>
-                      <a:round/>
-                      <a:headEnd type="none" w="med" len="med"/>
-                      <a:tailEnd type="none" w="med" len="med"/>
-                    </a:lnR>
-                    <a:lnT w="12700" cap="flat" cmpd="sng" algn="ctr">
-                      <a:solidFill>
-                        <a:schemeClr val="tx1"/>
-                      </a:solidFill>
-                      <a:prstDash val="solid"/>
-                      <a:round/>
-                      <a:headEnd type="none" w="med" len="med"/>
-                      <a:tailEnd type="none" w="med" len="med"/>
-                    </a:lnT>
-                    <a:lnB w="12700" cap="flat" cmpd="sng" algn="ctr">
-                      <a:solidFill>
-                        <a:schemeClr val="tx1"/>
-                      </a:solidFill>
-                      <a:prstDash val="solid"/>
-                      <a:round/>
-                      <a:headEnd type="none" w="med" len="med"/>
-                      <a:tailEnd type="none" w="med" len="med"/>
-                    </a:lnB>
-                    <a:noFill/>
-                  </a:tcPr>
-                </a:tc>
-                <a:extLst>
-                  <a:ext uri="{0D108BD9-81ED-4DB2-BD59-A6C34878D82A}">
-                    <a16:rowId xmlns:a16="http://schemas.microsoft.com/office/drawing/2014/main" val="187920199"/>
+                    <a16:rowId xmlns:a16="http://schemas.microsoft.com/office/drawing/2014/main" val="3944026553"/>
                   </a:ext>
                 </a:extLst>
               </a:tr>
@@ -4705,14 +4560,14 @@
           <p:nvPr>
             <p:extLst>
               <p:ext uri="{D42A27DB-BD31-4B8C-83A1-F6EECF244321}">
-                <p14:modId xmlns:p14="http://schemas.microsoft.com/office/powerpoint/2010/main" val="2131104201"/>
+                <p14:modId xmlns:p14="http://schemas.microsoft.com/office/powerpoint/2010/main" val="4207668973"/>
               </p:ext>
             </p:extLst>
           </p:nvPr>
         </p:nvGraphicFramePr>
         <p:xfrm>
-          <a:off x="86846" y="97407"/>
-          <a:ext cx="1589554" cy="2032002"/>
+          <a:off x="43654" y="91440"/>
+          <a:ext cx="1666641" cy="777240"/>
         </p:xfrm>
         <a:graphic>
           <a:graphicData uri="http://schemas.openxmlformats.org/drawingml/2006/table">
@@ -4721,14 +4576,14 @@
                 <a:tableStyleId>{5C22544A-7EE6-4342-B048-85BDC9FD1C3A}</a:tableStyleId>
               </a:tblPr>
               <a:tblGrid>
-                <a:gridCol w="733984">
+                <a:gridCol w="769579">
                   <a:extLst>
                     <a:ext uri="{9D8B030D-6E8A-4147-A177-3AD203B41FA5}">
                       <a16:colId xmlns:a16="http://schemas.microsoft.com/office/drawing/2014/main" val="3110379304"/>
                     </a:ext>
                   </a:extLst>
                 </a:gridCol>
-                <a:gridCol w="855570">
+                <a:gridCol w="897062">
                   <a:extLst>
                     <a:ext uri="{9D8B030D-6E8A-4147-A177-3AD203B41FA5}">
                       <a16:colId xmlns:a16="http://schemas.microsoft.com/office/drawing/2014/main" val="844731228"/>
@@ -4736,7 +4591,7 @@
                   </a:extLst>
                 </a:gridCol>
               </a:tblGrid>
-              <a:tr h="338667">
+              <a:tr h="248316">
                 <a:tc gridSpan="2">
                   <a:txBody>
                     <a:bodyPr/>
@@ -4744,12 +4599,12 @@
                     <a:p>
                       <a:pPr algn="ctr"/>
                       <a:r>
-                        <a:rPr lang="en-US" altLang="ko-Kore-KR" sz="1100" dirty="0">
+                        <a:rPr lang="en-US" altLang="ko-Kore-KR" sz="1100" dirty="0" err="1">
                           <a:solidFill>
                             <a:schemeClr val="tx1"/>
                           </a:solidFill>
                         </a:rPr>
-                        <a:t>OAuth</a:t>
+                        <a:t>kakao</a:t>
                       </a:r>
                       <a:endParaRPr lang="ko-Kore-KR" altLang="en-US" sz="1100" dirty="0">
                         <a:solidFill>
@@ -4852,7 +4707,7 @@
                   </a:ext>
                 </a:extLst>
               </a:tr>
-              <a:tr h="338667">
+              <a:tr h="248316">
                 <a:tc>
                   <a:txBody>
                     <a:bodyPr/>
@@ -4860,12 +4715,12 @@
                     <a:p>
                       <a:pPr algn="ctr"/>
                       <a:r>
-                        <a:rPr lang="en-US" altLang="ko-Kore-KR" sz="1100" dirty="0" err="1">
+                        <a:rPr lang="en-US" altLang="ko-Kore-KR" sz="1100" dirty="0">
                           <a:solidFill>
                             <a:srgbClr val="FF0000"/>
                           </a:solidFill>
                         </a:rPr>
-                        <a:t>oAuth_id</a:t>
+                        <a:t>id</a:t>
                       </a:r>
                       <a:endParaRPr lang="ko-Kore-KR" altLang="en-US" sz="1100" dirty="0">
                         <a:solidFill>
@@ -4926,7 +4781,7 @@
                             <a:srgbClr val="FF0000"/>
                           </a:solidFill>
                         </a:rPr>
-                        <a:t>Long(PK)</a:t>
+                        <a:t>Long(PK, FK)</a:t>
                       </a:r>
                       <a:endParaRPr lang="ko-Kore-KR" altLang="en-US" sz="1100" dirty="0">
                         <a:solidFill>
@@ -4981,7 +4836,7 @@
                   </a:ext>
                 </a:extLst>
               </a:tr>
-              <a:tr h="338667">
+              <a:tr h="248316">
                 <a:tc>
                   <a:txBody>
                     <a:bodyPr/>
@@ -4994,7 +4849,7 @@
                             <a:schemeClr val="tx1"/>
                           </a:solidFill>
                         </a:rPr>
-                        <a:t>kakao</a:t>
+                        <a:t>kakao_id</a:t>
                       </a:r>
                       <a:endParaRPr lang="ko-Kore-KR" altLang="en-US" sz="1100" dirty="0">
                         <a:solidFill>
@@ -5107,393 +4962,6 @@
                 <a:extLst>
                   <a:ext uri="{0D108BD9-81ED-4DB2-BD59-A6C34878D82A}">
                     <a16:rowId xmlns:a16="http://schemas.microsoft.com/office/drawing/2014/main" val="2811254085"/>
-                  </a:ext>
-                </a:extLst>
-              </a:tr>
-              <a:tr h="338667">
-                <a:tc>
-                  <a:txBody>
-                    <a:bodyPr/>
-                    <a:lstStyle/>
-                    <a:p>
-                      <a:pPr algn="ctr"/>
-                      <a:r>
-                        <a:rPr lang="en-US" altLang="ko-Kore-KR" sz="1100" dirty="0" err="1">
-                          <a:solidFill>
-                            <a:schemeClr val="tx1"/>
-                          </a:solidFill>
-                        </a:rPr>
-                        <a:t>naver</a:t>
-                      </a:r>
-                      <a:endParaRPr lang="ko-Kore-KR" altLang="en-US" sz="1100" dirty="0">
-                        <a:solidFill>
-                          <a:schemeClr val="tx1"/>
-                        </a:solidFill>
-                      </a:endParaRPr>
-                    </a:p>
-                  </a:txBody>
-                  <a:tcPr anchor="ctr">
-                    <a:lnL w="12700" cap="flat" cmpd="sng" algn="ctr">
-                      <a:solidFill>
-                        <a:schemeClr val="tx1"/>
-                      </a:solidFill>
-                      <a:prstDash val="solid"/>
-                      <a:round/>
-                      <a:headEnd type="none" w="med" len="med"/>
-                      <a:tailEnd type="none" w="med" len="med"/>
-                    </a:lnL>
-                    <a:lnR w="12700" cap="flat" cmpd="sng" algn="ctr">
-                      <a:solidFill>
-                        <a:schemeClr val="tx1"/>
-                      </a:solidFill>
-                      <a:prstDash val="solid"/>
-                      <a:round/>
-                      <a:headEnd type="none" w="med" len="med"/>
-                      <a:tailEnd type="none" w="med" len="med"/>
-                    </a:lnR>
-                    <a:lnT w="12700" cap="flat" cmpd="sng" algn="ctr">
-                      <a:solidFill>
-                        <a:schemeClr val="tx1"/>
-                      </a:solidFill>
-                      <a:prstDash val="solid"/>
-                      <a:round/>
-                      <a:headEnd type="none" w="med" len="med"/>
-                      <a:tailEnd type="none" w="med" len="med"/>
-                    </a:lnT>
-                    <a:lnB w="12700" cap="flat" cmpd="sng" algn="ctr">
-                      <a:solidFill>
-                        <a:schemeClr val="tx1"/>
-                      </a:solidFill>
-                      <a:prstDash val="solid"/>
-                      <a:round/>
-                      <a:headEnd type="none" w="med" len="med"/>
-                      <a:tailEnd type="none" w="med" len="med"/>
-                    </a:lnB>
-                    <a:noFill/>
-                  </a:tcPr>
-                </a:tc>
-                <a:tc>
-                  <a:txBody>
-                    <a:bodyPr/>
-                    <a:lstStyle/>
-                    <a:p>
-                      <a:pPr algn="ctr"/>
-                      <a:r>
-                        <a:rPr lang="en-US" altLang="ko-Kore-KR" sz="1100" dirty="0">
-                          <a:solidFill>
-                            <a:schemeClr val="tx1"/>
-                          </a:solidFill>
-                        </a:rPr>
-                        <a:t>String</a:t>
-                      </a:r>
-                      <a:endParaRPr lang="ko-Kore-KR" altLang="en-US" sz="1100" dirty="0">
-                        <a:solidFill>
-                          <a:schemeClr val="tx1"/>
-                        </a:solidFill>
-                      </a:endParaRPr>
-                    </a:p>
-                  </a:txBody>
-                  <a:tcPr anchor="ctr">
-                    <a:lnL w="12700" cap="flat" cmpd="sng" algn="ctr">
-                      <a:solidFill>
-                        <a:schemeClr val="tx1"/>
-                      </a:solidFill>
-                      <a:prstDash val="solid"/>
-                      <a:round/>
-                      <a:headEnd type="none" w="med" len="med"/>
-                      <a:tailEnd type="none" w="med" len="med"/>
-                    </a:lnL>
-                    <a:lnR w="12700" cap="flat" cmpd="sng" algn="ctr">
-                      <a:solidFill>
-                        <a:schemeClr val="tx1"/>
-                      </a:solidFill>
-                      <a:prstDash val="solid"/>
-                      <a:round/>
-                      <a:headEnd type="none" w="med" len="med"/>
-                      <a:tailEnd type="none" w="med" len="med"/>
-                    </a:lnR>
-                    <a:lnT w="12700" cap="flat" cmpd="sng" algn="ctr">
-                      <a:solidFill>
-                        <a:schemeClr val="tx1"/>
-                      </a:solidFill>
-                      <a:prstDash val="solid"/>
-                      <a:round/>
-                      <a:headEnd type="none" w="med" len="med"/>
-                      <a:tailEnd type="none" w="med" len="med"/>
-                    </a:lnT>
-                    <a:lnB w="12700" cap="flat" cmpd="sng" algn="ctr">
-                      <a:solidFill>
-                        <a:schemeClr val="tx1"/>
-                      </a:solidFill>
-                      <a:prstDash val="solid"/>
-                      <a:round/>
-                      <a:headEnd type="none" w="med" len="med"/>
-                      <a:tailEnd type="none" w="med" len="med"/>
-                    </a:lnB>
-                    <a:noFill/>
-                  </a:tcPr>
-                </a:tc>
-                <a:extLst>
-                  <a:ext uri="{0D108BD9-81ED-4DB2-BD59-A6C34878D82A}">
-                    <a16:rowId xmlns:a16="http://schemas.microsoft.com/office/drawing/2014/main" val="3624289341"/>
-                  </a:ext>
-                </a:extLst>
-              </a:tr>
-              <a:tr h="338667">
-                <a:tc>
-                  <a:txBody>
-                    <a:bodyPr/>
-                    <a:lstStyle/>
-                    <a:p>
-                      <a:pPr algn="ctr"/>
-                      <a:r>
-                        <a:rPr lang="en-US" altLang="ko-Kore-KR" sz="1100" dirty="0">
-                          <a:solidFill>
-                            <a:schemeClr val="tx1"/>
-                          </a:solidFill>
-                        </a:rPr>
-                        <a:t>google</a:t>
-                      </a:r>
-                      <a:endParaRPr lang="ko-Kore-KR" altLang="en-US" sz="1100" dirty="0">
-                        <a:solidFill>
-                          <a:schemeClr val="tx1"/>
-                        </a:solidFill>
-                      </a:endParaRPr>
-                    </a:p>
-                  </a:txBody>
-                  <a:tcPr anchor="ctr">
-                    <a:lnL w="12700" cap="flat" cmpd="sng" algn="ctr">
-                      <a:solidFill>
-                        <a:schemeClr val="tx1"/>
-                      </a:solidFill>
-                      <a:prstDash val="solid"/>
-                      <a:round/>
-                      <a:headEnd type="none" w="med" len="med"/>
-                      <a:tailEnd type="none" w="med" len="med"/>
-                    </a:lnL>
-                    <a:lnR w="12700" cap="flat" cmpd="sng" algn="ctr">
-                      <a:solidFill>
-                        <a:schemeClr val="tx1"/>
-                      </a:solidFill>
-                      <a:prstDash val="solid"/>
-                      <a:round/>
-                      <a:headEnd type="none" w="med" len="med"/>
-                      <a:tailEnd type="none" w="med" len="med"/>
-                    </a:lnR>
-                    <a:lnT w="12700" cap="flat" cmpd="sng" algn="ctr">
-                      <a:solidFill>
-                        <a:schemeClr val="tx1"/>
-                      </a:solidFill>
-                      <a:prstDash val="solid"/>
-                      <a:round/>
-                      <a:headEnd type="none" w="med" len="med"/>
-                      <a:tailEnd type="none" w="med" len="med"/>
-                    </a:lnT>
-                    <a:lnB w="12700" cap="flat" cmpd="sng" algn="ctr">
-                      <a:solidFill>
-                        <a:schemeClr val="tx1"/>
-                      </a:solidFill>
-                      <a:prstDash val="solid"/>
-                      <a:round/>
-                      <a:headEnd type="none" w="med" len="med"/>
-                      <a:tailEnd type="none" w="med" len="med"/>
-                    </a:lnB>
-                    <a:noFill/>
-                  </a:tcPr>
-                </a:tc>
-                <a:tc>
-                  <a:txBody>
-                    <a:bodyPr/>
-                    <a:lstStyle/>
-                    <a:p>
-                      <a:pPr algn="ctr"/>
-                      <a:r>
-                        <a:rPr lang="en-US" altLang="ko-Kore-KR" sz="1100" dirty="0">
-                          <a:solidFill>
-                            <a:schemeClr val="tx1"/>
-                          </a:solidFill>
-                        </a:rPr>
-                        <a:t>String</a:t>
-                      </a:r>
-                      <a:endParaRPr lang="ko-Kore-KR" altLang="en-US" sz="1100" dirty="0">
-                        <a:solidFill>
-                          <a:schemeClr val="tx1"/>
-                        </a:solidFill>
-                      </a:endParaRPr>
-                    </a:p>
-                  </a:txBody>
-                  <a:tcPr anchor="ctr">
-                    <a:lnL w="12700" cap="flat" cmpd="sng" algn="ctr">
-                      <a:solidFill>
-                        <a:schemeClr val="tx1"/>
-                      </a:solidFill>
-                      <a:prstDash val="solid"/>
-                      <a:round/>
-                      <a:headEnd type="none" w="med" len="med"/>
-                      <a:tailEnd type="none" w="med" len="med"/>
-                    </a:lnL>
-                    <a:lnR w="12700" cap="flat" cmpd="sng" algn="ctr">
-                      <a:solidFill>
-                        <a:schemeClr val="tx1"/>
-                      </a:solidFill>
-                      <a:prstDash val="solid"/>
-                      <a:round/>
-                      <a:headEnd type="none" w="med" len="med"/>
-                      <a:tailEnd type="none" w="med" len="med"/>
-                    </a:lnR>
-                    <a:lnT w="12700" cap="flat" cmpd="sng" algn="ctr">
-                      <a:solidFill>
-                        <a:schemeClr val="tx1"/>
-                      </a:solidFill>
-                      <a:prstDash val="solid"/>
-                      <a:round/>
-                      <a:headEnd type="none" w="med" len="med"/>
-                      <a:tailEnd type="none" w="med" len="med"/>
-                    </a:lnT>
-                    <a:lnB w="12700" cap="flat" cmpd="sng" algn="ctr">
-                      <a:solidFill>
-                        <a:schemeClr val="tx1"/>
-                      </a:solidFill>
-                      <a:prstDash val="solid"/>
-                      <a:round/>
-                      <a:headEnd type="none" w="med" len="med"/>
-                      <a:tailEnd type="none" w="med" len="med"/>
-                    </a:lnB>
-                    <a:noFill/>
-                  </a:tcPr>
-                </a:tc>
-                <a:extLst>
-                  <a:ext uri="{0D108BD9-81ED-4DB2-BD59-A6C34878D82A}">
-                    <a16:rowId xmlns:a16="http://schemas.microsoft.com/office/drawing/2014/main" val="225466583"/>
-                  </a:ext>
-                </a:extLst>
-              </a:tr>
-              <a:tr h="338667">
-                <a:tc>
-                  <a:txBody>
-                    <a:bodyPr/>
-                    <a:lstStyle/>
-                    <a:p>
-                      <a:pPr algn="ctr"/>
-                      <a:r>
-                        <a:rPr lang="en-US" altLang="ko-Kore-KR" sz="1100" dirty="0" err="1">
-                          <a:solidFill>
-                            <a:srgbClr val="0070C0"/>
-                          </a:solidFill>
-                        </a:rPr>
-                        <a:t>user_id</a:t>
-                      </a:r>
-                      <a:endParaRPr lang="ko-Kore-KR" altLang="en-US" sz="1100" dirty="0">
-                        <a:solidFill>
-                          <a:srgbClr val="0070C0"/>
-                        </a:solidFill>
-                      </a:endParaRPr>
-                    </a:p>
-                  </a:txBody>
-                  <a:tcPr anchor="ctr">
-                    <a:lnL w="12700" cap="flat" cmpd="sng" algn="ctr">
-                      <a:solidFill>
-                        <a:schemeClr val="tx1"/>
-                      </a:solidFill>
-                      <a:prstDash val="solid"/>
-                      <a:round/>
-                      <a:headEnd type="none" w="med" len="med"/>
-                      <a:tailEnd type="none" w="med" len="med"/>
-                    </a:lnL>
-                    <a:lnR w="12700" cap="flat" cmpd="sng" algn="ctr">
-                      <a:solidFill>
-                        <a:schemeClr val="tx1"/>
-                      </a:solidFill>
-                      <a:prstDash val="solid"/>
-                      <a:round/>
-                      <a:headEnd type="none" w="med" len="med"/>
-                      <a:tailEnd type="none" w="med" len="med"/>
-                    </a:lnR>
-                    <a:lnT w="12700" cap="flat" cmpd="sng" algn="ctr">
-                      <a:solidFill>
-                        <a:schemeClr val="tx1"/>
-                      </a:solidFill>
-                      <a:prstDash val="solid"/>
-                      <a:round/>
-                      <a:headEnd type="none" w="med" len="med"/>
-                      <a:tailEnd type="none" w="med" len="med"/>
-                    </a:lnT>
-                    <a:lnB w="12700" cap="flat" cmpd="sng" algn="ctr">
-                      <a:solidFill>
-                        <a:schemeClr val="tx1"/>
-                      </a:solidFill>
-                      <a:prstDash val="solid"/>
-                      <a:round/>
-                      <a:headEnd type="none" w="med" len="med"/>
-                      <a:tailEnd type="none" w="med" len="med"/>
-                    </a:lnB>
-                    <a:noFill/>
-                  </a:tcPr>
-                </a:tc>
-                <a:tc>
-                  <a:txBody>
-                    <a:bodyPr/>
-                    <a:lstStyle/>
-                    <a:p>
-                      <a:pPr algn="ctr"/>
-                      <a:r>
-                        <a:rPr lang="en-US" altLang="ko-Kore-KR" sz="1100" dirty="0">
-                          <a:solidFill>
-                            <a:srgbClr val="0070C0"/>
-                          </a:solidFill>
-                        </a:rPr>
-                        <a:t>Long(FK)</a:t>
-                      </a:r>
-                      <a:endParaRPr lang="ko-Kore-KR" altLang="en-US" sz="1100" dirty="0">
-                        <a:solidFill>
-                          <a:srgbClr val="0070C0"/>
-                        </a:solidFill>
-                      </a:endParaRPr>
-                    </a:p>
-                  </a:txBody>
-                  <a:tcPr anchor="ctr">
-                    <a:lnL w="12700" cap="flat" cmpd="sng" algn="ctr">
-                      <a:solidFill>
-                        <a:schemeClr val="tx1"/>
-                      </a:solidFill>
-                      <a:prstDash val="solid"/>
-                      <a:round/>
-                      <a:headEnd type="none" w="med" len="med"/>
-                      <a:tailEnd type="none" w="med" len="med"/>
-                    </a:lnL>
-                    <a:lnR w="12700" cap="flat" cmpd="sng" algn="ctr">
-                      <a:solidFill>
-                        <a:schemeClr val="tx1"/>
-                      </a:solidFill>
-                      <a:prstDash val="solid"/>
-                      <a:round/>
-                      <a:headEnd type="none" w="med" len="med"/>
-                      <a:tailEnd type="none" w="med" len="med"/>
-                    </a:lnR>
-                    <a:lnT w="12700" cap="flat" cmpd="sng" algn="ctr">
-                      <a:solidFill>
-                        <a:schemeClr val="tx1"/>
-                      </a:solidFill>
-                      <a:prstDash val="solid"/>
-                      <a:round/>
-                      <a:headEnd type="none" w="med" len="med"/>
-                      <a:tailEnd type="none" w="med" len="med"/>
-                    </a:lnT>
-                    <a:lnB w="12700" cap="flat" cmpd="sng" algn="ctr">
-                      <a:solidFill>
-                        <a:schemeClr val="tx1"/>
-                      </a:solidFill>
-                      <a:prstDash val="solid"/>
-                      <a:round/>
-                      <a:headEnd type="none" w="med" len="med"/>
-                      <a:tailEnd type="none" w="med" len="med"/>
-                    </a:lnB>
-                    <a:noFill/>
-                  </a:tcPr>
-                </a:tc>
-                <a:extLst>
-                  <a:ext uri="{0D108BD9-81ED-4DB2-BD59-A6C34878D82A}">
-                    <a16:rowId xmlns:a16="http://schemas.microsoft.com/office/drawing/2014/main" val="3348974366"/>
                   </a:ext>
                 </a:extLst>
               </a:tr>
@@ -5501,50 +4969,6 @@
           </a:graphicData>
         </a:graphic>
       </p:graphicFrame>
-      <p:cxnSp>
-        <p:nvCxnSpPr>
-          <p:cNvPr id="7" name="직선 화살표 연결선 6">
-            <a:extLst>
-              <a:ext uri="{FF2B5EF4-FFF2-40B4-BE49-F238E27FC236}">
-                <a16:creationId xmlns:a16="http://schemas.microsoft.com/office/drawing/2014/main" id="{C0312123-01D2-E33A-C417-42499834300A}"/>
-              </a:ext>
-            </a:extLst>
-          </p:cNvPr>
-          <p:cNvCxnSpPr>
-            <a:cxnSpLocks/>
-          </p:cNvCxnSpPr>
-          <p:nvPr/>
-        </p:nvCxnSpPr>
-        <p:spPr>
-          <a:xfrm flipV="1">
-            <a:off x="1676400" y="609600"/>
-            <a:ext cx="678237" cy="1352550"/>
-          </a:xfrm>
-          <a:prstGeom prst="straightConnector1">
-            <a:avLst/>
-          </a:prstGeom>
-          <a:ln w="12700">
-            <a:solidFill>
-              <a:schemeClr val="tx1"/>
-            </a:solidFill>
-            <a:tailEnd type="triangle"/>
-          </a:ln>
-        </p:spPr>
-        <p:style>
-          <a:lnRef idx="1">
-            <a:schemeClr val="dk1"/>
-          </a:lnRef>
-          <a:fillRef idx="0">
-            <a:schemeClr val="dk1"/>
-          </a:fillRef>
-          <a:effectRef idx="0">
-            <a:schemeClr val="dk1"/>
-          </a:effectRef>
-          <a:fontRef idx="minor">
-            <a:schemeClr val="tx1"/>
-          </a:fontRef>
-        </p:style>
-      </p:cxnSp>
       <p:graphicFrame>
         <p:nvGraphicFramePr>
           <p:cNvPr id="9" name="표 8">
@@ -5560,14 +4984,14 @@
           <p:nvPr>
             <p:extLst>
               <p:ext uri="{D42A27DB-BD31-4B8C-83A1-F6EECF244321}">
-                <p14:modId xmlns:p14="http://schemas.microsoft.com/office/powerpoint/2010/main" val="2104224054"/>
+                <p14:modId xmlns:p14="http://schemas.microsoft.com/office/powerpoint/2010/main" val="1940218884"/>
               </p:ext>
             </p:extLst>
           </p:nvPr>
         </p:nvGraphicFramePr>
         <p:xfrm>
-          <a:off x="27927" y="4856189"/>
-          <a:ext cx="2622036" cy="1905533"/>
+          <a:off x="43654" y="3776199"/>
+          <a:ext cx="2731444" cy="1905533"/>
         </p:xfrm>
         <a:graphic>
           <a:graphicData uri="http://schemas.openxmlformats.org/drawingml/2006/table">
@@ -5576,14 +5000,14 @@
                 <a:tableStyleId>{5C22544A-7EE6-4342-B048-85BDC9FD1C3A}</a:tableStyleId>
               </a:tblPr>
               <a:tblGrid>
-                <a:gridCol w="1860036">
+                <a:gridCol w="1785146">
                   <a:extLst>
                     <a:ext uri="{9D8B030D-6E8A-4147-A177-3AD203B41FA5}">
                       <a16:colId xmlns:a16="http://schemas.microsoft.com/office/drawing/2014/main" val="1113455329"/>
                     </a:ext>
                   </a:extLst>
                 </a:gridCol>
-                <a:gridCol w="762000">
+                <a:gridCol w="946298">
                   <a:extLst>
                     <a:ext uri="{9D8B030D-6E8A-4147-A177-3AD203B41FA5}">
                       <a16:colId xmlns:a16="http://schemas.microsoft.com/office/drawing/2014/main" val="717372469"/>
@@ -5604,7 +5028,7 @@
                             <a:schemeClr val="tx1"/>
                           </a:solidFill>
                         </a:rPr>
-                        <a:t>storemanager_detail</a:t>
+                        <a:t>storemanager</a:t>
                       </a:r>
                       <a:endParaRPr lang="ko-Kore-KR" altLang="en-US" sz="1100" dirty="0">
                         <a:solidFill>
@@ -5715,12 +5139,12 @@
                     <a:p>
                       <a:pPr algn="ctr"/>
                       <a:r>
-                        <a:rPr lang="en-US" altLang="ko-Kore-KR" sz="1100" dirty="0" err="1">
+                        <a:rPr lang="en-US" altLang="ko-Kore-KR" sz="1100" dirty="0">
                           <a:solidFill>
                             <a:srgbClr val="FF0000"/>
                           </a:solidFill>
                         </a:rPr>
-                        <a:t>storemanager_detail_id</a:t>
+                        <a:t>id</a:t>
                       </a:r>
                       <a:endParaRPr lang="ko-Kore-KR" altLang="en-US" sz="1100" dirty="0">
                         <a:solidFill>
@@ -5781,7 +5205,7 @@
                             <a:srgbClr val="FF0000"/>
                           </a:solidFill>
                         </a:rPr>
-                        <a:t>Long(PK)</a:t>
+                        <a:t>Long(PK, FK)</a:t>
                       </a:r>
                       <a:endParaRPr lang="ko-Kore-KR" altLang="en-US" sz="1100" dirty="0">
                         <a:solidFill>
@@ -6348,13 +5772,14 @@
           <p:cNvCxnSpPr>
             <a:cxnSpLocks/>
             <a:stCxn id="4" idx="2"/>
+            <a:endCxn id="9" idx="0"/>
           </p:cNvCxnSpPr>
           <p:nvPr/>
         </p:nvCxnSpPr>
         <p:spPr>
           <a:xfrm flipH="1">
-            <a:off x="2350125" y="3484077"/>
-            <a:ext cx="1280302" cy="1382998"/>
+            <a:off x="1409376" y="3138398"/>
+            <a:ext cx="1652503" cy="637801"/>
           </a:xfrm>
           <a:prstGeom prst="straightConnector1">
             <a:avLst/>
@@ -6396,14 +5821,14 @@
           <p:nvPr>
             <p:extLst>
               <p:ext uri="{D42A27DB-BD31-4B8C-83A1-F6EECF244321}">
-                <p14:modId xmlns:p14="http://schemas.microsoft.com/office/powerpoint/2010/main" val="3013015889"/>
+                <p14:modId xmlns:p14="http://schemas.microsoft.com/office/powerpoint/2010/main" val="1971070826"/>
               </p:ext>
             </p:extLst>
           </p:nvPr>
         </p:nvGraphicFramePr>
         <p:xfrm>
-          <a:off x="32063" y="3429000"/>
-          <a:ext cx="2250561" cy="1279505"/>
+          <a:off x="2839436" y="3776199"/>
+          <a:ext cx="1720678" cy="1114268"/>
         </p:xfrm>
         <a:graphic>
           <a:graphicData uri="http://schemas.openxmlformats.org/drawingml/2006/table">
@@ -6412,14 +5837,14 @@
                 <a:tableStyleId>{5C22544A-7EE6-4342-B048-85BDC9FD1C3A}</a:tableStyleId>
               </a:tblPr>
               <a:tblGrid>
-                <a:gridCol w="1305298">
+                <a:gridCol w="768436">
                   <a:extLst>
                     <a:ext uri="{9D8B030D-6E8A-4147-A177-3AD203B41FA5}">
                       <a16:colId xmlns:a16="http://schemas.microsoft.com/office/drawing/2014/main" val="1113455329"/>
                     </a:ext>
                   </a:extLst>
                 </a:gridCol>
-                <a:gridCol w="945263">
+                <a:gridCol w="952242">
                   <a:extLst>
                     <a:ext uri="{9D8B030D-6E8A-4147-A177-3AD203B41FA5}">
                       <a16:colId xmlns:a16="http://schemas.microsoft.com/office/drawing/2014/main" val="717372469"/>
@@ -6427,7 +5852,7 @@
                   </a:extLst>
                 </a:gridCol>
               </a:tblGrid>
-              <a:tr h="0">
+              <a:tr h="278567">
                 <a:tc gridSpan="2">
                   <a:txBody>
                     <a:bodyPr/>
@@ -6435,12 +5860,12 @@
                     <a:p>
                       <a:pPr algn="ctr"/>
                       <a:r>
-                        <a:rPr lang="en-US" altLang="ko-Kore-KR" sz="1100" dirty="0" err="1">
+                        <a:rPr lang="en-US" altLang="ko-Kore-KR" sz="1100" dirty="0">
                           <a:solidFill>
                             <a:schemeClr val="tx1"/>
                           </a:solidFill>
                         </a:rPr>
-                        <a:t>student_detail</a:t>
+                        <a:t>student</a:t>
                       </a:r>
                       <a:endParaRPr lang="ko-Kore-KR" altLang="en-US" sz="1100" dirty="0">
                         <a:solidFill>
@@ -6543,7 +5968,7 @@
                   </a:ext>
                 </a:extLst>
               </a:tr>
-              <a:tr h="394397">
+              <a:tr h="278567">
                 <a:tc>
                   <a:txBody>
                     <a:bodyPr/>
@@ -6551,12 +5976,12 @@
                     <a:p>
                       <a:pPr algn="ctr"/>
                       <a:r>
-                        <a:rPr lang="en-US" altLang="ko-Kore-KR" sz="1100" dirty="0" err="1">
+                        <a:rPr lang="en-US" altLang="ko-Kore-KR" sz="1100" dirty="0">
                           <a:solidFill>
                             <a:srgbClr val="FF0000"/>
                           </a:solidFill>
                         </a:rPr>
-                        <a:t>student_detail_id</a:t>
+                        <a:t>id</a:t>
                       </a:r>
                       <a:endParaRPr lang="ko-Kore-KR" altLang="en-US" sz="1100" dirty="0">
                         <a:solidFill>
@@ -6617,7 +6042,7 @@
                             <a:srgbClr val="FF0000"/>
                           </a:solidFill>
                         </a:rPr>
-                        <a:t>Long(PK)</a:t>
+                        <a:t>Long(PK, FK)</a:t>
                       </a:r>
                       <a:endParaRPr lang="ko-Kore-KR" altLang="en-US" sz="1100" dirty="0">
                         <a:solidFill>
@@ -6672,7 +6097,7 @@
                   </a:ext>
                 </a:extLst>
               </a:tr>
-              <a:tr h="313014">
+              <a:tr h="278567">
                 <a:tc>
                   <a:txBody>
                     <a:bodyPr/>
@@ -6793,7 +6218,7 @@
                   </a:ext>
                 </a:extLst>
               </a:tr>
-              <a:tr h="313014">
+              <a:tr h="278567">
                 <a:tc>
                   <a:txBody>
                     <a:bodyPr/>
@@ -6929,14 +6354,15 @@
           </p:cNvPr>
           <p:cNvCxnSpPr>
             <a:cxnSpLocks/>
+            <a:stCxn id="4" idx="2"/>
             <a:endCxn id="13" idx="0"/>
           </p:cNvCxnSpPr>
           <p:nvPr/>
         </p:nvCxnSpPr>
         <p:spPr>
-          <a:xfrm flipH="1">
-            <a:off x="1157343" y="3011583"/>
-            <a:ext cx="1192782" cy="417417"/>
+          <a:xfrm>
+            <a:off x="3061879" y="3138398"/>
+            <a:ext cx="637896" cy="637801"/>
           </a:xfrm>
           <a:prstGeom prst="straightConnector1">
             <a:avLst/>
@@ -6978,14 +6404,14 @@
           <p:nvPr>
             <p:extLst>
               <p:ext uri="{D42A27DB-BD31-4B8C-83A1-F6EECF244321}">
-                <p14:modId xmlns:p14="http://schemas.microsoft.com/office/powerpoint/2010/main" val="1146295966"/>
+                <p14:modId xmlns:p14="http://schemas.microsoft.com/office/powerpoint/2010/main" val="1654838104"/>
               </p:ext>
             </p:extLst>
           </p:nvPr>
         </p:nvGraphicFramePr>
         <p:xfrm>
-          <a:off x="5073283" y="97407"/>
-          <a:ext cx="2306691" cy="4064004"/>
+          <a:off x="4624451" y="90395"/>
+          <a:ext cx="2306691" cy="3725337"/>
         </p:xfrm>
         <a:graphic>
           <a:graphicData uri="http://schemas.openxmlformats.org/drawingml/2006/table">
@@ -7133,12 +6559,12 @@
                     <a:p>
                       <a:pPr algn="ctr"/>
                       <a:r>
-                        <a:rPr lang="en-US" altLang="ko-Kore-KR" sz="1100" dirty="0" err="1">
+                        <a:rPr lang="en-US" altLang="ko-Kore-KR" sz="1100" dirty="0">
                           <a:solidFill>
                             <a:srgbClr val="FF0000"/>
                           </a:solidFill>
                         </a:rPr>
-                        <a:t>post_id</a:t>
+                        <a:t>id</a:t>
                       </a:r>
                       <a:endParaRPr lang="ko-Kore-KR" altLang="en-US" sz="1100" dirty="0">
                         <a:solidFill>
@@ -8033,135 +7459,6 @@
                 <a:extLst>
                   <a:ext uri="{0D108BD9-81ED-4DB2-BD59-A6C34878D82A}">
                     <a16:rowId xmlns:a16="http://schemas.microsoft.com/office/drawing/2014/main" val="3673359356"/>
-                  </a:ext>
-                </a:extLst>
-              </a:tr>
-              <a:tr h="338667">
-                <a:tc>
-                  <a:txBody>
-                    <a:bodyPr/>
-                    <a:lstStyle/>
-                    <a:p>
-                      <a:pPr algn="ctr"/>
-                      <a:r>
-                        <a:rPr lang="en-US" altLang="ko-Kore-KR" sz="1100" dirty="0" err="1">
-                          <a:solidFill>
-                            <a:schemeClr val="tx1"/>
-                          </a:solidFill>
-                        </a:rPr>
-                        <a:t>chatRoom_id</a:t>
-                      </a:r>
-                      <a:endParaRPr lang="ko-Kore-KR" altLang="en-US" sz="1100" dirty="0">
-                        <a:solidFill>
-                          <a:schemeClr val="tx1"/>
-                        </a:solidFill>
-                      </a:endParaRPr>
-                    </a:p>
-                  </a:txBody>
-                  <a:tcPr anchor="ctr">
-                    <a:lnL w="12700" cap="flat" cmpd="sng" algn="ctr">
-                      <a:solidFill>
-                        <a:schemeClr val="tx1"/>
-                      </a:solidFill>
-                      <a:prstDash val="solid"/>
-                      <a:round/>
-                      <a:headEnd type="none" w="med" len="med"/>
-                      <a:tailEnd type="none" w="med" len="med"/>
-                    </a:lnL>
-                    <a:lnR w="12700" cap="flat" cmpd="sng" algn="ctr">
-                      <a:solidFill>
-                        <a:schemeClr val="tx1"/>
-                      </a:solidFill>
-                      <a:prstDash val="solid"/>
-                      <a:round/>
-                      <a:headEnd type="none" w="med" len="med"/>
-                      <a:tailEnd type="none" w="med" len="med"/>
-                    </a:lnR>
-                    <a:lnT w="12700" cap="flat" cmpd="sng" algn="ctr">
-                      <a:solidFill>
-                        <a:schemeClr val="tx1"/>
-                      </a:solidFill>
-                      <a:prstDash val="solid"/>
-                      <a:round/>
-                      <a:headEnd type="none" w="med" len="med"/>
-                      <a:tailEnd type="none" w="med" len="med"/>
-                    </a:lnT>
-                    <a:lnB w="12700" cap="flat" cmpd="sng" algn="ctr">
-                      <a:solidFill>
-                        <a:schemeClr val="tx1"/>
-                      </a:solidFill>
-                      <a:prstDash val="solid"/>
-                      <a:round/>
-                      <a:headEnd type="none" w="med" len="med"/>
-                      <a:tailEnd type="none" w="med" len="med"/>
-                    </a:lnB>
-                    <a:noFill/>
-                  </a:tcPr>
-                </a:tc>
-                <a:tc>
-                  <a:txBody>
-                    <a:bodyPr/>
-                    <a:lstStyle/>
-                    <a:p>
-                      <a:pPr algn="ctr"/>
-                      <a:r>
-                        <a:rPr lang="en-US" altLang="ko-Kore-KR" sz="1100" dirty="0">
-                          <a:solidFill>
-                            <a:schemeClr val="tx1"/>
-                          </a:solidFill>
-                        </a:rPr>
-                        <a:t>String</a:t>
-                      </a:r>
-                      <a:endParaRPr lang="ko-Kore-KR" altLang="en-US" sz="1100" dirty="0">
-                        <a:solidFill>
-                          <a:schemeClr val="tx1"/>
-                        </a:solidFill>
-                      </a:endParaRPr>
-                    </a:p>
-                  </a:txBody>
-                  <a:tcPr anchor="ctr">
-                    <a:lnL w="12700" cap="flat" cmpd="sng" algn="ctr">
-                      <a:solidFill>
-                        <a:schemeClr val="tx1"/>
-                      </a:solidFill>
-                      <a:prstDash val="solid"/>
-                      <a:round/>
-                      <a:headEnd type="none" w="med" len="med"/>
-                      <a:tailEnd type="none" w="med" len="med"/>
-                    </a:lnL>
-                    <a:lnR w="12700" cap="flat" cmpd="sng" algn="ctr">
-                      <a:solidFill>
-                        <a:schemeClr val="tx1"/>
-                      </a:solidFill>
-                      <a:prstDash val="solid"/>
-                      <a:round/>
-                      <a:headEnd type="none" w="med" len="med"/>
-                      <a:tailEnd type="none" w="med" len="med"/>
-                    </a:lnR>
-                    <a:lnT w="12700" cap="flat" cmpd="sng" algn="ctr">
-                      <a:solidFill>
-                        <a:schemeClr val="tx1"/>
-                      </a:solidFill>
-                      <a:prstDash val="solid"/>
-                      <a:round/>
-                      <a:headEnd type="none" w="med" len="med"/>
-                      <a:tailEnd type="none" w="med" len="med"/>
-                    </a:lnT>
-                    <a:lnB w="12700" cap="flat" cmpd="sng" algn="ctr">
-                      <a:solidFill>
-                        <a:schemeClr val="tx1"/>
-                      </a:solidFill>
-                      <a:prstDash val="solid"/>
-                      <a:round/>
-                      <a:headEnd type="none" w="med" len="med"/>
-                      <a:tailEnd type="none" w="med" len="med"/>
-                    </a:lnB>
-                    <a:noFill/>
-                  </a:tcPr>
-                </a:tc>
-                <a:extLst>
-                  <a:ext uri="{0D108BD9-81ED-4DB2-BD59-A6C34878D82A}">
-                    <a16:rowId xmlns:a16="http://schemas.microsoft.com/office/drawing/2014/main" val="2373369159"/>
                   </a:ext>
                 </a:extLst>
               </a:tr>
@@ -8571,13 +7868,13 @@
           <p:nvPr>
             <p:extLst>
               <p:ext uri="{D42A27DB-BD31-4B8C-83A1-F6EECF244321}">
-                <p14:modId xmlns:p14="http://schemas.microsoft.com/office/powerpoint/2010/main" val="3550325384"/>
+                <p14:modId xmlns:p14="http://schemas.microsoft.com/office/powerpoint/2010/main" val="893273243"/>
               </p:ext>
             </p:extLst>
           </p:nvPr>
         </p:nvGraphicFramePr>
         <p:xfrm>
-          <a:off x="7696877" y="97407"/>
+          <a:off x="7109481" y="157047"/>
           <a:ext cx="2091423" cy="2596221"/>
         </p:xfrm>
         <a:graphic>
@@ -8726,12 +8023,12 @@
                     <a:p>
                       <a:pPr algn="ctr"/>
                       <a:r>
-                        <a:rPr lang="en-US" altLang="ko-Kore-KR" sz="1100" dirty="0" err="1">
+                        <a:rPr lang="en-US" altLang="ko-Kore-KR" sz="1100" dirty="0">
                           <a:solidFill>
                             <a:srgbClr val="FF0000"/>
                           </a:solidFill>
                         </a:rPr>
-                        <a:t>store_id</a:t>
+                        <a:t>id</a:t>
                       </a:r>
                       <a:endParaRPr lang="ko-Kore-KR" altLang="en-US" sz="1100" dirty="0">
                         <a:solidFill>
@@ -9729,14 +9026,14 @@
           <p:nvPr>
             <p:extLst>
               <p:ext uri="{D42A27DB-BD31-4B8C-83A1-F6EECF244321}">
-                <p14:modId xmlns:p14="http://schemas.microsoft.com/office/powerpoint/2010/main" val="3431057237"/>
+                <p14:modId xmlns:p14="http://schemas.microsoft.com/office/powerpoint/2010/main" val="4026279368"/>
               </p:ext>
             </p:extLst>
           </p:nvPr>
         </p:nvGraphicFramePr>
         <p:xfrm>
-          <a:off x="10013733" y="97407"/>
-          <a:ext cx="2091422" cy="1905533"/>
+          <a:off x="9419682" y="163102"/>
+          <a:ext cx="1964901" cy="1605144"/>
         </p:xfrm>
         <a:graphic>
           <a:graphicData uri="http://schemas.openxmlformats.org/drawingml/2006/table">
@@ -9745,14 +9042,14 @@
                 <a:tableStyleId>{5C22544A-7EE6-4342-B048-85BDC9FD1C3A}</a:tableStyleId>
               </a:tblPr>
               <a:tblGrid>
-                <a:gridCol w="1394104">
+                <a:gridCol w="1201892">
                   <a:extLst>
                     <a:ext uri="{9D8B030D-6E8A-4147-A177-3AD203B41FA5}">
                       <a16:colId xmlns:a16="http://schemas.microsoft.com/office/drawing/2014/main" val="1113455329"/>
                     </a:ext>
                   </a:extLst>
                 </a:gridCol>
-                <a:gridCol w="697318">
+                <a:gridCol w="763009">
                   <a:extLst>
                     <a:ext uri="{9D8B030D-6E8A-4147-A177-3AD203B41FA5}">
                       <a16:colId xmlns:a16="http://schemas.microsoft.com/office/drawing/2014/main" val="717372469"/>
@@ -9760,7 +9057,7 @@
                   </a:extLst>
                 </a:gridCol>
               </a:tblGrid>
-              <a:tr h="0">
+              <a:tr h="267524">
                 <a:tc gridSpan="2">
                   <a:txBody>
                     <a:bodyPr/>
@@ -9876,7 +9173,7 @@
                   </a:ext>
                 </a:extLst>
               </a:tr>
-              <a:tr h="394397">
+              <a:tr h="267524">
                 <a:tc>
                   <a:txBody>
                     <a:bodyPr/>
@@ -9884,12 +9181,12 @@
                     <a:p>
                       <a:pPr algn="ctr"/>
                       <a:r>
-                        <a:rPr lang="en-US" altLang="ko-Kore-KR" sz="1100" dirty="0" err="1">
+                        <a:rPr lang="en-US" altLang="ko-Kore-KR" sz="1100" dirty="0">
                           <a:solidFill>
                             <a:srgbClr val="FF0000"/>
                           </a:solidFill>
                         </a:rPr>
-                        <a:t>menu_id</a:t>
+                        <a:t>id</a:t>
                       </a:r>
                       <a:endParaRPr lang="ko-Kore-KR" altLang="en-US" sz="1100" dirty="0">
                         <a:solidFill>
@@ -10005,7 +9302,7 @@
                   </a:ext>
                 </a:extLst>
               </a:tr>
-              <a:tr h="313014">
+              <a:tr h="267524">
                 <a:tc>
                   <a:txBody>
                     <a:bodyPr/>
@@ -10126,7 +9423,7 @@
                   </a:ext>
                 </a:extLst>
               </a:tr>
-              <a:tr h="313014">
+              <a:tr h="267524">
                 <a:tc>
                   <a:txBody>
                     <a:bodyPr/>
@@ -10247,7 +9544,7 @@
                   </a:ext>
                 </a:extLst>
               </a:tr>
-              <a:tr h="313014">
+              <a:tr h="267524">
                 <a:tc>
                   <a:txBody>
                     <a:bodyPr/>
@@ -10376,7 +9673,7 @@
                   </a:ext>
                 </a:extLst>
               </a:tr>
-              <a:tr h="313014">
+              <a:tr h="267524">
                 <a:tc>
                   <a:txBody>
                     <a:bodyPr/>
@@ -10524,14 +9821,14 @@
           <p:nvPr>
             <p:extLst>
               <p:ext uri="{D42A27DB-BD31-4B8C-83A1-F6EECF244321}">
-                <p14:modId xmlns:p14="http://schemas.microsoft.com/office/powerpoint/2010/main" val="2439593189"/>
+                <p14:modId xmlns:p14="http://schemas.microsoft.com/office/powerpoint/2010/main" val="2347953675"/>
               </p:ext>
             </p:extLst>
           </p:nvPr>
         </p:nvGraphicFramePr>
         <p:xfrm>
-          <a:off x="7729979" y="3011583"/>
-          <a:ext cx="1722805" cy="1290392"/>
+          <a:off x="7131594" y="2897915"/>
+          <a:ext cx="1807019" cy="1408460"/>
         </p:xfrm>
         <a:graphic>
           <a:graphicData uri="http://schemas.openxmlformats.org/drawingml/2006/table">
@@ -10540,14 +9837,14 @@
                 <a:tableStyleId>{5C22544A-7EE6-4342-B048-85BDC9FD1C3A}</a:tableStyleId>
               </a:tblPr>
               <a:tblGrid>
-                <a:gridCol w="999206">
+                <a:gridCol w="825532">
                   <a:extLst>
                     <a:ext uri="{9D8B030D-6E8A-4147-A177-3AD203B41FA5}">
                       <a16:colId xmlns:a16="http://schemas.microsoft.com/office/drawing/2014/main" val="1113455329"/>
                     </a:ext>
                   </a:extLst>
                 </a:gridCol>
-                <a:gridCol w="723599">
+                <a:gridCol w="981487">
                   <a:extLst>
                     <a:ext uri="{9D8B030D-6E8A-4147-A177-3AD203B41FA5}">
                       <a16:colId xmlns:a16="http://schemas.microsoft.com/office/drawing/2014/main" val="717372469"/>
@@ -10555,7 +9852,7 @@
                   </a:extLst>
                 </a:gridCol>
               </a:tblGrid>
-              <a:tr h="322598">
+              <a:tr h="281692">
                 <a:tc gridSpan="2">
                   <a:txBody>
                     <a:bodyPr/>
@@ -10671,7 +9968,7 @@
                   </a:ext>
                 </a:extLst>
               </a:tr>
-              <a:tr h="322598">
+              <a:tr h="281692">
                 <a:tc>
                   <a:txBody>
                     <a:bodyPr/>
@@ -10679,12 +9976,12 @@
                     <a:p>
                       <a:pPr algn="ctr"/>
                       <a:r>
-                        <a:rPr lang="en-US" altLang="ko-Kore-KR" sz="1100" dirty="0" err="1">
+                        <a:rPr lang="en-US" altLang="ko-Kore-KR" sz="1100" dirty="0">
                           <a:solidFill>
                             <a:srgbClr val="FF0000"/>
                           </a:solidFill>
                         </a:rPr>
-                        <a:t>proposal_id</a:t>
+                        <a:t>id</a:t>
                       </a:r>
                       <a:endParaRPr lang="ko-Kore-KR" altLang="en-US" sz="1100" dirty="0">
                         <a:solidFill>
@@ -10800,7 +10097,136 @@
                   </a:ext>
                 </a:extLst>
               </a:tr>
-              <a:tr h="322598">
+              <a:tr h="281692">
+                <a:tc>
+                  <a:txBody>
+                    <a:bodyPr/>
+                    <a:lstStyle/>
+                    <a:p>
+                      <a:pPr algn="ctr"/>
+                      <a:r>
+                        <a:rPr lang="en-US" altLang="ko-Kore-KR" sz="1100" dirty="0">
+                          <a:solidFill>
+                            <a:schemeClr val="tx1"/>
+                          </a:solidFill>
+                        </a:rPr>
+                        <a:t>state</a:t>
+                      </a:r>
+                      <a:endParaRPr lang="ko-Kore-KR" altLang="en-US" sz="1100" dirty="0">
+                        <a:solidFill>
+                          <a:schemeClr val="tx1"/>
+                        </a:solidFill>
+                      </a:endParaRPr>
+                    </a:p>
+                  </a:txBody>
+                  <a:tcPr anchor="ctr">
+                    <a:lnL w="12700" cap="flat" cmpd="sng" algn="ctr">
+                      <a:solidFill>
+                        <a:schemeClr val="tx1"/>
+                      </a:solidFill>
+                      <a:prstDash val="solid"/>
+                      <a:round/>
+                      <a:headEnd type="none" w="med" len="med"/>
+                      <a:tailEnd type="none" w="med" len="med"/>
+                    </a:lnL>
+                    <a:lnR w="12700" cap="flat" cmpd="sng" algn="ctr">
+                      <a:solidFill>
+                        <a:schemeClr val="tx1"/>
+                      </a:solidFill>
+                      <a:prstDash val="solid"/>
+                      <a:round/>
+                      <a:headEnd type="none" w="med" len="med"/>
+                      <a:tailEnd type="none" w="med" len="med"/>
+                    </a:lnR>
+                    <a:lnT w="12700" cap="flat" cmpd="sng" algn="ctr">
+                      <a:solidFill>
+                        <a:schemeClr val="tx1"/>
+                      </a:solidFill>
+                      <a:prstDash val="solid"/>
+                      <a:round/>
+                      <a:headEnd type="none" w="med" len="med"/>
+                      <a:tailEnd type="none" w="med" len="med"/>
+                    </a:lnT>
+                    <a:lnB w="12700" cap="flat" cmpd="sng" algn="ctr">
+                      <a:solidFill>
+                        <a:schemeClr val="tx1"/>
+                      </a:solidFill>
+                      <a:prstDash val="solid"/>
+                      <a:round/>
+                      <a:headEnd type="none" w="med" len="med"/>
+                      <a:tailEnd type="none" w="med" len="med"/>
+                    </a:lnB>
+                    <a:noFill/>
+                  </a:tcPr>
+                </a:tc>
+                <a:tc>
+                  <a:txBody>
+                    <a:bodyPr/>
+                    <a:lstStyle/>
+                    <a:p>
+                      <a:pPr algn="ctr"/>
+                      <a:r>
+                        <a:rPr lang="en-US" altLang="ko-Kore-KR" sz="1100" dirty="0">
+                          <a:solidFill>
+                            <a:schemeClr val="tx1"/>
+                          </a:solidFill>
+                        </a:rPr>
+                        <a:t>String(Enum)</a:t>
+                      </a:r>
+                      <a:endParaRPr lang="ko-Kore-KR" altLang="en-US" sz="1100" dirty="0">
+                        <a:solidFill>
+                          <a:schemeClr val="tx1"/>
+                        </a:solidFill>
+                      </a:endParaRPr>
+                    </a:p>
+                  </a:txBody>
+                  <a:tcPr anchor="ctr">
+                    <a:lnL w="12700" cap="flat" cmpd="sng" algn="ctr">
+                      <a:solidFill>
+                        <a:schemeClr val="tx1"/>
+                      </a:solidFill>
+                      <a:prstDash val="solid"/>
+                      <a:round/>
+                      <a:headEnd type="none" w="med" len="med"/>
+                      <a:tailEnd type="none" w="med" len="med"/>
+                    </a:lnL>
+                    <a:lnR w="12700" cap="flat" cmpd="sng" algn="ctr">
+                      <a:solidFill>
+                        <a:schemeClr val="tx1"/>
+                      </a:solidFill>
+                      <a:prstDash val="solid"/>
+                      <a:round/>
+                      <a:headEnd type="none" w="med" len="med"/>
+                      <a:tailEnd type="none" w="med" len="med"/>
+                    </a:lnR>
+                    <a:lnT w="12700" cap="flat" cmpd="sng" algn="ctr">
+                      <a:solidFill>
+                        <a:schemeClr val="tx1"/>
+                      </a:solidFill>
+                      <a:prstDash val="solid"/>
+                      <a:round/>
+                      <a:headEnd type="none" w="med" len="med"/>
+                      <a:tailEnd type="none" w="med" len="med"/>
+                    </a:lnT>
+                    <a:lnB w="12700" cap="flat" cmpd="sng" algn="ctr">
+                      <a:solidFill>
+                        <a:schemeClr val="tx1"/>
+                      </a:solidFill>
+                      <a:prstDash val="solid"/>
+                      <a:round/>
+                      <a:headEnd type="none" w="med" len="med"/>
+                      <a:tailEnd type="none" w="med" len="med"/>
+                    </a:lnB>
+                    <a:noFill/>
+                  </a:tcPr>
+                </a:tc>
+                <a:extLst>
+                  <a:ext uri="{0D108BD9-81ED-4DB2-BD59-A6C34878D82A}">
+                    <a16:rowId xmlns:a16="http://schemas.microsoft.com/office/drawing/2014/main" val="27276790"/>
+                  </a:ext>
+                </a:extLst>
+              </a:tr>
+              <a:tr h="281692">
                 <a:tc>
                   <a:txBody>
                     <a:bodyPr/>
@@ -10929,7 +10355,7 @@
                   </a:ext>
                 </a:extLst>
               </a:tr>
-              <a:tr h="322598">
+              <a:tr h="281692">
                 <a:tc>
                   <a:txBody>
                     <a:bodyPr/>
@@ -11077,13 +10503,13 @@
           <p:nvPr>
             <p:extLst>
               <p:ext uri="{D42A27DB-BD31-4B8C-83A1-F6EECF244321}">
-                <p14:modId xmlns:p14="http://schemas.microsoft.com/office/powerpoint/2010/main" val="403708991"/>
+                <p14:modId xmlns:p14="http://schemas.microsoft.com/office/powerpoint/2010/main" val="2921240958"/>
               </p:ext>
             </p:extLst>
           </p:nvPr>
         </p:nvGraphicFramePr>
         <p:xfrm>
-          <a:off x="10025469" y="2779847"/>
+          <a:off x="9103229" y="2897915"/>
           <a:ext cx="2067950" cy="1408460"/>
         </p:xfrm>
         <a:graphic>
@@ -11232,12 +10658,12 @@
                     <a:p>
                       <a:pPr algn="ctr"/>
                       <a:r>
-                        <a:rPr lang="en-US" altLang="ko-Kore-KR" sz="1100" dirty="0" err="1">
+                        <a:rPr lang="en-US" altLang="ko-Kore-KR" sz="1100" dirty="0">
                           <a:solidFill>
                             <a:srgbClr val="FF0000"/>
                           </a:solidFill>
                         </a:rPr>
-                        <a:t>proposal_detail_id</a:t>
+                        <a:t>id</a:t>
                       </a:r>
                       <a:endParaRPr lang="ko-Kore-KR" altLang="en-US" sz="1100" dirty="0">
                         <a:solidFill>
@@ -11775,14 +11201,14 @@
           <p:nvPr>
             <p:extLst>
               <p:ext uri="{D42A27DB-BD31-4B8C-83A1-F6EECF244321}">
-                <p14:modId xmlns:p14="http://schemas.microsoft.com/office/powerpoint/2010/main" val="3181171585"/>
+                <p14:modId xmlns:p14="http://schemas.microsoft.com/office/powerpoint/2010/main" val="3112240355"/>
               </p:ext>
             </p:extLst>
           </p:nvPr>
         </p:nvGraphicFramePr>
         <p:xfrm>
-          <a:off x="4784982" y="4420760"/>
-          <a:ext cx="2622036" cy="2258186"/>
+          <a:off x="7141890" y="4442767"/>
+          <a:ext cx="2026603" cy="2258186"/>
         </p:xfrm>
         <a:graphic>
           <a:graphicData uri="http://schemas.openxmlformats.org/drawingml/2006/table">
@@ -11791,14 +11217,14 @@
                 <a:tableStyleId>{5C22544A-7EE6-4342-B048-85BDC9FD1C3A}</a:tableStyleId>
               </a:tblPr>
               <a:tblGrid>
-                <a:gridCol w="1520750">
+                <a:gridCol w="831650">
                   <a:extLst>
                     <a:ext uri="{9D8B030D-6E8A-4147-A177-3AD203B41FA5}">
                       <a16:colId xmlns:a16="http://schemas.microsoft.com/office/drawing/2014/main" val="1113455329"/>
                     </a:ext>
                   </a:extLst>
                 </a:gridCol>
-                <a:gridCol w="1101286">
+                <a:gridCol w="1194953">
                   <a:extLst>
                     <a:ext uri="{9D8B030D-6E8A-4147-A177-3AD203B41FA5}">
                       <a16:colId xmlns:a16="http://schemas.microsoft.com/office/drawing/2014/main" val="717372469"/>
@@ -11930,12 +11356,12 @@
                     <a:p>
                       <a:pPr algn="ctr"/>
                       <a:r>
-                        <a:rPr lang="en-US" altLang="ko-Kore-KR" sz="1100" dirty="0" err="1">
+                        <a:rPr lang="en-US" altLang="ko-Kore-KR" sz="1100" dirty="0">
                           <a:solidFill>
                             <a:srgbClr val="FF0000"/>
                           </a:solidFill>
                         </a:rPr>
-                        <a:t>message_id</a:t>
+                        <a:t>id</a:t>
                       </a:r>
                       <a:endParaRPr lang="ko-Kore-KR" altLang="en-US" sz="1100" dirty="0">
                         <a:solidFill>
@@ -12451,7 +11877,7 @@
                             <a:schemeClr val="accent1"/>
                           </a:solidFill>
                         </a:rPr>
-                        <a:t>room_id</a:t>
+                        <a:t>post_id</a:t>
                       </a:r>
                       <a:endParaRPr lang="ko-Kore-KR" altLang="en-US" sz="1100" dirty="0">
                         <a:solidFill>
@@ -12581,6 +12007,1960 @@
                           </a:solidFill>
                         </a:rPr>
                         <a:t>user_id</a:t>
+                      </a:r>
+                      <a:endParaRPr lang="ko-Kore-KR" altLang="en-US" sz="1100" dirty="0">
+                        <a:solidFill>
+                          <a:schemeClr val="accent1"/>
+                        </a:solidFill>
+                      </a:endParaRPr>
+                    </a:p>
+                  </a:txBody>
+                  <a:tcPr anchor="ctr">
+                    <a:lnL w="12700" cap="flat" cmpd="sng" algn="ctr">
+                      <a:solidFill>
+                        <a:schemeClr val="tx1"/>
+                      </a:solidFill>
+                      <a:prstDash val="solid"/>
+                      <a:round/>
+                      <a:headEnd type="none" w="med" len="med"/>
+                      <a:tailEnd type="none" w="med" len="med"/>
+                    </a:lnL>
+                    <a:lnR w="12700" cap="flat" cmpd="sng" algn="ctr">
+                      <a:solidFill>
+                        <a:schemeClr val="tx1"/>
+                      </a:solidFill>
+                      <a:prstDash val="solid"/>
+                      <a:round/>
+                      <a:headEnd type="none" w="med" len="med"/>
+                      <a:tailEnd type="none" w="med" len="med"/>
+                    </a:lnR>
+                    <a:lnT w="12700" cap="flat" cmpd="sng" algn="ctr">
+                      <a:solidFill>
+                        <a:schemeClr val="tx1"/>
+                      </a:solidFill>
+                      <a:prstDash val="solid"/>
+                      <a:round/>
+                      <a:headEnd type="none" w="med" len="med"/>
+                      <a:tailEnd type="none" w="med" len="med"/>
+                    </a:lnT>
+                    <a:lnB w="12700" cap="flat" cmpd="sng" algn="ctr">
+                      <a:solidFill>
+                        <a:schemeClr val="tx1"/>
+                      </a:solidFill>
+                      <a:prstDash val="solid"/>
+                      <a:round/>
+                      <a:headEnd type="none" w="med" len="med"/>
+                      <a:tailEnd type="none" w="med" len="med"/>
+                    </a:lnB>
+                    <a:noFill/>
+                  </a:tcPr>
+                </a:tc>
+                <a:tc>
+                  <a:txBody>
+                    <a:bodyPr/>
+                    <a:lstStyle/>
+                    <a:p>
+                      <a:pPr algn="ctr"/>
+                      <a:r>
+                        <a:rPr lang="en-US" altLang="ko-Kore-KR" sz="1100" dirty="0">
+                          <a:solidFill>
+                            <a:schemeClr val="accent1"/>
+                          </a:solidFill>
+                        </a:rPr>
+                        <a:t>Long(FK)</a:t>
+                      </a:r>
+                      <a:endParaRPr lang="ko-Kore-KR" altLang="en-US" sz="1100" dirty="0">
+                        <a:solidFill>
+                          <a:schemeClr val="accent1"/>
+                        </a:solidFill>
+                      </a:endParaRPr>
+                    </a:p>
+                  </a:txBody>
+                  <a:tcPr anchor="ctr">
+                    <a:lnL w="12700" cap="flat" cmpd="sng" algn="ctr">
+                      <a:solidFill>
+                        <a:schemeClr val="tx1"/>
+                      </a:solidFill>
+                      <a:prstDash val="solid"/>
+                      <a:round/>
+                      <a:headEnd type="none" w="med" len="med"/>
+                      <a:tailEnd type="none" w="med" len="med"/>
+                    </a:lnL>
+                    <a:lnR w="12700" cap="flat" cmpd="sng" algn="ctr">
+                      <a:solidFill>
+                        <a:schemeClr val="tx1"/>
+                      </a:solidFill>
+                      <a:prstDash val="solid"/>
+                      <a:round/>
+                      <a:headEnd type="none" w="med" len="med"/>
+                      <a:tailEnd type="none" w="med" len="med"/>
+                    </a:lnR>
+                    <a:lnT w="12700" cap="flat" cmpd="sng" algn="ctr">
+                      <a:solidFill>
+                        <a:schemeClr val="tx1"/>
+                      </a:solidFill>
+                      <a:prstDash val="solid"/>
+                      <a:round/>
+                      <a:headEnd type="none" w="med" len="med"/>
+                      <a:tailEnd type="none" w="med" len="med"/>
+                    </a:lnT>
+                    <a:lnB w="12700" cap="flat" cmpd="sng" algn="ctr">
+                      <a:solidFill>
+                        <a:schemeClr val="tx1"/>
+                      </a:solidFill>
+                      <a:prstDash val="solid"/>
+                      <a:round/>
+                      <a:headEnd type="none" w="med" len="med"/>
+                      <a:tailEnd type="none" w="med" len="med"/>
+                    </a:lnB>
+                    <a:noFill/>
+                  </a:tcPr>
+                </a:tc>
+                <a:extLst>
+                  <a:ext uri="{0D108BD9-81ED-4DB2-BD59-A6C34878D82A}">
+                    <a16:rowId xmlns:a16="http://schemas.microsoft.com/office/drawing/2014/main" val="1990906237"/>
+                  </a:ext>
+                </a:extLst>
+              </a:tr>
+            </a:tbl>
+          </a:graphicData>
+        </a:graphic>
+      </p:graphicFrame>
+      <p:graphicFrame>
+        <p:nvGraphicFramePr>
+          <p:cNvPr id="2" name="표 1">
+            <a:extLst>
+              <a:ext uri="{FF2B5EF4-FFF2-40B4-BE49-F238E27FC236}">
+                <a16:creationId xmlns:a16="http://schemas.microsoft.com/office/drawing/2014/main" id="{30620D5F-CBA5-4FA6-DC6A-546FA4DE484E}"/>
+              </a:ext>
+            </a:extLst>
+          </p:cNvPr>
+          <p:cNvGraphicFramePr>
+            <a:graphicFrameLocks noGrp="1"/>
+          </p:cNvGraphicFramePr>
+          <p:nvPr>
+            <p:extLst>
+              <p:ext uri="{D42A27DB-BD31-4B8C-83A1-F6EECF244321}">
+                <p14:modId xmlns:p14="http://schemas.microsoft.com/office/powerpoint/2010/main" val="3025995603"/>
+              </p:ext>
+            </p:extLst>
+          </p:nvPr>
+        </p:nvGraphicFramePr>
+        <p:xfrm>
+          <a:off x="33983" y="932010"/>
+          <a:ext cx="1666641" cy="777240"/>
+        </p:xfrm>
+        <a:graphic>
+          <a:graphicData uri="http://schemas.openxmlformats.org/drawingml/2006/table">
+            <a:tbl>
+              <a:tblPr firstRow="1" bandRow="1">
+                <a:tableStyleId>{5C22544A-7EE6-4342-B048-85BDC9FD1C3A}</a:tableStyleId>
+              </a:tblPr>
+              <a:tblGrid>
+                <a:gridCol w="769579">
+                  <a:extLst>
+                    <a:ext uri="{9D8B030D-6E8A-4147-A177-3AD203B41FA5}">
+                      <a16:colId xmlns:a16="http://schemas.microsoft.com/office/drawing/2014/main" val="3110379304"/>
+                    </a:ext>
+                  </a:extLst>
+                </a:gridCol>
+                <a:gridCol w="897062">
+                  <a:extLst>
+                    <a:ext uri="{9D8B030D-6E8A-4147-A177-3AD203B41FA5}">
+                      <a16:colId xmlns:a16="http://schemas.microsoft.com/office/drawing/2014/main" val="844731228"/>
+                    </a:ext>
+                  </a:extLst>
+                </a:gridCol>
+              </a:tblGrid>
+              <a:tr h="248316">
+                <a:tc gridSpan="2">
+                  <a:txBody>
+                    <a:bodyPr/>
+                    <a:lstStyle/>
+                    <a:p>
+                      <a:pPr algn="ctr"/>
+                      <a:r>
+                        <a:rPr lang="en-US" altLang="ko-Kore-KR" sz="1100" dirty="0" err="1">
+                          <a:solidFill>
+                            <a:schemeClr val="tx1"/>
+                          </a:solidFill>
+                        </a:rPr>
+                        <a:t>naver</a:t>
+                      </a:r>
+                      <a:endParaRPr lang="ko-Kore-KR" altLang="en-US" sz="1100" dirty="0">
+                        <a:solidFill>
+                          <a:schemeClr val="tx1"/>
+                        </a:solidFill>
+                      </a:endParaRPr>
+                    </a:p>
+                  </a:txBody>
+                  <a:tcPr anchor="ctr">
+                    <a:lnL w="12700" cap="flat" cmpd="sng" algn="ctr">
+                      <a:solidFill>
+                        <a:schemeClr val="tx1"/>
+                      </a:solidFill>
+                      <a:prstDash val="solid"/>
+                      <a:round/>
+                      <a:headEnd type="none" w="med" len="med"/>
+                      <a:tailEnd type="none" w="med" len="med"/>
+                    </a:lnL>
+                    <a:lnR w="12700" cap="flat" cmpd="sng" algn="ctr">
+                      <a:solidFill>
+                        <a:schemeClr val="tx1"/>
+                      </a:solidFill>
+                      <a:prstDash val="solid"/>
+                      <a:round/>
+                      <a:headEnd type="none" w="med" len="med"/>
+                      <a:tailEnd type="none" w="med" len="med"/>
+                    </a:lnR>
+                    <a:lnT w="12700" cap="flat" cmpd="sng" algn="ctr">
+                      <a:solidFill>
+                        <a:schemeClr val="tx1"/>
+                      </a:solidFill>
+                      <a:prstDash val="solid"/>
+                      <a:round/>
+                      <a:headEnd type="none" w="med" len="med"/>
+                      <a:tailEnd type="none" w="med" len="med"/>
+                    </a:lnT>
+                    <a:lnB w="12700" cap="flat" cmpd="sng" algn="ctr">
+                      <a:solidFill>
+                        <a:schemeClr val="tx1"/>
+                      </a:solidFill>
+                      <a:prstDash val="solid"/>
+                      <a:round/>
+                      <a:headEnd type="none" w="med" len="med"/>
+                      <a:tailEnd type="none" w="med" len="med"/>
+                    </a:lnB>
+                    <a:noFill/>
+                  </a:tcPr>
+                </a:tc>
+                <a:tc hMerge="1">
+                  <a:txBody>
+                    <a:bodyPr/>
+                    <a:lstStyle/>
+                    <a:p>
+                      <a:endParaRPr lang="ko-Kore-KR" altLang="en-US" dirty="0"/>
+                    </a:p>
+                  </a:txBody>
+                  <a:tcPr>
+                    <a:lnL w="12700" cap="flat" cmpd="sng" algn="ctr">
+                      <a:solidFill>
+                        <a:schemeClr val="tx1"/>
+                      </a:solidFill>
+                      <a:prstDash val="solid"/>
+                      <a:round/>
+                      <a:headEnd type="none" w="med" len="med"/>
+                      <a:tailEnd type="none" w="med" len="med"/>
+                    </a:lnL>
+                    <a:lnR w="12700" cap="flat" cmpd="sng" algn="ctr">
+                      <a:solidFill>
+                        <a:schemeClr val="tx1"/>
+                      </a:solidFill>
+                      <a:prstDash val="solid"/>
+                      <a:round/>
+                      <a:headEnd type="none" w="med" len="med"/>
+                      <a:tailEnd type="none" w="med" len="med"/>
+                    </a:lnR>
+                    <a:lnT w="12700" cap="flat" cmpd="sng" algn="ctr">
+                      <a:solidFill>
+                        <a:schemeClr val="tx1"/>
+                      </a:solidFill>
+                      <a:prstDash val="solid"/>
+                      <a:round/>
+                      <a:headEnd type="none" w="med" len="med"/>
+                      <a:tailEnd type="none" w="med" len="med"/>
+                    </a:lnT>
+                    <a:lnB w="12700" cap="flat" cmpd="sng" algn="ctr">
+                      <a:solidFill>
+                        <a:schemeClr val="tx1"/>
+                      </a:solidFill>
+                      <a:prstDash val="solid"/>
+                      <a:round/>
+                      <a:headEnd type="none" w="med" len="med"/>
+                      <a:tailEnd type="none" w="med" len="med"/>
+                    </a:lnB>
+                    <a:noFill/>
+                  </a:tcPr>
+                </a:tc>
+                <a:extLst>
+                  <a:ext uri="{0D108BD9-81ED-4DB2-BD59-A6C34878D82A}">
+                    <a16:rowId xmlns:a16="http://schemas.microsoft.com/office/drawing/2014/main" val="2470267593"/>
+                  </a:ext>
+                </a:extLst>
+              </a:tr>
+              <a:tr h="248316">
+                <a:tc>
+                  <a:txBody>
+                    <a:bodyPr/>
+                    <a:lstStyle/>
+                    <a:p>
+                      <a:pPr algn="ctr"/>
+                      <a:r>
+                        <a:rPr lang="en-US" altLang="ko-Kore-KR" sz="1100" dirty="0">
+                          <a:solidFill>
+                            <a:srgbClr val="FF0000"/>
+                          </a:solidFill>
+                        </a:rPr>
+                        <a:t>id</a:t>
+                      </a:r>
+                      <a:endParaRPr lang="ko-Kore-KR" altLang="en-US" sz="1100" dirty="0">
+                        <a:solidFill>
+                          <a:srgbClr val="FF0000"/>
+                        </a:solidFill>
+                      </a:endParaRPr>
+                    </a:p>
+                  </a:txBody>
+                  <a:tcPr anchor="ctr">
+                    <a:lnL w="12700" cap="flat" cmpd="sng" algn="ctr">
+                      <a:solidFill>
+                        <a:schemeClr val="tx1"/>
+                      </a:solidFill>
+                      <a:prstDash val="solid"/>
+                      <a:round/>
+                      <a:headEnd type="none" w="med" len="med"/>
+                      <a:tailEnd type="none" w="med" len="med"/>
+                    </a:lnL>
+                    <a:lnR w="12700" cap="flat" cmpd="sng" algn="ctr">
+                      <a:solidFill>
+                        <a:schemeClr val="tx1"/>
+                      </a:solidFill>
+                      <a:prstDash val="solid"/>
+                      <a:round/>
+                      <a:headEnd type="none" w="med" len="med"/>
+                      <a:tailEnd type="none" w="med" len="med"/>
+                    </a:lnR>
+                    <a:lnT w="12700" cap="flat" cmpd="sng" algn="ctr">
+                      <a:solidFill>
+                        <a:schemeClr val="tx1"/>
+                      </a:solidFill>
+                      <a:prstDash val="solid"/>
+                      <a:round/>
+                      <a:headEnd type="none" w="med" len="med"/>
+                      <a:tailEnd type="none" w="med" len="med"/>
+                    </a:lnT>
+                    <a:lnB w="12700" cap="flat" cmpd="sng" algn="ctr">
+                      <a:solidFill>
+                        <a:schemeClr val="tx1"/>
+                      </a:solidFill>
+                      <a:prstDash val="solid"/>
+                      <a:round/>
+                      <a:headEnd type="none" w="med" len="med"/>
+                      <a:tailEnd type="none" w="med" len="med"/>
+                    </a:lnB>
+                    <a:noFill/>
+                  </a:tcPr>
+                </a:tc>
+                <a:tc>
+                  <a:txBody>
+                    <a:bodyPr/>
+                    <a:lstStyle/>
+                    <a:p>
+                      <a:pPr algn="ctr"/>
+                      <a:r>
+                        <a:rPr lang="en-US" altLang="ko-Kore-KR" sz="1100" dirty="0">
+                          <a:solidFill>
+                            <a:srgbClr val="FF0000"/>
+                          </a:solidFill>
+                        </a:rPr>
+                        <a:t>Long(PK, FK)</a:t>
+                      </a:r>
+                      <a:endParaRPr lang="ko-Kore-KR" altLang="en-US" sz="1100" dirty="0">
+                        <a:solidFill>
+                          <a:srgbClr val="FF0000"/>
+                        </a:solidFill>
+                      </a:endParaRPr>
+                    </a:p>
+                  </a:txBody>
+                  <a:tcPr anchor="ctr">
+                    <a:lnL w="12700" cap="flat" cmpd="sng" algn="ctr">
+                      <a:solidFill>
+                        <a:schemeClr val="tx1"/>
+                      </a:solidFill>
+                      <a:prstDash val="solid"/>
+                      <a:round/>
+                      <a:headEnd type="none" w="med" len="med"/>
+                      <a:tailEnd type="none" w="med" len="med"/>
+                    </a:lnL>
+                    <a:lnR w="12700" cap="flat" cmpd="sng" algn="ctr">
+                      <a:solidFill>
+                        <a:schemeClr val="tx1"/>
+                      </a:solidFill>
+                      <a:prstDash val="solid"/>
+                      <a:round/>
+                      <a:headEnd type="none" w="med" len="med"/>
+                      <a:tailEnd type="none" w="med" len="med"/>
+                    </a:lnR>
+                    <a:lnT w="12700" cap="flat" cmpd="sng" algn="ctr">
+                      <a:solidFill>
+                        <a:schemeClr val="tx1"/>
+                      </a:solidFill>
+                      <a:prstDash val="solid"/>
+                      <a:round/>
+                      <a:headEnd type="none" w="med" len="med"/>
+                      <a:tailEnd type="none" w="med" len="med"/>
+                    </a:lnT>
+                    <a:lnB w="12700" cap="flat" cmpd="sng" algn="ctr">
+                      <a:solidFill>
+                        <a:schemeClr val="tx1"/>
+                      </a:solidFill>
+                      <a:prstDash val="solid"/>
+                      <a:round/>
+                      <a:headEnd type="none" w="med" len="med"/>
+                      <a:tailEnd type="none" w="med" len="med"/>
+                    </a:lnB>
+                    <a:noFill/>
+                  </a:tcPr>
+                </a:tc>
+                <a:extLst>
+                  <a:ext uri="{0D108BD9-81ED-4DB2-BD59-A6C34878D82A}">
+                    <a16:rowId xmlns:a16="http://schemas.microsoft.com/office/drawing/2014/main" val="198366152"/>
+                  </a:ext>
+                </a:extLst>
+              </a:tr>
+              <a:tr h="248316">
+                <a:tc>
+                  <a:txBody>
+                    <a:bodyPr/>
+                    <a:lstStyle/>
+                    <a:p>
+                      <a:pPr algn="ctr"/>
+                      <a:r>
+                        <a:rPr lang="en-US" altLang="ko-Kore-KR" sz="1100" dirty="0" err="1">
+                          <a:solidFill>
+                            <a:schemeClr val="tx1"/>
+                          </a:solidFill>
+                        </a:rPr>
+                        <a:t>naver_id</a:t>
+                      </a:r>
+                      <a:endParaRPr lang="ko-Kore-KR" altLang="en-US" sz="1100" dirty="0">
+                        <a:solidFill>
+                          <a:schemeClr val="tx1"/>
+                        </a:solidFill>
+                      </a:endParaRPr>
+                    </a:p>
+                  </a:txBody>
+                  <a:tcPr anchor="ctr">
+                    <a:lnL w="12700" cap="flat" cmpd="sng" algn="ctr">
+                      <a:solidFill>
+                        <a:schemeClr val="tx1"/>
+                      </a:solidFill>
+                      <a:prstDash val="solid"/>
+                      <a:round/>
+                      <a:headEnd type="none" w="med" len="med"/>
+                      <a:tailEnd type="none" w="med" len="med"/>
+                    </a:lnL>
+                    <a:lnR w="12700" cap="flat" cmpd="sng" algn="ctr">
+                      <a:solidFill>
+                        <a:schemeClr val="tx1"/>
+                      </a:solidFill>
+                      <a:prstDash val="solid"/>
+                      <a:round/>
+                      <a:headEnd type="none" w="med" len="med"/>
+                      <a:tailEnd type="none" w="med" len="med"/>
+                    </a:lnR>
+                    <a:lnT w="12700" cap="flat" cmpd="sng" algn="ctr">
+                      <a:solidFill>
+                        <a:schemeClr val="tx1"/>
+                      </a:solidFill>
+                      <a:prstDash val="solid"/>
+                      <a:round/>
+                      <a:headEnd type="none" w="med" len="med"/>
+                      <a:tailEnd type="none" w="med" len="med"/>
+                    </a:lnT>
+                    <a:lnB w="12700" cap="flat" cmpd="sng" algn="ctr">
+                      <a:solidFill>
+                        <a:schemeClr val="tx1"/>
+                      </a:solidFill>
+                      <a:prstDash val="solid"/>
+                      <a:round/>
+                      <a:headEnd type="none" w="med" len="med"/>
+                      <a:tailEnd type="none" w="med" len="med"/>
+                    </a:lnB>
+                    <a:noFill/>
+                  </a:tcPr>
+                </a:tc>
+                <a:tc>
+                  <a:txBody>
+                    <a:bodyPr/>
+                    <a:lstStyle/>
+                    <a:p>
+                      <a:pPr algn="ctr"/>
+                      <a:r>
+                        <a:rPr lang="en-US" altLang="ko-Kore-KR" sz="1100" dirty="0">
+                          <a:solidFill>
+                            <a:schemeClr val="tx1"/>
+                          </a:solidFill>
+                        </a:rPr>
+                        <a:t>String</a:t>
+                      </a:r>
+                      <a:endParaRPr lang="ko-Kore-KR" altLang="en-US" sz="1100" dirty="0">
+                        <a:solidFill>
+                          <a:schemeClr val="tx1"/>
+                        </a:solidFill>
+                      </a:endParaRPr>
+                    </a:p>
+                  </a:txBody>
+                  <a:tcPr anchor="ctr">
+                    <a:lnL w="12700" cap="flat" cmpd="sng" algn="ctr">
+                      <a:solidFill>
+                        <a:schemeClr val="tx1"/>
+                      </a:solidFill>
+                      <a:prstDash val="solid"/>
+                      <a:round/>
+                      <a:headEnd type="none" w="med" len="med"/>
+                      <a:tailEnd type="none" w="med" len="med"/>
+                    </a:lnL>
+                    <a:lnR w="12700" cap="flat" cmpd="sng" algn="ctr">
+                      <a:solidFill>
+                        <a:schemeClr val="tx1"/>
+                      </a:solidFill>
+                      <a:prstDash val="solid"/>
+                      <a:round/>
+                      <a:headEnd type="none" w="med" len="med"/>
+                      <a:tailEnd type="none" w="med" len="med"/>
+                    </a:lnR>
+                    <a:lnT w="12700" cap="flat" cmpd="sng" algn="ctr">
+                      <a:solidFill>
+                        <a:schemeClr val="tx1"/>
+                      </a:solidFill>
+                      <a:prstDash val="solid"/>
+                      <a:round/>
+                      <a:headEnd type="none" w="med" len="med"/>
+                      <a:tailEnd type="none" w="med" len="med"/>
+                    </a:lnT>
+                    <a:lnB w="12700" cap="flat" cmpd="sng" algn="ctr">
+                      <a:solidFill>
+                        <a:schemeClr val="tx1"/>
+                      </a:solidFill>
+                      <a:prstDash val="solid"/>
+                      <a:round/>
+                      <a:headEnd type="none" w="med" len="med"/>
+                      <a:tailEnd type="none" w="med" len="med"/>
+                    </a:lnB>
+                    <a:noFill/>
+                  </a:tcPr>
+                </a:tc>
+                <a:extLst>
+                  <a:ext uri="{0D108BD9-81ED-4DB2-BD59-A6C34878D82A}">
+                    <a16:rowId xmlns:a16="http://schemas.microsoft.com/office/drawing/2014/main" val="2811254085"/>
+                  </a:ext>
+                </a:extLst>
+              </a:tr>
+            </a:tbl>
+          </a:graphicData>
+        </a:graphic>
+      </p:graphicFrame>
+      <p:graphicFrame>
+        <p:nvGraphicFramePr>
+          <p:cNvPr id="3" name="표 2">
+            <a:extLst>
+              <a:ext uri="{FF2B5EF4-FFF2-40B4-BE49-F238E27FC236}">
+                <a16:creationId xmlns:a16="http://schemas.microsoft.com/office/drawing/2014/main" id="{3B4B1CA3-73EF-5D0E-28BD-95202BCDDBDE}"/>
+              </a:ext>
+            </a:extLst>
+          </p:cNvPr>
+          <p:cNvGraphicFramePr>
+            <a:graphicFrameLocks noGrp="1"/>
+          </p:cNvGraphicFramePr>
+          <p:nvPr>
+            <p:extLst>
+              <p:ext uri="{D42A27DB-BD31-4B8C-83A1-F6EECF244321}">
+                <p14:modId xmlns:p14="http://schemas.microsoft.com/office/powerpoint/2010/main" val="3796728104"/>
+              </p:ext>
+            </p:extLst>
+          </p:nvPr>
+        </p:nvGraphicFramePr>
+        <p:xfrm>
+          <a:off x="43654" y="1783730"/>
+          <a:ext cx="1666640" cy="777240"/>
+        </p:xfrm>
+        <a:graphic>
+          <a:graphicData uri="http://schemas.openxmlformats.org/drawingml/2006/table">
+            <a:tbl>
+              <a:tblPr firstRow="1" bandRow="1">
+                <a:tableStyleId>{5C22544A-7EE6-4342-B048-85BDC9FD1C3A}</a:tableStyleId>
+              </a:tblPr>
+              <a:tblGrid>
+                <a:gridCol w="769146">
+                  <a:extLst>
+                    <a:ext uri="{9D8B030D-6E8A-4147-A177-3AD203B41FA5}">
+                      <a16:colId xmlns:a16="http://schemas.microsoft.com/office/drawing/2014/main" val="3110379304"/>
+                    </a:ext>
+                  </a:extLst>
+                </a:gridCol>
+                <a:gridCol w="897494">
+                  <a:extLst>
+                    <a:ext uri="{9D8B030D-6E8A-4147-A177-3AD203B41FA5}">
+                      <a16:colId xmlns:a16="http://schemas.microsoft.com/office/drawing/2014/main" val="844731228"/>
+                    </a:ext>
+                  </a:extLst>
+                </a:gridCol>
+              </a:tblGrid>
+              <a:tr h="248316">
+                <a:tc gridSpan="2">
+                  <a:txBody>
+                    <a:bodyPr/>
+                    <a:lstStyle/>
+                    <a:p>
+                      <a:pPr algn="ctr"/>
+                      <a:r>
+                        <a:rPr lang="en-US" altLang="ko-Kore-KR" sz="1100" dirty="0">
+                          <a:solidFill>
+                            <a:schemeClr val="tx1"/>
+                          </a:solidFill>
+                        </a:rPr>
+                        <a:t>google</a:t>
+                      </a:r>
+                      <a:endParaRPr lang="ko-Kore-KR" altLang="en-US" sz="1100" dirty="0">
+                        <a:solidFill>
+                          <a:schemeClr val="tx1"/>
+                        </a:solidFill>
+                      </a:endParaRPr>
+                    </a:p>
+                  </a:txBody>
+                  <a:tcPr anchor="ctr">
+                    <a:lnL w="12700" cap="flat" cmpd="sng" algn="ctr">
+                      <a:solidFill>
+                        <a:schemeClr val="tx1"/>
+                      </a:solidFill>
+                      <a:prstDash val="solid"/>
+                      <a:round/>
+                      <a:headEnd type="none" w="med" len="med"/>
+                      <a:tailEnd type="none" w="med" len="med"/>
+                    </a:lnL>
+                    <a:lnR w="12700" cap="flat" cmpd="sng" algn="ctr">
+                      <a:solidFill>
+                        <a:schemeClr val="tx1"/>
+                      </a:solidFill>
+                      <a:prstDash val="solid"/>
+                      <a:round/>
+                      <a:headEnd type="none" w="med" len="med"/>
+                      <a:tailEnd type="none" w="med" len="med"/>
+                    </a:lnR>
+                    <a:lnT w="12700" cap="flat" cmpd="sng" algn="ctr">
+                      <a:solidFill>
+                        <a:schemeClr val="tx1"/>
+                      </a:solidFill>
+                      <a:prstDash val="solid"/>
+                      <a:round/>
+                      <a:headEnd type="none" w="med" len="med"/>
+                      <a:tailEnd type="none" w="med" len="med"/>
+                    </a:lnT>
+                    <a:lnB w="12700" cap="flat" cmpd="sng" algn="ctr">
+                      <a:solidFill>
+                        <a:schemeClr val="tx1"/>
+                      </a:solidFill>
+                      <a:prstDash val="solid"/>
+                      <a:round/>
+                      <a:headEnd type="none" w="med" len="med"/>
+                      <a:tailEnd type="none" w="med" len="med"/>
+                    </a:lnB>
+                    <a:noFill/>
+                  </a:tcPr>
+                </a:tc>
+                <a:tc hMerge="1">
+                  <a:txBody>
+                    <a:bodyPr/>
+                    <a:lstStyle/>
+                    <a:p>
+                      <a:endParaRPr lang="ko-Kore-KR" altLang="en-US" dirty="0"/>
+                    </a:p>
+                  </a:txBody>
+                  <a:tcPr>
+                    <a:lnL w="12700" cap="flat" cmpd="sng" algn="ctr">
+                      <a:solidFill>
+                        <a:schemeClr val="tx1"/>
+                      </a:solidFill>
+                      <a:prstDash val="solid"/>
+                      <a:round/>
+                      <a:headEnd type="none" w="med" len="med"/>
+                      <a:tailEnd type="none" w="med" len="med"/>
+                    </a:lnL>
+                    <a:lnR w="12700" cap="flat" cmpd="sng" algn="ctr">
+                      <a:solidFill>
+                        <a:schemeClr val="tx1"/>
+                      </a:solidFill>
+                      <a:prstDash val="solid"/>
+                      <a:round/>
+                      <a:headEnd type="none" w="med" len="med"/>
+                      <a:tailEnd type="none" w="med" len="med"/>
+                    </a:lnR>
+                    <a:lnT w="12700" cap="flat" cmpd="sng" algn="ctr">
+                      <a:solidFill>
+                        <a:schemeClr val="tx1"/>
+                      </a:solidFill>
+                      <a:prstDash val="solid"/>
+                      <a:round/>
+                      <a:headEnd type="none" w="med" len="med"/>
+                      <a:tailEnd type="none" w="med" len="med"/>
+                    </a:lnT>
+                    <a:lnB w="12700" cap="flat" cmpd="sng" algn="ctr">
+                      <a:solidFill>
+                        <a:schemeClr val="tx1"/>
+                      </a:solidFill>
+                      <a:prstDash val="solid"/>
+                      <a:round/>
+                      <a:headEnd type="none" w="med" len="med"/>
+                      <a:tailEnd type="none" w="med" len="med"/>
+                    </a:lnB>
+                    <a:noFill/>
+                  </a:tcPr>
+                </a:tc>
+                <a:extLst>
+                  <a:ext uri="{0D108BD9-81ED-4DB2-BD59-A6C34878D82A}">
+                    <a16:rowId xmlns:a16="http://schemas.microsoft.com/office/drawing/2014/main" val="2470267593"/>
+                  </a:ext>
+                </a:extLst>
+              </a:tr>
+              <a:tr h="248316">
+                <a:tc>
+                  <a:txBody>
+                    <a:bodyPr/>
+                    <a:lstStyle/>
+                    <a:p>
+                      <a:pPr algn="ctr"/>
+                      <a:r>
+                        <a:rPr lang="en-US" altLang="ko-Kore-KR" sz="1100" dirty="0">
+                          <a:solidFill>
+                            <a:srgbClr val="FF0000"/>
+                          </a:solidFill>
+                        </a:rPr>
+                        <a:t>id</a:t>
+                      </a:r>
+                      <a:endParaRPr lang="ko-Kore-KR" altLang="en-US" sz="1100" dirty="0">
+                        <a:solidFill>
+                          <a:srgbClr val="FF0000"/>
+                        </a:solidFill>
+                      </a:endParaRPr>
+                    </a:p>
+                  </a:txBody>
+                  <a:tcPr anchor="ctr">
+                    <a:lnL w="12700" cap="flat" cmpd="sng" algn="ctr">
+                      <a:solidFill>
+                        <a:schemeClr val="tx1"/>
+                      </a:solidFill>
+                      <a:prstDash val="solid"/>
+                      <a:round/>
+                      <a:headEnd type="none" w="med" len="med"/>
+                      <a:tailEnd type="none" w="med" len="med"/>
+                    </a:lnL>
+                    <a:lnR w="12700" cap="flat" cmpd="sng" algn="ctr">
+                      <a:solidFill>
+                        <a:schemeClr val="tx1"/>
+                      </a:solidFill>
+                      <a:prstDash val="solid"/>
+                      <a:round/>
+                      <a:headEnd type="none" w="med" len="med"/>
+                      <a:tailEnd type="none" w="med" len="med"/>
+                    </a:lnR>
+                    <a:lnT w="12700" cap="flat" cmpd="sng" algn="ctr">
+                      <a:solidFill>
+                        <a:schemeClr val="tx1"/>
+                      </a:solidFill>
+                      <a:prstDash val="solid"/>
+                      <a:round/>
+                      <a:headEnd type="none" w="med" len="med"/>
+                      <a:tailEnd type="none" w="med" len="med"/>
+                    </a:lnT>
+                    <a:lnB w="12700" cap="flat" cmpd="sng" algn="ctr">
+                      <a:solidFill>
+                        <a:schemeClr val="tx1"/>
+                      </a:solidFill>
+                      <a:prstDash val="solid"/>
+                      <a:round/>
+                      <a:headEnd type="none" w="med" len="med"/>
+                      <a:tailEnd type="none" w="med" len="med"/>
+                    </a:lnB>
+                    <a:noFill/>
+                  </a:tcPr>
+                </a:tc>
+                <a:tc>
+                  <a:txBody>
+                    <a:bodyPr/>
+                    <a:lstStyle/>
+                    <a:p>
+                      <a:pPr algn="ctr"/>
+                      <a:r>
+                        <a:rPr lang="en-US" altLang="ko-Kore-KR" sz="1100" dirty="0">
+                          <a:solidFill>
+                            <a:srgbClr val="FF0000"/>
+                          </a:solidFill>
+                        </a:rPr>
+                        <a:t>Long(PK, FK)</a:t>
+                      </a:r>
+                      <a:endParaRPr lang="ko-Kore-KR" altLang="en-US" sz="1100" dirty="0">
+                        <a:solidFill>
+                          <a:srgbClr val="FF0000"/>
+                        </a:solidFill>
+                      </a:endParaRPr>
+                    </a:p>
+                  </a:txBody>
+                  <a:tcPr anchor="ctr">
+                    <a:lnL w="12700" cap="flat" cmpd="sng" algn="ctr">
+                      <a:solidFill>
+                        <a:schemeClr val="tx1"/>
+                      </a:solidFill>
+                      <a:prstDash val="solid"/>
+                      <a:round/>
+                      <a:headEnd type="none" w="med" len="med"/>
+                      <a:tailEnd type="none" w="med" len="med"/>
+                    </a:lnL>
+                    <a:lnR w="12700" cap="flat" cmpd="sng" algn="ctr">
+                      <a:solidFill>
+                        <a:schemeClr val="tx1"/>
+                      </a:solidFill>
+                      <a:prstDash val="solid"/>
+                      <a:round/>
+                      <a:headEnd type="none" w="med" len="med"/>
+                      <a:tailEnd type="none" w="med" len="med"/>
+                    </a:lnR>
+                    <a:lnT w="12700" cap="flat" cmpd="sng" algn="ctr">
+                      <a:solidFill>
+                        <a:schemeClr val="tx1"/>
+                      </a:solidFill>
+                      <a:prstDash val="solid"/>
+                      <a:round/>
+                      <a:headEnd type="none" w="med" len="med"/>
+                      <a:tailEnd type="none" w="med" len="med"/>
+                    </a:lnT>
+                    <a:lnB w="12700" cap="flat" cmpd="sng" algn="ctr">
+                      <a:solidFill>
+                        <a:schemeClr val="tx1"/>
+                      </a:solidFill>
+                      <a:prstDash val="solid"/>
+                      <a:round/>
+                      <a:headEnd type="none" w="med" len="med"/>
+                      <a:tailEnd type="none" w="med" len="med"/>
+                    </a:lnB>
+                    <a:noFill/>
+                  </a:tcPr>
+                </a:tc>
+                <a:extLst>
+                  <a:ext uri="{0D108BD9-81ED-4DB2-BD59-A6C34878D82A}">
+                    <a16:rowId xmlns:a16="http://schemas.microsoft.com/office/drawing/2014/main" val="198366152"/>
+                  </a:ext>
+                </a:extLst>
+              </a:tr>
+              <a:tr h="248316">
+                <a:tc>
+                  <a:txBody>
+                    <a:bodyPr/>
+                    <a:lstStyle/>
+                    <a:p>
+                      <a:pPr algn="ctr"/>
+                      <a:r>
+                        <a:rPr lang="en-US" altLang="ko-Kore-KR" sz="1100" dirty="0" err="1">
+                          <a:solidFill>
+                            <a:schemeClr val="tx1"/>
+                          </a:solidFill>
+                        </a:rPr>
+                        <a:t>google_id</a:t>
+                      </a:r>
+                      <a:endParaRPr lang="ko-Kore-KR" altLang="en-US" sz="1100" dirty="0">
+                        <a:solidFill>
+                          <a:schemeClr val="tx1"/>
+                        </a:solidFill>
+                      </a:endParaRPr>
+                    </a:p>
+                  </a:txBody>
+                  <a:tcPr anchor="ctr">
+                    <a:lnL w="12700" cap="flat" cmpd="sng" algn="ctr">
+                      <a:solidFill>
+                        <a:schemeClr val="tx1"/>
+                      </a:solidFill>
+                      <a:prstDash val="solid"/>
+                      <a:round/>
+                      <a:headEnd type="none" w="med" len="med"/>
+                      <a:tailEnd type="none" w="med" len="med"/>
+                    </a:lnL>
+                    <a:lnR w="12700" cap="flat" cmpd="sng" algn="ctr">
+                      <a:solidFill>
+                        <a:schemeClr val="tx1"/>
+                      </a:solidFill>
+                      <a:prstDash val="solid"/>
+                      <a:round/>
+                      <a:headEnd type="none" w="med" len="med"/>
+                      <a:tailEnd type="none" w="med" len="med"/>
+                    </a:lnR>
+                    <a:lnT w="12700" cap="flat" cmpd="sng" algn="ctr">
+                      <a:solidFill>
+                        <a:schemeClr val="tx1"/>
+                      </a:solidFill>
+                      <a:prstDash val="solid"/>
+                      <a:round/>
+                      <a:headEnd type="none" w="med" len="med"/>
+                      <a:tailEnd type="none" w="med" len="med"/>
+                    </a:lnT>
+                    <a:lnB w="12700" cap="flat" cmpd="sng" algn="ctr">
+                      <a:solidFill>
+                        <a:schemeClr val="tx1"/>
+                      </a:solidFill>
+                      <a:prstDash val="solid"/>
+                      <a:round/>
+                      <a:headEnd type="none" w="med" len="med"/>
+                      <a:tailEnd type="none" w="med" len="med"/>
+                    </a:lnB>
+                    <a:noFill/>
+                  </a:tcPr>
+                </a:tc>
+                <a:tc>
+                  <a:txBody>
+                    <a:bodyPr/>
+                    <a:lstStyle/>
+                    <a:p>
+                      <a:pPr algn="ctr"/>
+                      <a:r>
+                        <a:rPr lang="en-US" altLang="ko-Kore-KR" sz="1100" dirty="0">
+                          <a:solidFill>
+                            <a:schemeClr val="tx1"/>
+                          </a:solidFill>
+                        </a:rPr>
+                        <a:t>String</a:t>
+                      </a:r>
+                      <a:endParaRPr lang="ko-Kore-KR" altLang="en-US" sz="1100" dirty="0">
+                        <a:solidFill>
+                          <a:schemeClr val="tx1"/>
+                        </a:solidFill>
+                      </a:endParaRPr>
+                    </a:p>
+                  </a:txBody>
+                  <a:tcPr anchor="ctr">
+                    <a:lnL w="12700" cap="flat" cmpd="sng" algn="ctr">
+                      <a:solidFill>
+                        <a:schemeClr val="tx1"/>
+                      </a:solidFill>
+                      <a:prstDash val="solid"/>
+                      <a:round/>
+                      <a:headEnd type="none" w="med" len="med"/>
+                      <a:tailEnd type="none" w="med" len="med"/>
+                    </a:lnL>
+                    <a:lnR w="12700" cap="flat" cmpd="sng" algn="ctr">
+                      <a:solidFill>
+                        <a:schemeClr val="tx1"/>
+                      </a:solidFill>
+                      <a:prstDash val="solid"/>
+                      <a:round/>
+                      <a:headEnd type="none" w="med" len="med"/>
+                      <a:tailEnd type="none" w="med" len="med"/>
+                    </a:lnR>
+                    <a:lnT w="12700" cap="flat" cmpd="sng" algn="ctr">
+                      <a:solidFill>
+                        <a:schemeClr val="tx1"/>
+                      </a:solidFill>
+                      <a:prstDash val="solid"/>
+                      <a:round/>
+                      <a:headEnd type="none" w="med" len="med"/>
+                      <a:tailEnd type="none" w="med" len="med"/>
+                    </a:lnT>
+                    <a:lnB w="12700" cap="flat" cmpd="sng" algn="ctr">
+                      <a:solidFill>
+                        <a:schemeClr val="tx1"/>
+                      </a:solidFill>
+                      <a:prstDash val="solid"/>
+                      <a:round/>
+                      <a:headEnd type="none" w="med" len="med"/>
+                      <a:tailEnd type="none" w="med" len="med"/>
+                    </a:lnB>
+                    <a:noFill/>
+                  </a:tcPr>
+                </a:tc>
+                <a:extLst>
+                  <a:ext uri="{0D108BD9-81ED-4DB2-BD59-A6C34878D82A}">
+                    <a16:rowId xmlns:a16="http://schemas.microsoft.com/office/drawing/2014/main" val="2811254085"/>
+                  </a:ext>
+                </a:extLst>
+              </a:tr>
+            </a:tbl>
+          </a:graphicData>
+        </a:graphic>
+      </p:graphicFrame>
+      <p:graphicFrame>
+        <p:nvGraphicFramePr>
+          <p:cNvPr id="11" name="표 10">
+            <a:extLst>
+              <a:ext uri="{FF2B5EF4-FFF2-40B4-BE49-F238E27FC236}">
+                <a16:creationId xmlns:a16="http://schemas.microsoft.com/office/drawing/2014/main" id="{840402E9-C18A-6724-B1B8-A944CD13F8C1}"/>
+              </a:ext>
+            </a:extLst>
+          </p:cNvPr>
+          <p:cNvGraphicFramePr>
+            <a:graphicFrameLocks noGrp="1"/>
+          </p:cNvGraphicFramePr>
+          <p:nvPr>
+            <p:extLst>
+              <p:ext uri="{D42A27DB-BD31-4B8C-83A1-F6EECF244321}">
+                <p14:modId xmlns:p14="http://schemas.microsoft.com/office/powerpoint/2010/main" val="1284873696"/>
+              </p:ext>
+            </p:extLst>
+          </p:nvPr>
+        </p:nvGraphicFramePr>
+        <p:xfrm>
+          <a:off x="38818" y="2624300"/>
+          <a:ext cx="1656970" cy="777240"/>
+        </p:xfrm>
+        <a:graphic>
+          <a:graphicData uri="http://schemas.openxmlformats.org/drawingml/2006/table">
+            <a:tbl>
+              <a:tblPr firstRow="1" bandRow="1">
+                <a:tableStyleId>{5C22544A-7EE6-4342-B048-85BDC9FD1C3A}</a:tableStyleId>
+              </a:tblPr>
+              <a:tblGrid>
+                <a:gridCol w="765114">
+                  <a:extLst>
+                    <a:ext uri="{9D8B030D-6E8A-4147-A177-3AD203B41FA5}">
+                      <a16:colId xmlns:a16="http://schemas.microsoft.com/office/drawing/2014/main" val="3110379304"/>
+                    </a:ext>
+                  </a:extLst>
+                </a:gridCol>
+                <a:gridCol w="891856">
+                  <a:extLst>
+                    <a:ext uri="{9D8B030D-6E8A-4147-A177-3AD203B41FA5}">
+                      <a16:colId xmlns:a16="http://schemas.microsoft.com/office/drawing/2014/main" val="844731228"/>
+                    </a:ext>
+                  </a:extLst>
+                </a:gridCol>
+              </a:tblGrid>
+              <a:tr h="248316">
+                <a:tc gridSpan="2">
+                  <a:txBody>
+                    <a:bodyPr/>
+                    <a:lstStyle/>
+                    <a:p>
+                      <a:pPr algn="ctr"/>
+                      <a:r>
+                        <a:rPr lang="en-US" altLang="ko-Kore-KR" sz="1100" dirty="0">
+                          <a:solidFill>
+                            <a:schemeClr val="tx1"/>
+                          </a:solidFill>
+                        </a:rPr>
+                        <a:t>password</a:t>
+                      </a:r>
+                      <a:endParaRPr lang="ko-Kore-KR" altLang="en-US" sz="1100" dirty="0">
+                        <a:solidFill>
+                          <a:schemeClr val="tx1"/>
+                        </a:solidFill>
+                      </a:endParaRPr>
+                    </a:p>
+                  </a:txBody>
+                  <a:tcPr anchor="ctr">
+                    <a:lnL w="12700" cap="flat" cmpd="sng" algn="ctr">
+                      <a:solidFill>
+                        <a:schemeClr val="tx1"/>
+                      </a:solidFill>
+                      <a:prstDash val="solid"/>
+                      <a:round/>
+                      <a:headEnd type="none" w="med" len="med"/>
+                      <a:tailEnd type="none" w="med" len="med"/>
+                    </a:lnL>
+                    <a:lnR w="12700" cap="flat" cmpd="sng" algn="ctr">
+                      <a:solidFill>
+                        <a:schemeClr val="tx1"/>
+                      </a:solidFill>
+                      <a:prstDash val="solid"/>
+                      <a:round/>
+                      <a:headEnd type="none" w="med" len="med"/>
+                      <a:tailEnd type="none" w="med" len="med"/>
+                    </a:lnR>
+                    <a:lnT w="12700" cap="flat" cmpd="sng" algn="ctr">
+                      <a:solidFill>
+                        <a:schemeClr val="tx1"/>
+                      </a:solidFill>
+                      <a:prstDash val="solid"/>
+                      <a:round/>
+                      <a:headEnd type="none" w="med" len="med"/>
+                      <a:tailEnd type="none" w="med" len="med"/>
+                    </a:lnT>
+                    <a:lnB w="12700" cap="flat" cmpd="sng" algn="ctr">
+                      <a:solidFill>
+                        <a:schemeClr val="tx1"/>
+                      </a:solidFill>
+                      <a:prstDash val="solid"/>
+                      <a:round/>
+                      <a:headEnd type="none" w="med" len="med"/>
+                      <a:tailEnd type="none" w="med" len="med"/>
+                    </a:lnB>
+                    <a:noFill/>
+                  </a:tcPr>
+                </a:tc>
+                <a:tc hMerge="1">
+                  <a:txBody>
+                    <a:bodyPr/>
+                    <a:lstStyle/>
+                    <a:p>
+                      <a:endParaRPr lang="ko-Kore-KR" altLang="en-US" dirty="0"/>
+                    </a:p>
+                  </a:txBody>
+                  <a:tcPr>
+                    <a:lnL w="12700" cap="flat" cmpd="sng" algn="ctr">
+                      <a:solidFill>
+                        <a:schemeClr val="tx1"/>
+                      </a:solidFill>
+                      <a:prstDash val="solid"/>
+                      <a:round/>
+                      <a:headEnd type="none" w="med" len="med"/>
+                      <a:tailEnd type="none" w="med" len="med"/>
+                    </a:lnL>
+                    <a:lnR w="12700" cap="flat" cmpd="sng" algn="ctr">
+                      <a:solidFill>
+                        <a:schemeClr val="tx1"/>
+                      </a:solidFill>
+                      <a:prstDash val="solid"/>
+                      <a:round/>
+                      <a:headEnd type="none" w="med" len="med"/>
+                      <a:tailEnd type="none" w="med" len="med"/>
+                    </a:lnR>
+                    <a:lnT w="12700" cap="flat" cmpd="sng" algn="ctr">
+                      <a:solidFill>
+                        <a:schemeClr val="tx1"/>
+                      </a:solidFill>
+                      <a:prstDash val="solid"/>
+                      <a:round/>
+                      <a:headEnd type="none" w="med" len="med"/>
+                      <a:tailEnd type="none" w="med" len="med"/>
+                    </a:lnT>
+                    <a:lnB w="12700" cap="flat" cmpd="sng" algn="ctr">
+                      <a:solidFill>
+                        <a:schemeClr val="tx1"/>
+                      </a:solidFill>
+                      <a:prstDash val="solid"/>
+                      <a:round/>
+                      <a:headEnd type="none" w="med" len="med"/>
+                      <a:tailEnd type="none" w="med" len="med"/>
+                    </a:lnB>
+                    <a:noFill/>
+                  </a:tcPr>
+                </a:tc>
+                <a:extLst>
+                  <a:ext uri="{0D108BD9-81ED-4DB2-BD59-A6C34878D82A}">
+                    <a16:rowId xmlns:a16="http://schemas.microsoft.com/office/drawing/2014/main" val="2470267593"/>
+                  </a:ext>
+                </a:extLst>
+              </a:tr>
+              <a:tr h="248316">
+                <a:tc>
+                  <a:txBody>
+                    <a:bodyPr/>
+                    <a:lstStyle/>
+                    <a:p>
+                      <a:pPr algn="ctr"/>
+                      <a:r>
+                        <a:rPr lang="en-US" altLang="ko-Kore-KR" sz="1100" dirty="0">
+                          <a:solidFill>
+                            <a:srgbClr val="FF0000"/>
+                          </a:solidFill>
+                        </a:rPr>
+                        <a:t>id</a:t>
+                      </a:r>
+                      <a:endParaRPr lang="ko-Kore-KR" altLang="en-US" sz="1100" dirty="0">
+                        <a:solidFill>
+                          <a:srgbClr val="FF0000"/>
+                        </a:solidFill>
+                      </a:endParaRPr>
+                    </a:p>
+                  </a:txBody>
+                  <a:tcPr anchor="ctr">
+                    <a:lnL w="12700" cap="flat" cmpd="sng" algn="ctr">
+                      <a:solidFill>
+                        <a:schemeClr val="tx1"/>
+                      </a:solidFill>
+                      <a:prstDash val="solid"/>
+                      <a:round/>
+                      <a:headEnd type="none" w="med" len="med"/>
+                      <a:tailEnd type="none" w="med" len="med"/>
+                    </a:lnL>
+                    <a:lnR w="12700" cap="flat" cmpd="sng" algn="ctr">
+                      <a:solidFill>
+                        <a:schemeClr val="tx1"/>
+                      </a:solidFill>
+                      <a:prstDash val="solid"/>
+                      <a:round/>
+                      <a:headEnd type="none" w="med" len="med"/>
+                      <a:tailEnd type="none" w="med" len="med"/>
+                    </a:lnR>
+                    <a:lnT w="12700" cap="flat" cmpd="sng" algn="ctr">
+                      <a:solidFill>
+                        <a:schemeClr val="tx1"/>
+                      </a:solidFill>
+                      <a:prstDash val="solid"/>
+                      <a:round/>
+                      <a:headEnd type="none" w="med" len="med"/>
+                      <a:tailEnd type="none" w="med" len="med"/>
+                    </a:lnT>
+                    <a:lnB w="12700" cap="flat" cmpd="sng" algn="ctr">
+                      <a:solidFill>
+                        <a:schemeClr val="tx1"/>
+                      </a:solidFill>
+                      <a:prstDash val="solid"/>
+                      <a:round/>
+                      <a:headEnd type="none" w="med" len="med"/>
+                      <a:tailEnd type="none" w="med" len="med"/>
+                    </a:lnB>
+                    <a:noFill/>
+                  </a:tcPr>
+                </a:tc>
+                <a:tc>
+                  <a:txBody>
+                    <a:bodyPr/>
+                    <a:lstStyle/>
+                    <a:p>
+                      <a:pPr algn="ctr"/>
+                      <a:r>
+                        <a:rPr lang="en-US" altLang="ko-Kore-KR" sz="1100" dirty="0">
+                          <a:solidFill>
+                            <a:srgbClr val="FF0000"/>
+                          </a:solidFill>
+                        </a:rPr>
+                        <a:t>Long(PK, FK)</a:t>
+                      </a:r>
+                      <a:endParaRPr lang="ko-Kore-KR" altLang="en-US" sz="1100" dirty="0">
+                        <a:solidFill>
+                          <a:srgbClr val="FF0000"/>
+                        </a:solidFill>
+                      </a:endParaRPr>
+                    </a:p>
+                  </a:txBody>
+                  <a:tcPr anchor="ctr">
+                    <a:lnL w="12700" cap="flat" cmpd="sng" algn="ctr">
+                      <a:solidFill>
+                        <a:schemeClr val="tx1"/>
+                      </a:solidFill>
+                      <a:prstDash val="solid"/>
+                      <a:round/>
+                      <a:headEnd type="none" w="med" len="med"/>
+                      <a:tailEnd type="none" w="med" len="med"/>
+                    </a:lnL>
+                    <a:lnR w="12700" cap="flat" cmpd="sng" algn="ctr">
+                      <a:solidFill>
+                        <a:schemeClr val="tx1"/>
+                      </a:solidFill>
+                      <a:prstDash val="solid"/>
+                      <a:round/>
+                      <a:headEnd type="none" w="med" len="med"/>
+                      <a:tailEnd type="none" w="med" len="med"/>
+                    </a:lnR>
+                    <a:lnT w="12700" cap="flat" cmpd="sng" algn="ctr">
+                      <a:solidFill>
+                        <a:schemeClr val="tx1"/>
+                      </a:solidFill>
+                      <a:prstDash val="solid"/>
+                      <a:round/>
+                      <a:headEnd type="none" w="med" len="med"/>
+                      <a:tailEnd type="none" w="med" len="med"/>
+                    </a:lnT>
+                    <a:lnB w="12700" cap="flat" cmpd="sng" algn="ctr">
+                      <a:solidFill>
+                        <a:schemeClr val="tx1"/>
+                      </a:solidFill>
+                      <a:prstDash val="solid"/>
+                      <a:round/>
+                      <a:headEnd type="none" w="med" len="med"/>
+                      <a:tailEnd type="none" w="med" len="med"/>
+                    </a:lnB>
+                    <a:noFill/>
+                  </a:tcPr>
+                </a:tc>
+                <a:extLst>
+                  <a:ext uri="{0D108BD9-81ED-4DB2-BD59-A6C34878D82A}">
+                    <a16:rowId xmlns:a16="http://schemas.microsoft.com/office/drawing/2014/main" val="198366152"/>
+                  </a:ext>
+                </a:extLst>
+              </a:tr>
+              <a:tr h="248316">
+                <a:tc>
+                  <a:txBody>
+                    <a:bodyPr/>
+                    <a:lstStyle/>
+                    <a:p>
+                      <a:pPr algn="ctr"/>
+                      <a:r>
+                        <a:rPr lang="en-US" altLang="ko-Kore-KR" sz="1100" dirty="0">
+                          <a:solidFill>
+                            <a:schemeClr val="tx1"/>
+                          </a:solidFill>
+                        </a:rPr>
+                        <a:t>password</a:t>
+                      </a:r>
+                      <a:endParaRPr lang="ko-Kore-KR" altLang="en-US" sz="1100" dirty="0">
+                        <a:solidFill>
+                          <a:schemeClr val="tx1"/>
+                        </a:solidFill>
+                      </a:endParaRPr>
+                    </a:p>
+                  </a:txBody>
+                  <a:tcPr anchor="ctr">
+                    <a:lnL w="12700" cap="flat" cmpd="sng" algn="ctr">
+                      <a:solidFill>
+                        <a:schemeClr val="tx1"/>
+                      </a:solidFill>
+                      <a:prstDash val="solid"/>
+                      <a:round/>
+                      <a:headEnd type="none" w="med" len="med"/>
+                      <a:tailEnd type="none" w="med" len="med"/>
+                    </a:lnL>
+                    <a:lnR w="12700" cap="flat" cmpd="sng" algn="ctr">
+                      <a:solidFill>
+                        <a:schemeClr val="tx1"/>
+                      </a:solidFill>
+                      <a:prstDash val="solid"/>
+                      <a:round/>
+                      <a:headEnd type="none" w="med" len="med"/>
+                      <a:tailEnd type="none" w="med" len="med"/>
+                    </a:lnR>
+                    <a:lnT w="12700" cap="flat" cmpd="sng" algn="ctr">
+                      <a:solidFill>
+                        <a:schemeClr val="tx1"/>
+                      </a:solidFill>
+                      <a:prstDash val="solid"/>
+                      <a:round/>
+                      <a:headEnd type="none" w="med" len="med"/>
+                      <a:tailEnd type="none" w="med" len="med"/>
+                    </a:lnT>
+                    <a:lnB w="12700" cap="flat" cmpd="sng" algn="ctr">
+                      <a:solidFill>
+                        <a:schemeClr val="tx1"/>
+                      </a:solidFill>
+                      <a:prstDash val="solid"/>
+                      <a:round/>
+                      <a:headEnd type="none" w="med" len="med"/>
+                      <a:tailEnd type="none" w="med" len="med"/>
+                    </a:lnB>
+                    <a:noFill/>
+                  </a:tcPr>
+                </a:tc>
+                <a:tc>
+                  <a:txBody>
+                    <a:bodyPr/>
+                    <a:lstStyle/>
+                    <a:p>
+                      <a:pPr algn="ctr"/>
+                      <a:r>
+                        <a:rPr lang="en-US" altLang="ko-Kore-KR" sz="1100" dirty="0">
+                          <a:solidFill>
+                            <a:schemeClr val="tx1"/>
+                          </a:solidFill>
+                        </a:rPr>
+                        <a:t>String</a:t>
+                      </a:r>
+                      <a:endParaRPr lang="ko-Kore-KR" altLang="en-US" sz="1100" dirty="0">
+                        <a:solidFill>
+                          <a:schemeClr val="tx1"/>
+                        </a:solidFill>
+                      </a:endParaRPr>
+                    </a:p>
+                  </a:txBody>
+                  <a:tcPr anchor="ctr">
+                    <a:lnL w="12700" cap="flat" cmpd="sng" algn="ctr">
+                      <a:solidFill>
+                        <a:schemeClr val="tx1"/>
+                      </a:solidFill>
+                      <a:prstDash val="solid"/>
+                      <a:round/>
+                      <a:headEnd type="none" w="med" len="med"/>
+                      <a:tailEnd type="none" w="med" len="med"/>
+                    </a:lnL>
+                    <a:lnR w="12700" cap="flat" cmpd="sng" algn="ctr">
+                      <a:solidFill>
+                        <a:schemeClr val="tx1"/>
+                      </a:solidFill>
+                      <a:prstDash val="solid"/>
+                      <a:round/>
+                      <a:headEnd type="none" w="med" len="med"/>
+                      <a:tailEnd type="none" w="med" len="med"/>
+                    </a:lnR>
+                    <a:lnT w="12700" cap="flat" cmpd="sng" algn="ctr">
+                      <a:solidFill>
+                        <a:schemeClr val="tx1"/>
+                      </a:solidFill>
+                      <a:prstDash val="solid"/>
+                      <a:round/>
+                      <a:headEnd type="none" w="med" len="med"/>
+                      <a:tailEnd type="none" w="med" len="med"/>
+                    </a:lnT>
+                    <a:lnB w="12700" cap="flat" cmpd="sng" algn="ctr">
+                      <a:solidFill>
+                        <a:schemeClr val="tx1"/>
+                      </a:solidFill>
+                      <a:prstDash val="solid"/>
+                      <a:round/>
+                      <a:headEnd type="none" w="med" len="med"/>
+                      <a:tailEnd type="none" w="med" len="med"/>
+                    </a:lnB>
+                    <a:noFill/>
+                  </a:tcPr>
+                </a:tc>
+                <a:extLst>
+                  <a:ext uri="{0D108BD9-81ED-4DB2-BD59-A6C34878D82A}">
+                    <a16:rowId xmlns:a16="http://schemas.microsoft.com/office/drawing/2014/main" val="3137542689"/>
+                  </a:ext>
+                </a:extLst>
+              </a:tr>
+            </a:tbl>
+          </a:graphicData>
+        </a:graphic>
+      </p:graphicFrame>
+      <p:graphicFrame>
+        <p:nvGraphicFramePr>
+          <p:cNvPr id="35" name="표 34">
+            <a:extLst>
+              <a:ext uri="{FF2B5EF4-FFF2-40B4-BE49-F238E27FC236}">
+                <a16:creationId xmlns:a16="http://schemas.microsoft.com/office/drawing/2014/main" id="{8E8ED859-E90C-4C18-8BEB-650D2C5600B7}"/>
+              </a:ext>
+            </a:extLst>
+          </p:cNvPr>
+          <p:cNvGraphicFramePr>
+            <a:graphicFrameLocks noGrp="1"/>
+          </p:cNvGraphicFramePr>
+          <p:nvPr>
+            <p:extLst>
+              <p:ext uri="{D42A27DB-BD31-4B8C-83A1-F6EECF244321}">
+                <p14:modId xmlns:p14="http://schemas.microsoft.com/office/powerpoint/2010/main" val="3954074242"/>
+              </p:ext>
+            </p:extLst>
+          </p:nvPr>
+        </p:nvGraphicFramePr>
+        <p:xfrm>
+          <a:off x="5123075" y="4037995"/>
+          <a:ext cx="1722805" cy="1483660"/>
+        </p:xfrm>
+        <a:graphic>
+          <a:graphicData uri="http://schemas.openxmlformats.org/drawingml/2006/table">
+            <a:tbl>
+              <a:tblPr firstRow="1" bandRow="1">
+                <a:tableStyleId>{5C22544A-7EE6-4342-B048-85BDC9FD1C3A}</a:tableStyleId>
+              </a:tblPr>
+              <a:tblGrid>
+                <a:gridCol w="999206">
+                  <a:extLst>
+                    <a:ext uri="{9D8B030D-6E8A-4147-A177-3AD203B41FA5}">
+                      <a16:colId xmlns:a16="http://schemas.microsoft.com/office/drawing/2014/main" val="1113455329"/>
+                    </a:ext>
+                  </a:extLst>
+                </a:gridCol>
+                <a:gridCol w="723599">
+                  <a:extLst>
+                    <a:ext uri="{9D8B030D-6E8A-4147-A177-3AD203B41FA5}">
+                      <a16:colId xmlns:a16="http://schemas.microsoft.com/office/drawing/2014/main" val="717372469"/>
+                    </a:ext>
+                  </a:extLst>
+                </a:gridCol>
+              </a:tblGrid>
+              <a:tr h="296732">
+                <a:tc gridSpan="2">
+                  <a:txBody>
+                    <a:bodyPr/>
+                    <a:lstStyle/>
+                    <a:p>
+                      <a:pPr algn="ctr"/>
+                      <a:r>
+                        <a:rPr lang="en-US" altLang="ko-Kore-KR" sz="1100" dirty="0">
+                          <a:solidFill>
+                            <a:schemeClr val="tx1"/>
+                          </a:solidFill>
+                        </a:rPr>
+                        <a:t>comment</a:t>
+                      </a:r>
+                      <a:endParaRPr lang="ko-Kore-KR" altLang="en-US" sz="1100" dirty="0">
+                        <a:solidFill>
+                          <a:schemeClr val="tx1"/>
+                        </a:solidFill>
+                      </a:endParaRPr>
+                    </a:p>
+                  </a:txBody>
+                  <a:tcPr anchor="ctr">
+                    <a:lnL w="12700" cap="flat" cmpd="sng" algn="ctr">
+                      <a:solidFill>
+                        <a:schemeClr val="tx1"/>
+                      </a:solidFill>
+                      <a:prstDash val="solid"/>
+                      <a:round/>
+                      <a:headEnd type="none" w="med" len="med"/>
+                      <a:tailEnd type="none" w="med" len="med"/>
+                    </a:lnL>
+                    <a:lnR w="12700" cap="flat" cmpd="sng" algn="ctr">
+                      <a:solidFill>
+                        <a:schemeClr val="tx1"/>
+                      </a:solidFill>
+                      <a:prstDash val="solid"/>
+                      <a:round/>
+                      <a:headEnd type="none" w="med" len="med"/>
+                      <a:tailEnd type="none" w="med" len="med"/>
+                    </a:lnR>
+                    <a:lnT w="12700" cap="flat" cmpd="sng" algn="ctr">
+                      <a:solidFill>
+                        <a:schemeClr val="tx1"/>
+                      </a:solidFill>
+                      <a:prstDash val="solid"/>
+                      <a:round/>
+                      <a:headEnd type="none" w="med" len="med"/>
+                      <a:tailEnd type="none" w="med" len="med"/>
+                    </a:lnT>
+                    <a:lnB w="12700" cap="flat" cmpd="sng" algn="ctr">
+                      <a:solidFill>
+                        <a:schemeClr val="tx1"/>
+                      </a:solidFill>
+                      <a:prstDash val="solid"/>
+                      <a:round/>
+                      <a:headEnd type="none" w="med" len="med"/>
+                      <a:tailEnd type="none" w="med" len="med"/>
+                    </a:lnB>
+                    <a:noFill/>
+                  </a:tcPr>
+                </a:tc>
+                <a:tc hMerge="1">
+                  <a:txBody>
+                    <a:bodyPr/>
+                    <a:lstStyle/>
+                    <a:p>
+                      <a:endParaRPr lang="ko-Kore-KR" altLang="en-US" dirty="0"/>
+                    </a:p>
+                  </a:txBody>
+                  <a:tcPr>
+                    <a:lnL w="12700" cap="flat" cmpd="sng" algn="ctr">
+                      <a:solidFill>
+                        <a:schemeClr val="tx1"/>
+                      </a:solidFill>
+                      <a:prstDash val="solid"/>
+                      <a:round/>
+                      <a:headEnd type="none" w="med" len="med"/>
+                      <a:tailEnd type="none" w="med" len="med"/>
+                    </a:lnL>
+                    <a:lnR w="12700" cap="flat" cmpd="sng" algn="ctr">
+                      <a:solidFill>
+                        <a:schemeClr val="tx1"/>
+                      </a:solidFill>
+                      <a:prstDash val="solid"/>
+                      <a:round/>
+                      <a:headEnd type="none" w="med" len="med"/>
+                      <a:tailEnd type="none" w="med" len="med"/>
+                    </a:lnR>
+                    <a:lnT w="12700" cap="flat" cmpd="sng" algn="ctr">
+                      <a:solidFill>
+                        <a:schemeClr val="tx1"/>
+                      </a:solidFill>
+                      <a:prstDash val="solid"/>
+                      <a:round/>
+                      <a:headEnd type="none" w="med" len="med"/>
+                      <a:tailEnd type="none" w="med" len="med"/>
+                    </a:lnT>
+                    <a:lnB w="12700" cap="flat" cmpd="sng" algn="ctr">
+                      <a:solidFill>
+                        <a:schemeClr val="tx1"/>
+                      </a:solidFill>
+                      <a:prstDash val="solid"/>
+                      <a:round/>
+                      <a:headEnd type="none" w="med" len="med"/>
+                      <a:tailEnd type="none" w="med" len="med"/>
+                    </a:lnB>
+                    <a:noFill/>
+                  </a:tcPr>
+                </a:tc>
+                <a:extLst>
+                  <a:ext uri="{0D108BD9-81ED-4DB2-BD59-A6C34878D82A}">
+                    <a16:rowId xmlns:a16="http://schemas.microsoft.com/office/drawing/2014/main" val="2324697099"/>
+                  </a:ext>
+                </a:extLst>
+              </a:tr>
+              <a:tr h="296732">
+                <a:tc>
+                  <a:txBody>
+                    <a:bodyPr/>
+                    <a:lstStyle/>
+                    <a:p>
+                      <a:pPr algn="ctr"/>
+                      <a:r>
+                        <a:rPr lang="en-US" altLang="ko-Kore-KR" sz="1100" dirty="0">
+                          <a:solidFill>
+                            <a:srgbClr val="FF0000"/>
+                          </a:solidFill>
+                        </a:rPr>
+                        <a:t>id</a:t>
+                      </a:r>
+                      <a:endParaRPr lang="ko-Kore-KR" altLang="en-US" sz="1100" dirty="0">
+                        <a:solidFill>
+                          <a:srgbClr val="FF0000"/>
+                        </a:solidFill>
+                      </a:endParaRPr>
+                    </a:p>
+                  </a:txBody>
+                  <a:tcPr anchor="ctr">
+                    <a:lnL w="12700" cap="flat" cmpd="sng" algn="ctr">
+                      <a:solidFill>
+                        <a:schemeClr val="tx1"/>
+                      </a:solidFill>
+                      <a:prstDash val="solid"/>
+                      <a:round/>
+                      <a:headEnd type="none" w="med" len="med"/>
+                      <a:tailEnd type="none" w="med" len="med"/>
+                    </a:lnL>
+                    <a:lnR w="12700" cap="flat" cmpd="sng" algn="ctr">
+                      <a:solidFill>
+                        <a:schemeClr val="tx1"/>
+                      </a:solidFill>
+                      <a:prstDash val="solid"/>
+                      <a:round/>
+                      <a:headEnd type="none" w="med" len="med"/>
+                      <a:tailEnd type="none" w="med" len="med"/>
+                    </a:lnR>
+                    <a:lnT w="12700" cap="flat" cmpd="sng" algn="ctr">
+                      <a:solidFill>
+                        <a:schemeClr val="tx1"/>
+                      </a:solidFill>
+                      <a:prstDash val="solid"/>
+                      <a:round/>
+                      <a:headEnd type="none" w="med" len="med"/>
+                      <a:tailEnd type="none" w="med" len="med"/>
+                    </a:lnT>
+                    <a:lnB w="12700" cap="flat" cmpd="sng" algn="ctr">
+                      <a:solidFill>
+                        <a:schemeClr val="tx1"/>
+                      </a:solidFill>
+                      <a:prstDash val="solid"/>
+                      <a:round/>
+                      <a:headEnd type="none" w="med" len="med"/>
+                      <a:tailEnd type="none" w="med" len="med"/>
+                    </a:lnB>
+                    <a:noFill/>
+                  </a:tcPr>
+                </a:tc>
+                <a:tc>
+                  <a:txBody>
+                    <a:bodyPr/>
+                    <a:lstStyle/>
+                    <a:p>
+                      <a:pPr algn="ctr"/>
+                      <a:r>
+                        <a:rPr lang="en-US" altLang="ko-Kore-KR" sz="1100" dirty="0">
+                          <a:solidFill>
+                            <a:srgbClr val="FF0000"/>
+                          </a:solidFill>
+                        </a:rPr>
+                        <a:t>Long(PK)</a:t>
+                      </a:r>
+                      <a:endParaRPr lang="ko-Kore-KR" altLang="en-US" sz="1100" dirty="0">
+                        <a:solidFill>
+                          <a:srgbClr val="FF0000"/>
+                        </a:solidFill>
+                      </a:endParaRPr>
+                    </a:p>
+                  </a:txBody>
+                  <a:tcPr anchor="ctr">
+                    <a:lnL w="12700" cap="flat" cmpd="sng" algn="ctr">
+                      <a:solidFill>
+                        <a:schemeClr val="tx1"/>
+                      </a:solidFill>
+                      <a:prstDash val="solid"/>
+                      <a:round/>
+                      <a:headEnd type="none" w="med" len="med"/>
+                      <a:tailEnd type="none" w="med" len="med"/>
+                    </a:lnL>
+                    <a:lnR w="12700" cap="flat" cmpd="sng" algn="ctr">
+                      <a:solidFill>
+                        <a:schemeClr val="tx1"/>
+                      </a:solidFill>
+                      <a:prstDash val="solid"/>
+                      <a:round/>
+                      <a:headEnd type="none" w="med" len="med"/>
+                      <a:tailEnd type="none" w="med" len="med"/>
+                    </a:lnR>
+                    <a:lnT w="12700" cap="flat" cmpd="sng" algn="ctr">
+                      <a:solidFill>
+                        <a:schemeClr val="tx1"/>
+                      </a:solidFill>
+                      <a:prstDash val="solid"/>
+                      <a:round/>
+                      <a:headEnd type="none" w="med" len="med"/>
+                      <a:tailEnd type="none" w="med" len="med"/>
+                    </a:lnT>
+                    <a:lnB w="12700" cap="flat" cmpd="sng" algn="ctr">
+                      <a:solidFill>
+                        <a:schemeClr val="tx1"/>
+                      </a:solidFill>
+                      <a:prstDash val="solid"/>
+                      <a:round/>
+                      <a:headEnd type="none" w="med" len="med"/>
+                      <a:tailEnd type="none" w="med" len="med"/>
+                    </a:lnB>
+                    <a:noFill/>
+                  </a:tcPr>
+                </a:tc>
+                <a:extLst>
+                  <a:ext uri="{0D108BD9-81ED-4DB2-BD59-A6C34878D82A}">
+                    <a16:rowId xmlns:a16="http://schemas.microsoft.com/office/drawing/2014/main" val="2617678065"/>
+                  </a:ext>
+                </a:extLst>
+              </a:tr>
+              <a:tr h="296732">
+                <a:tc>
+                  <a:txBody>
+                    <a:bodyPr/>
+                    <a:lstStyle/>
+                    <a:p>
+                      <a:pPr algn="ctr"/>
+                      <a:r>
+                        <a:rPr lang="en-US" altLang="ko-Kore-KR" sz="1100" dirty="0">
+                          <a:solidFill>
+                            <a:schemeClr val="tx1"/>
+                          </a:solidFill>
+                        </a:rPr>
+                        <a:t>content</a:t>
+                      </a:r>
+                      <a:endParaRPr lang="ko-Kore-KR" altLang="en-US" sz="1100" dirty="0">
+                        <a:solidFill>
+                          <a:schemeClr val="tx1"/>
+                        </a:solidFill>
+                      </a:endParaRPr>
+                    </a:p>
+                  </a:txBody>
+                  <a:tcPr anchor="ctr">
+                    <a:lnL w="12700" cap="flat" cmpd="sng" algn="ctr">
+                      <a:solidFill>
+                        <a:schemeClr val="tx1"/>
+                      </a:solidFill>
+                      <a:prstDash val="solid"/>
+                      <a:round/>
+                      <a:headEnd type="none" w="med" len="med"/>
+                      <a:tailEnd type="none" w="med" len="med"/>
+                    </a:lnL>
+                    <a:lnR w="12700" cap="flat" cmpd="sng" algn="ctr">
+                      <a:solidFill>
+                        <a:schemeClr val="tx1"/>
+                      </a:solidFill>
+                      <a:prstDash val="solid"/>
+                      <a:round/>
+                      <a:headEnd type="none" w="med" len="med"/>
+                      <a:tailEnd type="none" w="med" len="med"/>
+                    </a:lnR>
+                    <a:lnT w="12700" cap="flat" cmpd="sng" algn="ctr">
+                      <a:solidFill>
+                        <a:schemeClr val="tx1"/>
+                      </a:solidFill>
+                      <a:prstDash val="solid"/>
+                      <a:round/>
+                      <a:headEnd type="none" w="med" len="med"/>
+                      <a:tailEnd type="none" w="med" len="med"/>
+                    </a:lnT>
+                    <a:lnB w="12700" cap="flat" cmpd="sng" algn="ctr">
+                      <a:solidFill>
+                        <a:schemeClr val="tx1"/>
+                      </a:solidFill>
+                      <a:prstDash val="solid"/>
+                      <a:round/>
+                      <a:headEnd type="none" w="med" len="med"/>
+                      <a:tailEnd type="none" w="med" len="med"/>
+                    </a:lnB>
+                    <a:noFill/>
+                  </a:tcPr>
+                </a:tc>
+                <a:tc>
+                  <a:txBody>
+                    <a:bodyPr/>
+                    <a:lstStyle/>
+                    <a:p>
+                      <a:pPr algn="ctr"/>
+                      <a:r>
+                        <a:rPr lang="en-US" altLang="ko-Kore-KR" sz="1100" dirty="0">
+                          <a:solidFill>
+                            <a:schemeClr val="tx1"/>
+                          </a:solidFill>
+                        </a:rPr>
+                        <a:t>String</a:t>
+                      </a:r>
+                      <a:endParaRPr lang="ko-Kore-KR" altLang="en-US" sz="1100" dirty="0">
+                        <a:solidFill>
+                          <a:schemeClr val="tx1"/>
+                        </a:solidFill>
+                      </a:endParaRPr>
+                    </a:p>
+                  </a:txBody>
+                  <a:tcPr anchor="ctr">
+                    <a:lnL w="12700" cap="flat" cmpd="sng" algn="ctr">
+                      <a:solidFill>
+                        <a:schemeClr val="tx1"/>
+                      </a:solidFill>
+                      <a:prstDash val="solid"/>
+                      <a:round/>
+                      <a:headEnd type="none" w="med" len="med"/>
+                      <a:tailEnd type="none" w="med" len="med"/>
+                    </a:lnL>
+                    <a:lnR w="12700" cap="flat" cmpd="sng" algn="ctr">
+                      <a:solidFill>
+                        <a:schemeClr val="tx1"/>
+                      </a:solidFill>
+                      <a:prstDash val="solid"/>
+                      <a:round/>
+                      <a:headEnd type="none" w="med" len="med"/>
+                      <a:tailEnd type="none" w="med" len="med"/>
+                    </a:lnR>
+                    <a:lnT w="12700" cap="flat" cmpd="sng" algn="ctr">
+                      <a:solidFill>
+                        <a:schemeClr val="tx1"/>
+                      </a:solidFill>
+                      <a:prstDash val="solid"/>
+                      <a:round/>
+                      <a:headEnd type="none" w="med" len="med"/>
+                      <a:tailEnd type="none" w="med" len="med"/>
+                    </a:lnT>
+                    <a:lnB w="12700" cap="flat" cmpd="sng" algn="ctr">
+                      <a:solidFill>
+                        <a:schemeClr val="tx1"/>
+                      </a:solidFill>
+                      <a:prstDash val="solid"/>
+                      <a:round/>
+                      <a:headEnd type="none" w="med" len="med"/>
+                      <a:tailEnd type="none" w="med" len="med"/>
+                    </a:lnB>
+                    <a:noFill/>
+                  </a:tcPr>
+                </a:tc>
+                <a:extLst>
+                  <a:ext uri="{0D108BD9-81ED-4DB2-BD59-A6C34878D82A}">
+                    <a16:rowId xmlns:a16="http://schemas.microsoft.com/office/drawing/2014/main" val="828923842"/>
+                  </a:ext>
+                </a:extLst>
+              </a:tr>
+              <a:tr h="296732">
+                <a:tc>
+                  <a:txBody>
+                    <a:bodyPr/>
+                    <a:lstStyle/>
+                    <a:p>
+                      <a:pPr algn="ctr"/>
+                      <a:r>
+                        <a:rPr lang="en-US" altLang="ko-Kore-KR" sz="1100" dirty="0" err="1">
+                          <a:solidFill>
+                            <a:schemeClr val="accent1"/>
+                          </a:solidFill>
+                        </a:rPr>
+                        <a:t>post_id</a:t>
+                      </a:r>
+                      <a:endParaRPr lang="ko-Kore-KR" altLang="en-US" sz="1100" dirty="0">
+                        <a:solidFill>
+                          <a:schemeClr val="accent1"/>
+                        </a:solidFill>
+                      </a:endParaRPr>
+                    </a:p>
+                  </a:txBody>
+                  <a:tcPr anchor="ctr">
+                    <a:lnL w="12700" cap="flat" cmpd="sng" algn="ctr">
+                      <a:solidFill>
+                        <a:schemeClr val="tx1"/>
+                      </a:solidFill>
+                      <a:prstDash val="solid"/>
+                      <a:round/>
+                      <a:headEnd type="none" w="med" len="med"/>
+                      <a:tailEnd type="none" w="med" len="med"/>
+                    </a:lnL>
+                    <a:lnR w="12700" cap="flat" cmpd="sng" algn="ctr">
+                      <a:solidFill>
+                        <a:schemeClr val="tx1"/>
+                      </a:solidFill>
+                      <a:prstDash val="solid"/>
+                      <a:round/>
+                      <a:headEnd type="none" w="med" len="med"/>
+                      <a:tailEnd type="none" w="med" len="med"/>
+                    </a:lnR>
+                    <a:lnT w="12700" cap="flat" cmpd="sng" algn="ctr">
+                      <a:solidFill>
+                        <a:schemeClr val="tx1"/>
+                      </a:solidFill>
+                      <a:prstDash val="solid"/>
+                      <a:round/>
+                      <a:headEnd type="none" w="med" len="med"/>
+                      <a:tailEnd type="none" w="med" len="med"/>
+                    </a:lnT>
+                    <a:lnB w="12700" cap="flat" cmpd="sng" algn="ctr">
+                      <a:solidFill>
+                        <a:schemeClr val="tx1"/>
+                      </a:solidFill>
+                      <a:prstDash val="solid"/>
+                      <a:round/>
+                      <a:headEnd type="none" w="med" len="med"/>
+                      <a:tailEnd type="none" w="med" len="med"/>
+                    </a:lnB>
+                    <a:noFill/>
+                  </a:tcPr>
+                </a:tc>
+                <a:tc>
+                  <a:txBody>
+                    <a:bodyPr/>
+                    <a:lstStyle/>
+                    <a:p>
+                      <a:pPr algn="ctr"/>
+                      <a:r>
+                        <a:rPr lang="en-US" altLang="ko-Kore-KR" sz="1100" dirty="0">
+                          <a:solidFill>
+                            <a:schemeClr val="accent1"/>
+                          </a:solidFill>
+                        </a:rPr>
+                        <a:t>Long(FK)</a:t>
+                      </a:r>
+                      <a:endParaRPr lang="ko-Kore-KR" altLang="en-US" sz="1100" dirty="0">
+                        <a:solidFill>
+                          <a:schemeClr val="accent1"/>
+                        </a:solidFill>
+                      </a:endParaRPr>
+                    </a:p>
+                  </a:txBody>
+                  <a:tcPr anchor="ctr">
+                    <a:lnL w="12700" cap="flat" cmpd="sng" algn="ctr">
+                      <a:solidFill>
+                        <a:schemeClr val="tx1"/>
+                      </a:solidFill>
+                      <a:prstDash val="solid"/>
+                      <a:round/>
+                      <a:headEnd type="none" w="med" len="med"/>
+                      <a:tailEnd type="none" w="med" len="med"/>
+                    </a:lnL>
+                    <a:lnR w="12700" cap="flat" cmpd="sng" algn="ctr">
+                      <a:solidFill>
+                        <a:schemeClr val="tx1"/>
+                      </a:solidFill>
+                      <a:prstDash val="solid"/>
+                      <a:round/>
+                      <a:headEnd type="none" w="med" len="med"/>
+                      <a:tailEnd type="none" w="med" len="med"/>
+                    </a:lnR>
+                    <a:lnT w="12700" cap="flat" cmpd="sng" algn="ctr">
+                      <a:solidFill>
+                        <a:schemeClr val="tx1"/>
+                      </a:solidFill>
+                      <a:prstDash val="solid"/>
+                      <a:round/>
+                      <a:headEnd type="none" w="med" len="med"/>
+                      <a:tailEnd type="none" w="med" len="med"/>
+                    </a:lnT>
+                    <a:lnB w="12700" cap="flat" cmpd="sng" algn="ctr">
+                      <a:solidFill>
+                        <a:schemeClr val="tx1"/>
+                      </a:solidFill>
+                      <a:prstDash val="solid"/>
+                      <a:round/>
+                      <a:headEnd type="none" w="med" len="med"/>
+                      <a:tailEnd type="none" w="med" len="med"/>
+                    </a:lnB>
+                    <a:noFill/>
+                  </a:tcPr>
+                </a:tc>
+                <a:extLst>
+                  <a:ext uri="{0D108BD9-81ED-4DB2-BD59-A6C34878D82A}">
+                    <a16:rowId xmlns:a16="http://schemas.microsoft.com/office/drawing/2014/main" val="2165985759"/>
+                  </a:ext>
+                </a:extLst>
+              </a:tr>
+              <a:tr h="296732">
+                <a:tc>
+                  <a:txBody>
+                    <a:bodyPr/>
+                    <a:lstStyle/>
+                    <a:p>
+                      <a:pPr algn="ctr"/>
+                      <a:r>
+                        <a:rPr lang="en-US" altLang="ko-Kore-KR" sz="1100" dirty="0" err="1">
+                          <a:solidFill>
+                            <a:schemeClr val="accent1"/>
+                          </a:solidFill>
+                        </a:rPr>
+                        <a:t>student_id</a:t>
                       </a:r>
                       <a:endParaRPr lang="ko-Kore-KR" altLang="en-US" sz="1100" dirty="0">
                         <a:solidFill>

</xml_diff>

<commit_message>
refactor: entity 변경, DB 설계 변경
</commit_message>
<xml_diff>
--- a/DB 설계.pptx
+++ b/DB 설계.pptx
@@ -3362,14 +3362,14 @@
           <p:nvPr>
             <p:extLst>
               <p:ext uri="{D42A27DB-BD31-4B8C-83A1-F6EECF244321}">
-                <p14:modId xmlns:p14="http://schemas.microsoft.com/office/powerpoint/2010/main" val="3565849470"/>
+                <p14:modId xmlns:p14="http://schemas.microsoft.com/office/powerpoint/2010/main" val="2987441778"/>
               </p:ext>
             </p:extLst>
           </p:nvPr>
         </p:nvGraphicFramePr>
         <p:xfrm>
-          <a:off x="1786089" y="90395"/>
-          <a:ext cx="2551581" cy="2370669"/>
+          <a:off x="2127613" y="90395"/>
+          <a:ext cx="2551581" cy="3386670"/>
         </p:xfrm>
         <a:graphic>
           <a:graphicData uri="http://schemas.openxmlformats.org/drawingml/2006/table">
@@ -4170,12 +4170,65 @@
                     <a:p>
                       <a:pPr algn="ctr"/>
                       <a:r>
+                        <a:rPr lang="en-US" altLang="ko-Kore-KR" sz="1100" dirty="0"/>
+                        <a:t>major</a:t>
+                      </a:r>
+                      <a:endParaRPr lang="ko-Kore-KR" altLang="en-US" sz="1100" dirty="0"/>
+                    </a:p>
+                  </a:txBody>
+                  <a:tcPr anchor="ctr">
+                    <a:lnL w="12700" cap="flat" cmpd="sng" algn="ctr">
+                      <a:solidFill>
+                        <a:schemeClr val="tx1"/>
+                      </a:solidFill>
+                      <a:prstDash val="solid"/>
+                      <a:round/>
+                      <a:headEnd type="none" w="med" len="med"/>
+                      <a:tailEnd type="none" w="med" len="med"/>
+                    </a:lnL>
+                    <a:lnR w="12700" cap="flat" cmpd="sng" algn="ctr">
+                      <a:solidFill>
+                        <a:schemeClr val="tx1"/>
+                      </a:solidFill>
+                      <a:prstDash val="solid"/>
+                      <a:round/>
+                      <a:headEnd type="none" w="med" len="med"/>
+                      <a:tailEnd type="none" w="med" len="med"/>
+                    </a:lnR>
+                    <a:lnT w="12700" cap="flat" cmpd="sng" algn="ctr">
+                      <a:solidFill>
+                        <a:schemeClr val="tx1"/>
+                      </a:solidFill>
+                      <a:prstDash val="solid"/>
+                      <a:round/>
+                      <a:headEnd type="none" w="med" len="med"/>
+                      <a:tailEnd type="none" w="med" len="med"/>
+                    </a:lnT>
+                    <a:lnB w="12700" cap="flat" cmpd="sng" algn="ctr">
+                      <a:solidFill>
+                        <a:schemeClr val="tx1"/>
+                      </a:solidFill>
+                      <a:prstDash val="solid"/>
+                      <a:round/>
+                      <a:headEnd type="none" w="med" len="med"/>
+                      <a:tailEnd type="none" w="med" len="med"/>
+                    </a:lnB>
+                    <a:noFill/>
+                  </a:tcPr>
+                </a:tc>
+                <a:tc>
+                  <a:txBody>
+                    <a:bodyPr/>
+                    <a:lstStyle/>
+                    <a:p>
+                      <a:pPr algn="ctr"/>
+                      <a:r>
                         <a:rPr lang="en-US" altLang="ko-Kore-KR" sz="1100" dirty="0">
                           <a:solidFill>
                             <a:schemeClr val="tx1"/>
                           </a:solidFill>
                         </a:rPr>
-                        <a:t>DTYPE</a:t>
+                        <a:t>String</a:t>
                       </a:r>
                       <a:endParaRPr lang="ko-Kore-KR" altLang="en-US" sz="1100" dirty="0">
                         <a:solidFill>
@@ -4224,12 +4277,27 @@
                     <a:noFill/>
                   </a:tcPr>
                 </a:tc>
+                <a:extLst>
+                  <a:ext uri="{0D108BD9-81ED-4DB2-BD59-A6C34878D82A}">
+                    <a16:rowId xmlns:a16="http://schemas.microsoft.com/office/drawing/2014/main" val="3944026553"/>
+                  </a:ext>
+                </a:extLst>
+              </a:tr>
+              <a:tr h="338667">
                 <a:tc>
                   <a:txBody>
                     <a:bodyPr/>
                     <a:lstStyle/>
                     <a:p>
                       <a:pPr algn="ctr"/>
+                      <a:r>
+                        <a:rPr lang="en-US" altLang="ko-Kore-KR" sz="1100" dirty="0">
+                          <a:solidFill>
+                            <a:schemeClr val="tx1"/>
+                          </a:solidFill>
+                        </a:rPr>
+                        <a:t>email</a:t>
+                      </a:r>
                       <a:endParaRPr lang="ko-Kore-KR" altLang="en-US" sz="1100" dirty="0">
                         <a:solidFill>
                           <a:schemeClr val="tx1"/>
@@ -4277,9 +4345,320 @@
                     <a:noFill/>
                   </a:tcPr>
                 </a:tc>
+                <a:tc>
+                  <a:txBody>
+                    <a:bodyPr/>
+                    <a:lstStyle/>
+                    <a:p>
+                      <a:pPr algn="ctr"/>
+                      <a:r>
+                        <a:rPr lang="en-US" altLang="ko-Kore-KR" sz="1100" dirty="0">
+                          <a:solidFill>
+                            <a:schemeClr val="tx1"/>
+                          </a:solidFill>
+                        </a:rPr>
+                        <a:t>String</a:t>
+                      </a:r>
+                      <a:endParaRPr lang="ko-Kore-KR" altLang="en-US" sz="1100" dirty="0">
+                        <a:solidFill>
+                          <a:schemeClr val="tx1"/>
+                        </a:solidFill>
+                      </a:endParaRPr>
+                    </a:p>
+                  </a:txBody>
+                  <a:tcPr anchor="ctr">
+                    <a:lnL w="12700" cap="flat" cmpd="sng" algn="ctr">
+                      <a:solidFill>
+                        <a:schemeClr val="tx1"/>
+                      </a:solidFill>
+                      <a:prstDash val="solid"/>
+                      <a:round/>
+                      <a:headEnd type="none" w="med" len="med"/>
+                      <a:tailEnd type="none" w="med" len="med"/>
+                    </a:lnL>
+                    <a:lnR w="12700" cap="flat" cmpd="sng" algn="ctr">
+                      <a:solidFill>
+                        <a:schemeClr val="tx1"/>
+                      </a:solidFill>
+                      <a:prstDash val="solid"/>
+                      <a:round/>
+                      <a:headEnd type="none" w="med" len="med"/>
+                      <a:tailEnd type="none" w="med" len="med"/>
+                    </a:lnR>
+                    <a:lnT w="12700" cap="flat" cmpd="sng" algn="ctr">
+                      <a:solidFill>
+                        <a:schemeClr val="tx1"/>
+                      </a:solidFill>
+                      <a:prstDash val="solid"/>
+                      <a:round/>
+                      <a:headEnd type="none" w="med" len="med"/>
+                      <a:tailEnd type="none" w="med" len="med"/>
+                    </a:lnT>
+                    <a:lnB w="12700" cap="flat" cmpd="sng" algn="ctr">
+                      <a:solidFill>
+                        <a:schemeClr val="tx1"/>
+                      </a:solidFill>
+                      <a:prstDash val="solid"/>
+                      <a:round/>
+                      <a:headEnd type="none" w="med" len="med"/>
+                      <a:tailEnd type="none" w="med" len="med"/>
+                    </a:lnB>
+                    <a:noFill/>
+                  </a:tcPr>
+                </a:tc>
                 <a:extLst>
                   <a:ext uri="{0D108BD9-81ED-4DB2-BD59-A6C34878D82A}">
-                    <a16:rowId xmlns:a16="http://schemas.microsoft.com/office/drawing/2014/main" val="3944026553"/>
+                    <a16:rowId xmlns:a16="http://schemas.microsoft.com/office/drawing/2014/main" val="37971697"/>
+                  </a:ext>
+                </a:extLst>
+              </a:tr>
+              <a:tr h="338667">
+                <a:tc>
+                  <a:txBody>
+                    <a:bodyPr/>
+                    <a:lstStyle/>
+                    <a:p>
+                      <a:pPr algn="ctr"/>
+                      <a:r>
+                        <a:rPr lang="en-US" altLang="ko-Kore-KR" sz="1100" dirty="0">
+                          <a:solidFill>
+                            <a:schemeClr val="tx1"/>
+                          </a:solidFill>
+                        </a:rPr>
+                        <a:t>nickname</a:t>
+                      </a:r>
+                      <a:endParaRPr lang="ko-Kore-KR" altLang="en-US" sz="1100" dirty="0">
+                        <a:solidFill>
+                          <a:schemeClr val="tx1"/>
+                        </a:solidFill>
+                      </a:endParaRPr>
+                    </a:p>
+                  </a:txBody>
+                  <a:tcPr anchor="ctr">
+                    <a:lnL w="12700" cap="flat" cmpd="sng" algn="ctr">
+                      <a:solidFill>
+                        <a:schemeClr val="tx1"/>
+                      </a:solidFill>
+                      <a:prstDash val="solid"/>
+                      <a:round/>
+                      <a:headEnd type="none" w="med" len="med"/>
+                      <a:tailEnd type="none" w="med" len="med"/>
+                    </a:lnL>
+                    <a:lnR w="12700" cap="flat" cmpd="sng" algn="ctr">
+                      <a:solidFill>
+                        <a:schemeClr val="tx1"/>
+                      </a:solidFill>
+                      <a:prstDash val="solid"/>
+                      <a:round/>
+                      <a:headEnd type="none" w="med" len="med"/>
+                      <a:tailEnd type="none" w="med" len="med"/>
+                    </a:lnR>
+                    <a:lnT w="12700" cap="flat" cmpd="sng" algn="ctr">
+                      <a:solidFill>
+                        <a:schemeClr val="tx1"/>
+                      </a:solidFill>
+                      <a:prstDash val="solid"/>
+                      <a:round/>
+                      <a:headEnd type="none" w="med" len="med"/>
+                      <a:tailEnd type="none" w="med" len="med"/>
+                    </a:lnT>
+                    <a:lnB w="12700" cap="flat" cmpd="sng" algn="ctr">
+                      <a:solidFill>
+                        <a:schemeClr val="tx1"/>
+                      </a:solidFill>
+                      <a:prstDash val="solid"/>
+                      <a:round/>
+                      <a:headEnd type="none" w="med" len="med"/>
+                      <a:tailEnd type="none" w="med" len="med"/>
+                    </a:lnB>
+                    <a:noFill/>
+                  </a:tcPr>
+                </a:tc>
+                <a:tc>
+                  <a:txBody>
+                    <a:bodyPr/>
+                    <a:lstStyle/>
+                    <a:p>
+                      <a:pPr algn="ctr"/>
+                      <a:r>
+                        <a:rPr lang="en-US" altLang="ko-Kore-KR" sz="1100" dirty="0">
+                          <a:solidFill>
+                            <a:schemeClr val="tx1"/>
+                          </a:solidFill>
+                        </a:rPr>
+                        <a:t>String</a:t>
+                      </a:r>
+                      <a:endParaRPr lang="ko-Kore-KR" altLang="en-US" sz="1100" dirty="0">
+                        <a:solidFill>
+                          <a:schemeClr val="tx1"/>
+                        </a:solidFill>
+                      </a:endParaRPr>
+                    </a:p>
+                  </a:txBody>
+                  <a:tcPr anchor="ctr">
+                    <a:lnL w="12700" cap="flat" cmpd="sng" algn="ctr">
+                      <a:solidFill>
+                        <a:schemeClr val="tx1"/>
+                      </a:solidFill>
+                      <a:prstDash val="solid"/>
+                      <a:round/>
+                      <a:headEnd type="none" w="med" len="med"/>
+                      <a:tailEnd type="none" w="med" len="med"/>
+                    </a:lnL>
+                    <a:lnR w="12700" cap="flat" cmpd="sng" algn="ctr">
+                      <a:solidFill>
+                        <a:schemeClr val="tx1"/>
+                      </a:solidFill>
+                      <a:prstDash val="solid"/>
+                      <a:round/>
+                      <a:headEnd type="none" w="med" len="med"/>
+                      <a:tailEnd type="none" w="med" len="med"/>
+                    </a:lnR>
+                    <a:lnT w="12700" cap="flat" cmpd="sng" algn="ctr">
+                      <a:solidFill>
+                        <a:schemeClr val="tx1"/>
+                      </a:solidFill>
+                      <a:prstDash val="solid"/>
+                      <a:round/>
+                      <a:headEnd type="none" w="med" len="med"/>
+                      <a:tailEnd type="none" w="med" len="med"/>
+                    </a:lnT>
+                    <a:lnB w="12700" cap="flat" cmpd="sng" algn="ctr">
+                      <a:solidFill>
+                        <a:schemeClr val="tx1"/>
+                      </a:solidFill>
+                      <a:prstDash val="solid"/>
+                      <a:round/>
+                      <a:headEnd type="none" w="med" len="med"/>
+                      <a:tailEnd type="none" w="med" len="med"/>
+                    </a:lnB>
+                    <a:noFill/>
+                  </a:tcPr>
+                </a:tc>
+                <a:extLst>
+                  <a:ext uri="{0D108BD9-81ED-4DB2-BD59-A6C34878D82A}">
+                    <a16:rowId xmlns:a16="http://schemas.microsoft.com/office/drawing/2014/main" val="918434052"/>
+                  </a:ext>
+                </a:extLst>
+              </a:tr>
+              <a:tr h="338667">
+                <a:tc>
+                  <a:txBody>
+                    <a:bodyPr/>
+                    <a:lstStyle/>
+                    <a:p>
+                      <a:pPr algn="ctr"/>
+                      <a:r>
+                        <a:rPr lang="en-US" altLang="ko-Kore-KR" sz="1100" dirty="0" err="1"/>
+                        <a:t>sexType</a:t>
+                      </a:r>
+                      <a:endParaRPr lang="ko-Kore-KR" altLang="en-US" sz="1100" dirty="0"/>
+                    </a:p>
+                  </a:txBody>
+                  <a:tcPr anchor="ctr">
+                    <a:lnL w="12700" cap="flat" cmpd="sng" algn="ctr">
+                      <a:solidFill>
+                        <a:schemeClr val="tx1"/>
+                      </a:solidFill>
+                      <a:prstDash val="solid"/>
+                      <a:round/>
+                      <a:headEnd type="none" w="med" len="med"/>
+                      <a:tailEnd type="none" w="med" len="med"/>
+                    </a:lnL>
+                    <a:lnR w="12700" cap="flat" cmpd="sng" algn="ctr">
+                      <a:solidFill>
+                        <a:schemeClr val="tx1"/>
+                      </a:solidFill>
+                      <a:prstDash val="solid"/>
+                      <a:round/>
+                      <a:headEnd type="none" w="med" len="med"/>
+                      <a:tailEnd type="none" w="med" len="med"/>
+                    </a:lnR>
+                    <a:lnT w="12700" cap="flat" cmpd="sng" algn="ctr">
+                      <a:solidFill>
+                        <a:schemeClr val="tx1"/>
+                      </a:solidFill>
+                      <a:prstDash val="solid"/>
+                      <a:round/>
+                      <a:headEnd type="none" w="med" len="med"/>
+                      <a:tailEnd type="none" w="med" len="med"/>
+                    </a:lnT>
+                    <a:lnB w="12700" cap="flat" cmpd="sng" algn="ctr">
+                      <a:solidFill>
+                        <a:schemeClr val="tx1"/>
+                      </a:solidFill>
+                      <a:prstDash val="solid"/>
+                      <a:round/>
+                      <a:headEnd type="none" w="med" len="med"/>
+                      <a:tailEnd type="none" w="med" len="med"/>
+                    </a:lnB>
+                    <a:noFill/>
+                  </a:tcPr>
+                </a:tc>
+                <a:tc>
+                  <a:txBody>
+                    <a:bodyPr/>
+                    <a:lstStyle/>
+                    <a:p>
+                      <a:pPr algn="ctr"/>
+                      <a:r>
+                        <a:rPr lang="en-US" altLang="ko-Kore-KR" sz="1100" dirty="0">
+                          <a:solidFill>
+                            <a:schemeClr val="tx1"/>
+                          </a:solidFill>
+                        </a:rPr>
+                        <a:t>String(Enum)</a:t>
+                      </a:r>
+                      <a:endParaRPr lang="ko-Kore-KR" altLang="en-US" sz="1100" dirty="0">
+                        <a:solidFill>
+                          <a:schemeClr val="tx1"/>
+                        </a:solidFill>
+                      </a:endParaRPr>
+                    </a:p>
+                  </a:txBody>
+                  <a:tcPr anchor="ctr">
+                    <a:lnL w="12700" cap="flat" cmpd="sng" algn="ctr">
+                      <a:solidFill>
+                        <a:schemeClr val="tx1"/>
+                      </a:solidFill>
+                      <a:prstDash val="solid"/>
+                      <a:round/>
+                      <a:headEnd type="none" w="med" len="med"/>
+                      <a:tailEnd type="none" w="med" len="med"/>
+                    </a:lnL>
+                    <a:lnR w="12700" cap="flat" cmpd="sng" algn="ctr">
+                      <a:solidFill>
+                        <a:schemeClr val="tx1"/>
+                      </a:solidFill>
+                      <a:prstDash val="solid"/>
+                      <a:round/>
+                      <a:headEnd type="none" w="med" len="med"/>
+                      <a:tailEnd type="none" w="med" len="med"/>
+                    </a:lnR>
+                    <a:lnT w="12700" cap="flat" cmpd="sng" algn="ctr">
+                      <a:solidFill>
+                        <a:schemeClr val="tx1"/>
+                      </a:solidFill>
+                      <a:prstDash val="solid"/>
+                      <a:round/>
+                      <a:headEnd type="none" w="med" len="med"/>
+                      <a:tailEnd type="none" w="med" len="med"/>
+                    </a:lnT>
+                    <a:lnB w="12700" cap="flat" cmpd="sng" algn="ctr">
+                      <a:solidFill>
+                        <a:schemeClr val="tx1"/>
+                      </a:solidFill>
+                      <a:prstDash val="solid"/>
+                      <a:round/>
+                      <a:headEnd type="none" w="med" len="med"/>
+                      <a:tailEnd type="none" w="med" len="med"/>
+                    </a:lnB>
+                    <a:noFill/>
+                  </a:tcPr>
+                </a:tc>
+                <a:extLst>
+                  <a:ext uri="{0D108BD9-81ED-4DB2-BD59-A6C34878D82A}">
+                    <a16:rowId xmlns:a16="http://schemas.microsoft.com/office/drawing/2014/main" val="1440284785"/>
                   </a:ext>
                 </a:extLst>
               </a:tr>
@@ -4302,13 +4681,13 @@
           <p:nvPr>
             <p:extLst>
               <p:ext uri="{D42A27DB-BD31-4B8C-83A1-F6EECF244321}">
-                <p14:modId xmlns:p14="http://schemas.microsoft.com/office/powerpoint/2010/main" val="4207668973"/>
+                <p14:modId xmlns:p14="http://schemas.microsoft.com/office/powerpoint/2010/main" val="3497305544"/>
               </p:ext>
             </p:extLst>
           </p:nvPr>
         </p:nvGraphicFramePr>
         <p:xfrm>
-          <a:off x="43654" y="91440"/>
+          <a:off x="175855" y="124491"/>
           <a:ext cx="1666641" cy="777240"/>
         </p:xfrm>
         <a:graphic>
@@ -4726,14 +5105,14 @@
           <p:nvPr>
             <p:extLst>
               <p:ext uri="{D42A27DB-BD31-4B8C-83A1-F6EECF244321}">
-                <p14:modId xmlns:p14="http://schemas.microsoft.com/office/powerpoint/2010/main" val="3693214640"/>
+                <p14:modId xmlns:p14="http://schemas.microsoft.com/office/powerpoint/2010/main" val="1026934620"/>
               </p:ext>
             </p:extLst>
           </p:nvPr>
         </p:nvGraphicFramePr>
         <p:xfrm>
-          <a:off x="43654" y="3776200"/>
-          <a:ext cx="2731444" cy="1864434"/>
+          <a:off x="75813" y="3912853"/>
+          <a:ext cx="2696085" cy="2175173"/>
         </p:xfrm>
         <a:graphic>
           <a:graphicData uri="http://schemas.openxmlformats.org/drawingml/2006/table">
@@ -4742,14 +5121,14 @@
                 <a:tableStyleId>{5C22544A-7EE6-4342-B048-85BDC9FD1C3A}</a:tableStyleId>
               </a:tblPr>
               <a:tblGrid>
-                <a:gridCol w="1785146">
+                <a:gridCol w="1762037">
                   <a:extLst>
                     <a:ext uri="{9D8B030D-6E8A-4147-A177-3AD203B41FA5}">
                       <a16:colId xmlns:a16="http://schemas.microsoft.com/office/drawing/2014/main" val="1113455329"/>
                     </a:ext>
                   </a:extLst>
                 </a:gridCol>
-                <a:gridCol w="946298">
+                <a:gridCol w="934048">
                   <a:extLst>
                     <a:ext uri="{9D8B030D-6E8A-4147-A177-3AD203B41FA5}">
                       <a16:colId xmlns:a16="http://schemas.microsoft.com/office/drawing/2014/main" val="717372469"/>
@@ -5010,8 +5389,8 @@
                     <a:p>
                       <a:pPr algn="ctr"/>
                       <a:r>
-                        <a:rPr lang="en-US" altLang="ko-Kore-KR" sz="1100" dirty="0" err="1"/>
-                        <a:t>store_name</a:t>
+                        <a:rPr lang="en-US" altLang="ko-Kore-KR" sz="1100" dirty="0"/>
+                        <a:t>name</a:t>
                       </a:r>
                       <a:endParaRPr lang="ko-Kore-KR" altLang="en-US" sz="1100" dirty="0"/>
                     </a:p>
@@ -5131,8 +5510,8 @@
                     <a:p>
                       <a:pPr algn="ctr"/>
                       <a:r>
-                        <a:rPr lang="en-US" altLang="ko-Kore-KR" sz="1100" dirty="0" err="1"/>
-                        <a:t>store_phone</a:t>
+                        <a:rPr lang="en-US" altLang="ko-Kore-KR" sz="1100" dirty="0"/>
+                        <a:t>phone</a:t>
                       </a:r>
                       <a:endParaRPr lang="ko-Kore-KR" altLang="en-US" sz="1100" dirty="0"/>
                     </a:p>
@@ -5252,8 +5631,8 @@
                     <a:p>
                       <a:pPr algn="ctr"/>
                       <a:r>
-                        <a:rPr lang="en-US" altLang="ko-Kore-KR" sz="1100" dirty="0" err="1"/>
-                        <a:t>store_address</a:t>
+                        <a:rPr lang="en-US" altLang="ko-Kore-KR" sz="1100" dirty="0"/>
+                        <a:t>email</a:t>
                       </a:r>
                       <a:endParaRPr lang="ko-Kore-KR" altLang="en-US" sz="1100" dirty="0"/>
                     </a:p>
@@ -5362,6 +5741,127 @@
                 <a:extLst>
                   <a:ext uri="{0D108BD9-81ED-4DB2-BD59-A6C34878D82A}">
                     <a16:rowId xmlns:a16="http://schemas.microsoft.com/office/drawing/2014/main" val="3915372130"/>
+                  </a:ext>
+                </a:extLst>
+              </a:tr>
+              <a:tr h="310739">
+                <a:tc>
+                  <a:txBody>
+                    <a:bodyPr/>
+                    <a:lstStyle/>
+                    <a:p>
+                      <a:pPr algn="ctr"/>
+                      <a:r>
+                        <a:rPr lang="en-US" altLang="ko-Kore-KR" sz="1100" dirty="0" err="1"/>
+                        <a:t>AccountType</a:t>
+                      </a:r>
+                      <a:endParaRPr lang="ko-Kore-KR" altLang="en-US" sz="1100" dirty="0"/>
+                    </a:p>
+                  </a:txBody>
+                  <a:tcPr anchor="ctr">
+                    <a:lnL w="12700" cap="flat" cmpd="sng" algn="ctr">
+                      <a:solidFill>
+                        <a:schemeClr val="tx1"/>
+                      </a:solidFill>
+                      <a:prstDash val="solid"/>
+                      <a:round/>
+                      <a:headEnd type="none" w="med" len="med"/>
+                      <a:tailEnd type="none" w="med" len="med"/>
+                    </a:lnL>
+                    <a:lnR w="12700" cap="flat" cmpd="sng" algn="ctr">
+                      <a:solidFill>
+                        <a:schemeClr val="tx1"/>
+                      </a:solidFill>
+                      <a:prstDash val="solid"/>
+                      <a:round/>
+                      <a:headEnd type="none" w="med" len="med"/>
+                      <a:tailEnd type="none" w="med" len="med"/>
+                    </a:lnR>
+                    <a:lnT w="12700" cap="flat" cmpd="sng" algn="ctr">
+                      <a:solidFill>
+                        <a:schemeClr val="tx1"/>
+                      </a:solidFill>
+                      <a:prstDash val="solid"/>
+                      <a:round/>
+                      <a:headEnd type="none" w="med" len="med"/>
+                      <a:tailEnd type="none" w="med" len="med"/>
+                    </a:lnT>
+                    <a:lnB w="12700" cap="flat" cmpd="sng" algn="ctr">
+                      <a:solidFill>
+                        <a:schemeClr val="tx1"/>
+                      </a:solidFill>
+                      <a:prstDash val="solid"/>
+                      <a:round/>
+                      <a:headEnd type="none" w="med" len="med"/>
+                      <a:tailEnd type="none" w="med" len="med"/>
+                    </a:lnB>
+                    <a:noFill/>
+                  </a:tcPr>
+                </a:tc>
+                <a:tc>
+                  <a:txBody>
+                    <a:bodyPr/>
+                    <a:lstStyle/>
+                    <a:p>
+                      <a:pPr algn="ctr"/>
+                      <a:r>
+                        <a:rPr lang="en-US" altLang="ko-Kore-KR" sz="1100" dirty="0">
+                          <a:solidFill>
+                            <a:schemeClr val="tx1"/>
+                          </a:solidFill>
+                        </a:rPr>
+                        <a:t>String(Enum)</a:t>
+                      </a:r>
+                      <a:endParaRPr lang="ko-Kore-KR" altLang="en-US" sz="1100" dirty="0">
+                        <a:solidFill>
+                          <a:schemeClr val="tx1"/>
+                        </a:solidFill>
+                      </a:endParaRPr>
+                    </a:p>
+                  </a:txBody>
+                  <a:tcPr anchor="ctr">
+                    <a:lnL w="12700" cap="flat" cmpd="sng" algn="ctr">
+                      <a:solidFill>
+                        <a:schemeClr val="tx1"/>
+                      </a:solidFill>
+                      <a:prstDash val="solid"/>
+                      <a:round/>
+                      <a:headEnd type="none" w="med" len="med"/>
+                      <a:tailEnd type="none" w="med" len="med"/>
+                    </a:lnL>
+                    <a:lnR w="12700" cap="flat" cmpd="sng" algn="ctr">
+                      <a:solidFill>
+                        <a:schemeClr val="tx1"/>
+                      </a:solidFill>
+                      <a:prstDash val="solid"/>
+                      <a:round/>
+                      <a:headEnd type="none" w="med" len="med"/>
+                      <a:tailEnd type="none" w="med" len="med"/>
+                    </a:lnR>
+                    <a:lnT w="12700" cap="flat" cmpd="sng" algn="ctr">
+                      <a:solidFill>
+                        <a:schemeClr val="tx1"/>
+                      </a:solidFill>
+                      <a:prstDash val="solid"/>
+                      <a:round/>
+                      <a:headEnd type="none" w="med" len="med"/>
+                      <a:tailEnd type="none" w="med" len="med"/>
+                    </a:lnT>
+                    <a:lnB w="12700" cap="flat" cmpd="sng" algn="ctr">
+                      <a:solidFill>
+                        <a:schemeClr val="tx1"/>
+                      </a:solidFill>
+                      <a:prstDash val="solid"/>
+                      <a:round/>
+                      <a:headEnd type="none" w="med" len="med"/>
+                      <a:tailEnd type="none" w="med" len="med"/>
+                    </a:lnB>
+                    <a:noFill/>
+                  </a:tcPr>
+                </a:tc>
+                <a:extLst>
+                  <a:ext uri="{0D108BD9-81ED-4DB2-BD59-A6C34878D82A}">
+                    <a16:rowId xmlns:a16="http://schemas.microsoft.com/office/drawing/2014/main" val="3819235397"/>
                   </a:ext>
                 </a:extLst>
               </a:tr>
@@ -5502,893 +6002,6 @@
           </a:graphicData>
         </a:graphic>
       </p:graphicFrame>
-      <p:cxnSp>
-        <p:nvCxnSpPr>
-          <p:cNvPr id="10" name="직선 화살표 연결선 9">
-            <a:extLst>
-              <a:ext uri="{FF2B5EF4-FFF2-40B4-BE49-F238E27FC236}">
-                <a16:creationId xmlns:a16="http://schemas.microsoft.com/office/drawing/2014/main" id="{F5C6D855-1F9A-3594-7219-0C0F6AD878C3}"/>
-              </a:ext>
-            </a:extLst>
-          </p:cNvPr>
-          <p:cNvCxnSpPr>
-            <a:cxnSpLocks/>
-            <a:stCxn id="4" idx="2"/>
-            <a:endCxn id="9" idx="0"/>
-          </p:cNvCxnSpPr>
-          <p:nvPr/>
-        </p:nvCxnSpPr>
-        <p:spPr>
-          <a:xfrm flipH="1">
-            <a:off x="1409376" y="2461064"/>
-            <a:ext cx="1652503" cy="1315136"/>
-          </a:xfrm>
-          <a:prstGeom prst="straightConnector1">
-            <a:avLst/>
-          </a:prstGeom>
-          <a:ln w="12700">
-            <a:solidFill>
-              <a:schemeClr val="tx1"/>
-            </a:solidFill>
-            <a:tailEnd type="triangle"/>
-          </a:ln>
-        </p:spPr>
-        <p:style>
-          <a:lnRef idx="1">
-            <a:schemeClr val="dk1"/>
-          </a:lnRef>
-          <a:fillRef idx="0">
-            <a:schemeClr val="dk1"/>
-          </a:fillRef>
-          <a:effectRef idx="0">
-            <a:schemeClr val="dk1"/>
-          </a:effectRef>
-          <a:fontRef idx="minor">
-            <a:schemeClr val="tx1"/>
-          </a:fontRef>
-        </p:style>
-      </p:cxnSp>
-      <p:graphicFrame>
-        <p:nvGraphicFramePr>
-          <p:cNvPr id="13" name="표 12">
-            <a:extLst>
-              <a:ext uri="{FF2B5EF4-FFF2-40B4-BE49-F238E27FC236}">
-                <a16:creationId xmlns:a16="http://schemas.microsoft.com/office/drawing/2014/main" id="{BC683A70-72F1-E7B5-367D-C2CD4AAFEC34}"/>
-              </a:ext>
-            </a:extLst>
-          </p:cNvPr>
-          <p:cNvGraphicFramePr>
-            <a:graphicFrameLocks noGrp="1"/>
-          </p:cNvGraphicFramePr>
-          <p:nvPr>
-            <p:extLst>
-              <p:ext uri="{D42A27DB-BD31-4B8C-83A1-F6EECF244321}">
-                <p14:modId xmlns:p14="http://schemas.microsoft.com/office/powerpoint/2010/main" val="951254214"/>
-              </p:ext>
-            </p:extLst>
-          </p:nvPr>
-        </p:nvGraphicFramePr>
-        <p:xfrm>
-          <a:off x="2839436" y="3776199"/>
-          <a:ext cx="1720678" cy="1671402"/>
-        </p:xfrm>
-        <a:graphic>
-          <a:graphicData uri="http://schemas.openxmlformats.org/drawingml/2006/table">
-            <a:tbl>
-              <a:tblPr firstRow="1" bandRow="1">
-                <a:tableStyleId>{5C22544A-7EE6-4342-B048-85BDC9FD1C3A}</a:tableStyleId>
-              </a:tblPr>
-              <a:tblGrid>
-                <a:gridCol w="768436">
-                  <a:extLst>
-                    <a:ext uri="{9D8B030D-6E8A-4147-A177-3AD203B41FA5}">
-                      <a16:colId xmlns:a16="http://schemas.microsoft.com/office/drawing/2014/main" val="1113455329"/>
-                    </a:ext>
-                  </a:extLst>
-                </a:gridCol>
-                <a:gridCol w="952242">
-                  <a:extLst>
-                    <a:ext uri="{9D8B030D-6E8A-4147-A177-3AD203B41FA5}">
-                      <a16:colId xmlns:a16="http://schemas.microsoft.com/office/drawing/2014/main" val="717372469"/>
-                    </a:ext>
-                  </a:extLst>
-                </a:gridCol>
-              </a:tblGrid>
-              <a:tr h="278567">
-                <a:tc gridSpan="2">
-                  <a:txBody>
-                    <a:bodyPr/>
-                    <a:lstStyle/>
-                    <a:p>
-                      <a:pPr algn="ctr"/>
-                      <a:r>
-                        <a:rPr lang="en-US" altLang="ko-Kore-KR" sz="1100" dirty="0">
-                          <a:solidFill>
-                            <a:schemeClr val="tx1"/>
-                          </a:solidFill>
-                        </a:rPr>
-                        <a:t>student</a:t>
-                      </a:r>
-                      <a:endParaRPr lang="ko-Kore-KR" altLang="en-US" sz="1100" dirty="0">
-                        <a:solidFill>
-                          <a:schemeClr val="tx1"/>
-                        </a:solidFill>
-                      </a:endParaRPr>
-                    </a:p>
-                  </a:txBody>
-                  <a:tcPr anchor="ctr">
-                    <a:lnL w="12700" cap="flat" cmpd="sng" algn="ctr">
-                      <a:solidFill>
-                        <a:schemeClr val="tx1"/>
-                      </a:solidFill>
-                      <a:prstDash val="solid"/>
-                      <a:round/>
-                      <a:headEnd type="none" w="med" len="med"/>
-                      <a:tailEnd type="none" w="med" len="med"/>
-                    </a:lnL>
-                    <a:lnR w="12700" cap="flat" cmpd="sng" algn="ctr">
-                      <a:solidFill>
-                        <a:schemeClr val="tx1"/>
-                      </a:solidFill>
-                      <a:prstDash val="solid"/>
-                      <a:round/>
-                      <a:headEnd type="none" w="med" len="med"/>
-                      <a:tailEnd type="none" w="med" len="med"/>
-                    </a:lnR>
-                    <a:lnT w="12700" cap="flat" cmpd="sng" algn="ctr">
-                      <a:solidFill>
-                        <a:schemeClr val="tx1"/>
-                      </a:solidFill>
-                      <a:prstDash val="solid"/>
-                      <a:round/>
-                      <a:headEnd type="none" w="med" len="med"/>
-                      <a:tailEnd type="none" w="med" len="med"/>
-                    </a:lnT>
-                    <a:lnB w="12700" cap="flat" cmpd="sng" algn="ctr">
-                      <a:solidFill>
-                        <a:schemeClr val="tx1"/>
-                      </a:solidFill>
-                      <a:prstDash val="solid"/>
-                      <a:round/>
-                      <a:headEnd type="none" w="med" len="med"/>
-                      <a:tailEnd type="none" w="med" len="med"/>
-                    </a:lnB>
-                    <a:noFill/>
-                  </a:tcPr>
-                </a:tc>
-                <a:tc hMerge="1">
-                  <a:txBody>
-                    <a:bodyPr/>
-                    <a:lstStyle/>
-                    <a:p>
-                      <a:endParaRPr lang="ko-Kore-KR" altLang="en-US" dirty="0"/>
-                    </a:p>
-                  </a:txBody>
-                  <a:tcPr>
-                    <a:lnL w="12700" cap="flat" cmpd="sng" algn="ctr">
-                      <a:solidFill>
-                        <a:schemeClr val="tx1"/>
-                      </a:solidFill>
-                      <a:prstDash val="solid"/>
-                      <a:round/>
-                      <a:headEnd type="none" w="med" len="med"/>
-                      <a:tailEnd type="none" w="med" len="med"/>
-                    </a:lnL>
-                    <a:lnR w="12700" cap="flat" cmpd="sng" algn="ctr">
-                      <a:solidFill>
-                        <a:schemeClr val="tx1"/>
-                      </a:solidFill>
-                      <a:prstDash val="solid"/>
-                      <a:round/>
-                      <a:headEnd type="none" w="med" len="med"/>
-                      <a:tailEnd type="none" w="med" len="med"/>
-                    </a:lnR>
-                    <a:lnT w="12700" cap="flat" cmpd="sng" algn="ctr">
-                      <a:solidFill>
-                        <a:schemeClr val="tx1"/>
-                      </a:solidFill>
-                      <a:prstDash val="solid"/>
-                      <a:round/>
-                      <a:headEnd type="none" w="med" len="med"/>
-                      <a:tailEnd type="none" w="med" len="med"/>
-                    </a:lnT>
-                    <a:lnB w="12700" cap="flat" cmpd="sng" algn="ctr">
-                      <a:solidFill>
-                        <a:schemeClr val="tx1"/>
-                      </a:solidFill>
-                      <a:prstDash val="solid"/>
-                      <a:round/>
-                      <a:headEnd type="none" w="med" len="med"/>
-                      <a:tailEnd type="none" w="med" len="med"/>
-                    </a:lnB>
-                    <a:noFill/>
-                  </a:tcPr>
-                </a:tc>
-                <a:extLst>
-                  <a:ext uri="{0D108BD9-81ED-4DB2-BD59-A6C34878D82A}">
-                    <a16:rowId xmlns:a16="http://schemas.microsoft.com/office/drawing/2014/main" val="2324697099"/>
-                  </a:ext>
-                </a:extLst>
-              </a:tr>
-              <a:tr h="278567">
-                <a:tc>
-                  <a:txBody>
-                    <a:bodyPr/>
-                    <a:lstStyle/>
-                    <a:p>
-                      <a:pPr algn="ctr"/>
-                      <a:r>
-                        <a:rPr lang="en-US" altLang="ko-Kore-KR" sz="1100" dirty="0">
-                          <a:solidFill>
-                            <a:srgbClr val="FF0000"/>
-                          </a:solidFill>
-                        </a:rPr>
-                        <a:t>id</a:t>
-                      </a:r>
-                      <a:endParaRPr lang="ko-Kore-KR" altLang="en-US" sz="1100" dirty="0">
-                        <a:solidFill>
-                          <a:srgbClr val="FF0000"/>
-                        </a:solidFill>
-                      </a:endParaRPr>
-                    </a:p>
-                  </a:txBody>
-                  <a:tcPr anchor="ctr">
-                    <a:lnL w="12700" cap="flat" cmpd="sng" algn="ctr">
-                      <a:solidFill>
-                        <a:schemeClr val="tx1"/>
-                      </a:solidFill>
-                      <a:prstDash val="solid"/>
-                      <a:round/>
-                      <a:headEnd type="none" w="med" len="med"/>
-                      <a:tailEnd type="none" w="med" len="med"/>
-                    </a:lnL>
-                    <a:lnR w="12700" cap="flat" cmpd="sng" algn="ctr">
-                      <a:solidFill>
-                        <a:schemeClr val="tx1"/>
-                      </a:solidFill>
-                      <a:prstDash val="solid"/>
-                      <a:round/>
-                      <a:headEnd type="none" w="med" len="med"/>
-                      <a:tailEnd type="none" w="med" len="med"/>
-                    </a:lnR>
-                    <a:lnT w="12700" cap="flat" cmpd="sng" algn="ctr">
-                      <a:solidFill>
-                        <a:schemeClr val="tx1"/>
-                      </a:solidFill>
-                      <a:prstDash val="solid"/>
-                      <a:round/>
-                      <a:headEnd type="none" w="med" len="med"/>
-                      <a:tailEnd type="none" w="med" len="med"/>
-                    </a:lnT>
-                    <a:lnB w="12700" cap="flat" cmpd="sng" algn="ctr">
-                      <a:solidFill>
-                        <a:schemeClr val="tx1"/>
-                      </a:solidFill>
-                      <a:prstDash val="solid"/>
-                      <a:round/>
-                      <a:headEnd type="none" w="med" len="med"/>
-                      <a:tailEnd type="none" w="med" len="med"/>
-                    </a:lnB>
-                    <a:noFill/>
-                  </a:tcPr>
-                </a:tc>
-                <a:tc>
-                  <a:txBody>
-                    <a:bodyPr/>
-                    <a:lstStyle/>
-                    <a:p>
-                      <a:pPr algn="ctr"/>
-                      <a:r>
-                        <a:rPr lang="en-US" altLang="ko-Kore-KR" sz="1100" dirty="0">
-                          <a:solidFill>
-                            <a:srgbClr val="FF0000"/>
-                          </a:solidFill>
-                        </a:rPr>
-                        <a:t>Long(PK, FK)</a:t>
-                      </a:r>
-                      <a:endParaRPr lang="ko-Kore-KR" altLang="en-US" sz="1100" dirty="0">
-                        <a:solidFill>
-                          <a:srgbClr val="FF0000"/>
-                        </a:solidFill>
-                      </a:endParaRPr>
-                    </a:p>
-                  </a:txBody>
-                  <a:tcPr anchor="ctr">
-                    <a:lnL w="12700" cap="flat" cmpd="sng" algn="ctr">
-                      <a:solidFill>
-                        <a:schemeClr val="tx1"/>
-                      </a:solidFill>
-                      <a:prstDash val="solid"/>
-                      <a:round/>
-                      <a:headEnd type="none" w="med" len="med"/>
-                      <a:tailEnd type="none" w="med" len="med"/>
-                    </a:lnL>
-                    <a:lnR w="12700" cap="flat" cmpd="sng" algn="ctr">
-                      <a:solidFill>
-                        <a:schemeClr val="tx1"/>
-                      </a:solidFill>
-                      <a:prstDash val="solid"/>
-                      <a:round/>
-                      <a:headEnd type="none" w="med" len="med"/>
-                      <a:tailEnd type="none" w="med" len="med"/>
-                    </a:lnR>
-                    <a:lnT w="12700" cap="flat" cmpd="sng" algn="ctr">
-                      <a:solidFill>
-                        <a:schemeClr val="tx1"/>
-                      </a:solidFill>
-                      <a:prstDash val="solid"/>
-                      <a:round/>
-                      <a:headEnd type="none" w="med" len="med"/>
-                      <a:tailEnd type="none" w="med" len="med"/>
-                    </a:lnT>
-                    <a:lnB w="12700" cap="flat" cmpd="sng" algn="ctr">
-                      <a:solidFill>
-                        <a:schemeClr val="tx1"/>
-                      </a:solidFill>
-                      <a:prstDash val="solid"/>
-                      <a:round/>
-                      <a:headEnd type="none" w="med" len="med"/>
-                      <a:tailEnd type="none" w="med" len="med"/>
-                    </a:lnB>
-                    <a:noFill/>
-                  </a:tcPr>
-                </a:tc>
-                <a:extLst>
-                  <a:ext uri="{0D108BD9-81ED-4DB2-BD59-A6C34878D82A}">
-                    <a16:rowId xmlns:a16="http://schemas.microsoft.com/office/drawing/2014/main" val="2617678065"/>
-                  </a:ext>
-                </a:extLst>
-              </a:tr>
-              <a:tr h="278567">
-                <a:tc>
-                  <a:txBody>
-                    <a:bodyPr/>
-                    <a:lstStyle/>
-                    <a:p>
-                      <a:pPr algn="ctr"/>
-                      <a:r>
-                        <a:rPr lang="en-US" altLang="ko-Kore-KR" sz="1100" dirty="0"/>
-                        <a:t>major</a:t>
-                      </a:r>
-                      <a:endParaRPr lang="ko-Kore-KR" altLang="en-US" sz="1100" dirty="0"/>
-                    </a:p>
-                  </a:txBody>
-                  <a:tcPr anchor="ctr">
-                    <a:lnL w="12700" cap="flat" cmpd="sng" algn="ctr">
-                      <a:solidFill>
-                        <a:schemeClr val="tx1"/>
-                      </a:solidFill>
-                      <a:prstDash val="solid"/>
-                      <a:round/>
-                      <a:headEnd type="none" w="med" len="med"/>
-                      <a:tailEnd type="none" w="med" len="med"/>
-                    </a:lnL>
-                    <a:lnR w="12700" cap="flat" cmpd="sng" algn="ctr">
-                      <a:solidFill>
-                        <a:schemeClr val="tx1"/>
-                      </a:solidFill>
-                      <a:prstDash val="solid"/>
-                      <a:round/>
-                      <a:headEnd type="none" w="med" len="med"/>
-                      <a:tailEnd type="none" w="med" len="med"/>
-                    </a:lnR>
-                    <a:lnT w="12700" cap="flat" cmpd="sng" algn="ctr">
-                      <a:solidFill>
-                        <a:schemeClr val="tx1"/>
-                      </a:solidFill>
-                      <a:prstDash val="solid"/>
-                      <a:round/>
-                      <a:headEnd type="none" w="med" len="med"/>
-                      <a:tailEnd type="none" w="med" len="med"/>
-                    </a:lnT>
-                    <a:lnB w="12700" cap="flat" cmpd="sng" algn="ctr">
-                      <a:solidFill>
-                        <a:schemeClr val="tx1"/>
-                      </a:solidFill>
-                      <a:prstDash val="solid"/>
-                      <a:round/>
-                      <a:headEnd type="none" w="med" len="med"/>
-                      <a:tailEnd type="none" w="med" len="med"/>
-                    </a:lnB>
-                    <a:noFill/>
-                  </a:tcPr>
-                </a:tc>
-                <a:tc>
-                  <a:txBody>
-                    <a:bodyPr/>
-                    <a:lstStyle/>
-                    <a:p>
-                      <a:pPr algn="ctr"/>
-                      <a:r>
-                        <a:rPr lang="en-US" altLang="ko-Kore-KR" sz="1100" dirty="0">
-                          <a:solidFill>
-                            <a:schemeClr val="tx1"/>
-                          </a:solidFill>
-                        </a:rPr>
-                        <a:t>String</a:t>
-                      </a:r>
-                      <a:endParaRPr lang="ko-Kore-KR" altLang="en-US" sz="1100" dirty="0">
-                        <a:solidFill>
-                          <a:schemeClr val="tx1"/>
-                        </a:solidFill>
-                      </a:endParaRPr>
-                    </a:p>
-                  </a:txBody>
-                  <a:tcPr anchor="ctr">
-                    <a:lnL w="12700" cap="flat" cmpd="sng" algn="ctr">
-                      <a:solidFill>
-                        <a:schemeClr val="tx1"/>
-                      </a:solidFill>
-                      <a:prstDash val="solid"/>
-                      <a:round/>
-                      <a:headEnd type="none" w="med" len="med"/>
-                      <a:tailEnd type="none" w="med" len="med"/>
-                    </a:lnL>
-                    <a:lnR w="12700" cap="flat" cmpd="sng" algn="ctr">
-                      <a:solidFill>
-                        <a:schemeClr val="tx1"/>
-                      </a:solidFill>
-                      <a:prstDash val="solid"/>
-                      <a:round/>
-                      <a:headEnd type="none" w="med" len="med"/>
-                      <a:tailEnd type="none" w="med" len="med"/>
-                    </a:lnR>
-                    <a:lnT w="12700" cap="flat" cmpd="sng" algn="ctr">
-                      <a:solidFill>
-                        <a:schemeClr val="tx1"/>
-                      </a:solidFill>
-                      <a:prstDash val="solid"/>
-                      <a:round/>
-                      <a:headEnd type="none" w="med" len="med"/>
-                      <a:tailEnd type="none" w="med" len="med"/>
-                    </a:lnT>
-                    <a:lnB w="12700" cap="flat" cmpd="sng" algn="ctr">
-                      <a:solidFill>
-                        <a:schemeClr val="tx1"/>
-                      </a:solidFill>
-                      <a:prstDash val="solid"/>
-                      <a:round/>
-                      <a:headEnd type="none" w="med" len="med"/>
-                      <a:tailEnd type="none" w="med" len="med"/>
-                    </a:lnB>
-                    <a:noFill/>
-                  </a:tcPr>
-                </a:tc>
-                <a:extLst>
-                  <a:ext uri="{0D108BD9-81ED-4DB2-BD59-A6C34878D82A}">
-                    <a16:rowId xmlns:a16="http://schemas.microsoft.com/office/drawing/2014/main" val="2165985759"/>
-                  </a:ext>
-                </a:extLst>
-              </a:tr>
-              <a:tr h="278567">
-                <a:tc>
-                  <a:txBody>
-                    <a:bodyPr/>
-                    <a:lstStyle/>
-                    <a:p>
-                      <a:pPr algn="ctr"/>
-                      <a:r>
-                        <a:rPr lang="en-US" altLang="ko-Kore-KR" sz="1100" dirty="0">
-                          <a:solidFill>
-                            <a:schemeClr val="tx1"/>
-                          </a:solidFill>
-                        </a:rPr>
-                        <a:t>email</a:t>
-                      </a:r>
-                      <a:endParaRPr lang="ko-Kore-KR" altLang="en-US" sz="1100" dirty="0">
-                        <a:solidFill>
-                          <a:schemeClr val="tx1"/>
-                        </a:solidFill>
-                      </a:endParaRPr>
-                    </a:p>
-                  </a:txBody>
-                  <a:tcPr anchor="ctr">
-                    <a:lnL w="12700" cap="flat" cmpd="sng" algn="ctr">
-                      <a:solidFill>
-                        <a:schemeClr val="tx1"/>
-                      </a:solidFill>
-                      <a:prstDash val="solid"/>
-                      <a:round/>
-                      <a:headEnd type="none" w="med" len="med"/>
-                      <a:tailEnd type="none" w="med" len="med"/>
-                    </a:lnL>
-                    <a:lnR w="12700" cap="flat" cmpd="sng" algn="ctr">
-                      <a:solidFill>
-                        <a:schemeClr val="tx1"/>
-                      </a:solidFill>
-                      <a:prstDash val="solid"/>
-                      <a:round/>
-                      <a:headEnd type="none" w="med" len="med"/>
-                      <a:tailEnd type="none" w="med" len="med"/>
-                    </a:lnR>
-                    <a:lnT w="12700" cap="flat" cmpd="sng" algn="ctr">
-                      <a:solidFill>
-                        <a:schemeClr val="tx1"/>
-                      </a:solidFill>
-                      <a:prstDash val="solid"/>
-                      <a:round/>
-                      <a:headEnd type="none" w="med" len="med"/>
-                      <a:tailEnd type="none" w="med" len="med"/>
-                    </a:lnT>
-                    <a:lnB w="12700" cap="flat" cmpd="sng" algn="ctr">
-                      <a:solidFill>
-                        <a:schemeClr val="tx1"/>
-                      </a:solidFill>
-                      <a:prstDash val="solid"/>
-                      <a:round/>
-                      <a:headEnd type="none" w="med" len="med"/>
-                      <a:tailEnd type="none" w="med" len="med"/>
-                    </a:lnB>
-                    <a:noFill/>
-                  </a:tcPr>
-                </a:tc>
-                <a:tc>
-                  <a:txBody>
-                    <a:bodyPr/>
-                    <a:lstStyle/>
-                    <a:p>
-                      <a:pPr algn="ctr"/>
-                      <a:r>
-                        <a:rPr lang="en-US" altLang="ko-Kore-KR" sz="1100" dirty="0">
-                          <a:solidFill>
-                            <a:schemeClr val="tx1"/>
-                          </a:solidFill>
-                        </a:rPr>
-                        <a:t>String</a:t>
-                      </a:r>
-                      <a:endParaRPr lang="ko-Kore-KR" altLang="en-US" sz="1100" dirty="0">
-                        <a:solidFill>
-                          <a:schemeClr val="tx1"/>
-                        </a:solidFill>
-                      </a:endParaRPr>
-                    </a:p>
-                  </a:txBody>
-                  <a:tcPr anchor="ctr">
-                    <a:lnL w="12700" cap="flat" cmpd="sng" algn="ctr">
-                      <a:solidFill>
-                        <a:schemeClr val="tx1"/>
-                      </a:solidFill>
-                      <a:prstDash val="solid"/>
-                      <a:round/>
-                      <a:headEnd type="none" w="med" len="med"/>
-                      <a:tailEnd type="none" w="med" len="med"/>
-                    </a:lnL>
-                    <a:lnR w="12700" cap="flat" cmpd="sng" algn="ctr">
-                      <a:solidFill>
-                        <a:schemeClr val="tx1"/>
-                      </a:solidFill>
-                      <a:prstDash val="solid"/>
-                      <a:round/>
-                      <a:headEnd type="none" w="med" len="med"/>
-                      <a:tailEnd type="none" w="med" len="med"/>
-                    </a:lnR>
-                    <a:lnT w="12700" cap="flat" cmpd="sng" algn="ctr">
-                      <a:solidFill>
-                        <a:schemeClr val="tx1"/>
-                      </a:solidFill>
-                      <a:prstDash val="solid"/>
-                      <a:round/>
-                      <a:headEnd type="none" w="med" len="med"/>
-                      <a:tailEnd type="none" w="med" len="med"/>
-                    </a:lnT>
-                    <a:lnB w="12700" cap="flat" cmpd="sng" algn="ctr">
-                      <a:solidFill>
-                        <a:schemeClr val="tx1"/>
-                      </a:solidFill>
-                      <a:prstDash val="solid"/>
-                      <a:round/>
-                      <a:headEnd type="none" w="med" len="med"/>
-                      <a:tailEnd type="none" w="med" len="med"/>
-                    </a:lnB>
-                    <a:noFill/>
-                  </a:tcPr>
-                </a:tc>
-                <a:extLst>
-                  <a:ext uri="{0D108BD9-81ED-4DB2-BD59-A6C34878D82A}">
-                    <a16:rowId xmlns:a16="http://schemas.microsoft.com/office/drawing/2014/main" val="3593532180"/>
-                  </a:ext>
-                </a:extLst>
-              </a:tr>
-              <a:tr h="278567">
-                <a:tc>
-                  <a:txBody>
-                    <a:bodyPr/>
-                    <a:lstStyle/>
-                    <a:p>
-                      <a:pPr algn="ctr"/>
-                      <a:r>
-                        <a:rPr lang="en-US" altLang="ko-Kore-KR" sz="1100" dirty="0">
-                          <a:solidFill>
-                            <a:schemeClr val="tx1"/>
-                          </a:solidFill>
-                        </a:rPr>
-                        <a:t>nickname</a:t>
-                      </a:r>
-                      <a:endParaRPr lang="ko-Kore-KR" altLang="en-US" sz="1100" dirty="0">
-                        <a:solidFill>
-                          <a:schemeClr val="tx1"/>
-                        </a:solidFill>
-                      </a:endParaRPr>
-                    </a:p>
-                  </a:txBody>
-                  <a:tcPr anchor="ctr">
-                    <a:lnL w="12700" cap="flat" cmpd="sng" algn="ctr">
-                      <a:solidFill>
-                        <a:schemeClr val="tx1"/>
-                      </a:solidFill>
-                      <a:prstDash val="solid"/>
-                      <a:round/>
-                      <a:headEnd type="none" w="med" len="med"/>
-                      <a:tailEnd type="none" w="med" len="med"/>
-                    </a:lnL>
-                    <a:lnR w="12700" cap="flat" cmpd="sng" algn="ctr">
-                      <a:solidFill>
-                        <a:schemeClr val="tx1"/>
-                      </a:solidFill>
-                      <a:prstDash val="solid"/>
-                      <a:round/>
-                      <a:headEnd type="none" w="med" len="med"/>
-                      <a:tailEnd type="none" w="med" len="med"/>
-                    </a:lnR>
-                    <a:lnT w="12700" cap="flat" cmpd="sng" algn="ctr">
-                      <a:solidFill>
-                        <a:schemeClr val="tx1"/>
-                      </a:solidFill>
-                      <a:prstDash val="solid"/>
-                      <a:round/>
-                      <a:headEnd type="none" w="med" len="med"/>
-                      <a:tailEnd type="none" w="med" len="med"/>
-                    </a:lnT>
-                    <a:lnB w="12700" cap="flat" cmpd="sng" algn="ctr">
-                      <a:solidFill>
-                        <a:schemeClr val="tx1"/>
-                      </a:solidFill>
-                      <a:prstDash val="solid"/>
-                      <a:round/>
-                      <a:headEnd type="none" w="med" len="med"/>
-                      <a:tailEnd type="none" w="med" len="med"/>
-                    </a:lnB>
-                    <a:noFill/>
-                  </a:tcPr>
-                </a:tc>
-                <a:tc>
-                  <a:txBody>
-                    <a:bodyPr/>
-                    <a:lstStyle/>
-                    <a:p>
-                      <a:pPr algn="ctr"/>
-                      <a:r>
-                        <a:rPr lang="en-US" altLang="ko-Kore-KR" sz="1100" dirty="0">
-                          <a:solidFill>
-                            <a:schemeClr val="tx1"/>
-                          </a:solidFill>
-                        </a:rPr>
-                        <a:t>String</a:t>
-                      </a:r>
-                      <a:endParaRPr lang="ko-Kore-KR" altLang="en-US" sz="1100" dirty="0">
-                        <a:solidFill>
-                          <a:schemeClr val="tx1"/>
-                        </a:solidFill>
-                      </a:endParaRPr>
-                    </a:p>
-                  </a:txBody>
-                  <a:tcPr anchor="ctr">
-                    <a:lnL w="12700" cap="flat" cmpd="sng" algn="ctr">
-                      <a:solidFill>
-                        <a:schemeClr val="tx1"/>
-                      </a:solidFill>
-                      <a:prstDash val="solid"/>
-                      <a:round/>
-                      <a:headEnd type="none" w="med" len="med"/>
-                      <a:tailEnd type="none" w="med" len="med"/>
-                    </a:lnL>
-                    <a:lnR w="12700" cap="flat" cmpd="sng" algn="ctr">
-                      <a:solidFill>
-                        <a:schemeClr val="tx1"/>
-                      </a:solidFill>
-                      <a:prstDash val="solid"/>
-                      <a:round/>
-                      <a:headEnd type="none" w="med" len="med"/>
-                      <a:tailEnd type="none" w="med" len="med"/>
-                    </a:lnR>
-                    <a:lnT w="12700" cap="flat" cmpd="sng" algn="ctr">
-                      <a:solidFill>
-                        <a:schemeClr val="tx1"/>
-                      </a:solidFill>
-                      <a:prstDash val="solid"/>
-                      <a:round/>
-                      <a:headEnd type="none" w="med" len="med"/>
-                      <a:tailEnd type="none" w="med" len="med"/>
-                    </a:lnT>
-                    <a:lnB w="12700" cap="flat" cmpd="sng" algn="ctr">
-                      <a:solidFill>
-                        <a:schemeClr val="tx1"/>
-                      </a:solidFill>
-                      <a:prstDash val="solid"/>
-                      <a:round/>
-                      <a:headEnd type="none" w="med" len="med"/>
-                      <a:tailEnd type="none" w="med" len="med"/>
-                    </a:lnB>
-                    <a:noFill/>
-                  </a:tcPr>
-                </a:tc>
-                <a:extLst>
-                  <a:ext uri="{0D108BD9-81ED-4DB2-BD59-A6C34878D82A}">
-                    <a16:rowId xmlns:a16="http://schemas.microsoft.com/office/drawing/2014/main" val="4186029493"/>
-                  </a:ext>
-                </a:extLst>
-              </a:tr>
-              <a:tr h="278567">
-                <a:tc>
-                  <a:txBody>
-                    <a:bodyPr/>
-                    <a:lstStyle/>
-                    <a:p>
-                      <a:pPr algn="ctr"/>
-                      <a:r>
-                        <a:rPr lang="en-US" altLang="ko-Kore-KR" sz="1100" dirty="0" err="1"/>
-                        <a:t>sexType</a:t>
-                      </a:r>
-                      <a:endParaRPr lang="ko-Kore-KR" altLang="en-US" sz="1100" dirty="0"/>
-                    </a:p>
-                  </a:txBody>
-                  <a:tcPr anchor="ctr">
-                    <a:lnL w="12700" cap="flat" cmpd="sng" algn="ctr">
-                      <a:solidFill>
-                        <a:schemeClr val="tx1"/>
-                      </a:solidFill>
-                      <a:prstDash val="solid"/>
-                      <a:round/>
-                      <a:headEnd type="none" w="med" len="med"/>
-                      <a:tailEnd type="none" w="med" len="med"/>
-                    </a:lnL>
-                    <a:lnR w="12700" cap="flat" cmpd="sng" algn="ctr">
-                      <a:solidFill>
-                        <a:schemeClr val="tx1"/>
-                      </a:solidFill>
-                      <a:prstDash val="solid"/>
-                      <a:round/>
-                      <a:headEnd type="none" w="med" len="med"/>
-                      <a:tailEnd type="none" w="med" len="med"/>
-                    </a:lnR>
-                    <a:lnT w="12700" cap="flat" cmpd="sng" algn="ctr">
-                      <a:solidFill>
-                        <a:schemeClr val="tx1"/>
-                      </a:solidFill>
-                      <a:prstDash val="solid"/>
-                      <a:round/>
-                      <a:headEnd type="none" w="med" len="med"/>
-                      <a:tailEnd type="none" w="med" len="med"/>
-                    </a:lnT>
-                    <a:lnB w="12700" cap="flat" cmpd="sng" algn="ctr">
-                      <a:solidFill>
-                        <a:schemeClr val="tx1"/>
-                      </a:solidFill>
-                      <a:prstDash val="solid"/>
-                      <a:round/>
-                      <a:headEnd type="none" w="med" len="med"/>
-                      <a:tailEnd type="none" w="med" len="med"/>
-                    </a:lnB>
-                    <a:noFill/>
-                  </a:tcPr>
-                </a:tc>
-                <a:tc>
-                  <a:txBody>
-                    <a:bodyPr/>
-                    <a:lstStyle/>
-                    <a:p>
-                      <a:pPr algn="ctr"/>
-                      <a:r>
-                        <a:rPr lang="en-US" altLang="ko-Kore-KR" sz="1100" dirty="0">
-                          <a:solidFill>
-                            <a:schemeClr val="tx1"/>
-                          </a:solidFill>
-                        </a:rPr>
-                        <a:t>String(Enum)</a:t>
-                      </a:r>
-                      <a:endParaRPr lang="ko-Kore-KR" altLang="en-US" sz="1100" dirty="0">
-                        <a:solidFill>
-                          <a:schemeClr val="tx1"/>
-                        </a:solidFill>
-                      </a:endParaRPr>
-                    </a:p>
-                  </a:txBody>
-                  <a:tcPr anchor="ctr">
-                    <a:lnL w="12700" cap="flat" cmpd="sng" algn="ctr">
-                      <a:solidFill>
-                        <a:schemeClr val="tx1"/>
-                      </a:solidFill>
-                      <a:prstDash val="solid"/>
-                      <a:round/>
-                      <a:headEnd type="none" w="med" len="med"/>
-                      <a:tailEnd type="none" w="med" len="med"/>
-                    </a:lnL>
-                    <a:lnR w="12700" cap="flat" cmpd="sng" algn="ctr">
-                      <a:solidFill>
-                        <a:schemeClr val="tx1"/>
-                      </a:solidFill>
-                      <a:prstDash val="solid"/>
-                      <a:round/>
-                      <a:headEnd type="none" w="med" len="med"/>
-                      <a:tailEnd type="none" w="med" len="med"/>
-                    </a:lnR>
-                    <a:lnT w="12700" cap="flat" cmpd="sng" algn="ctr">
-                      <a:solidFill>
-                        <a:schemeClr val="tx1"/>
-                      </a:solidFill>
-                      <a:prstDash val="solid"/>
-                      <a:round/>
-                      <a:headEnd type="none" w="med" len="med"/>
-                      <a:tailEnd type="none" w="med" len="med"/>
-                    </a:lnT>
-                    <a:lnB w="12700" cap="flat" cmpd="sng" algn="ctr">
-                      <a:solidFill>
-                        <a:schemeClr val="tx1"/>
-                      </a:solidFill>
-                      <a:prstDash val="solid"/>
-                      <a:round/>
-                      <a:headEnd type="none" w="med" len="med"/>
-                      <a:tailEnd type="none" w="med" len="med"/>
-                    </a:lnB>
-                    <a:noFill/>
-                  </a:tcPr>
-                </a:tc>
-                <a:extLst>
-                  <a:ext uri="{0D108BD9-81ED-4DB2-BD59-A6C34878D82A}">
-                    <a16:rowId xmlns:a16="http://schemas.microsoft.com/office/drawing/2014/main" val="1990906237"/>
-                  </a:ext>
-                </a:extLst>
-              </a:tr>
-            </a:tbl>
-          </a:graphicData>
-        </a:graphic>
-      </p:graphicFrame>
-      <p:cxnSp>
-        <p:nvCxnSpPr>
-          <p:cNvPr id="12" name="직선 화살표 연결선 11">
-            <a:extLst>
-              <a:ext uri="{FF2B5EF4-FFF2-40B4-BE49-F238E27FC236}">
-                <a16:creationId xmlns:a16="http://schemas.microsoft.com/office/drawing/2014/main" id="{E3BF8328-D5A6-43C6-CC21-3E2A076F7CB7}"/>
-              </a:ext>
-            </a:extLst>
-          </p:cNvPr>
-          <p:cNvCxnSpPr>
-            <a:cxnSpLocks/>
-            <a:stCxn id="4" idx="2"/>
-            <a:endCxn id="13" idx="0"/>
-          </p:cNvCxnSpPr>
-          <p:nvPr/>
-        </p:nvCxnSpPr>
-        <p:spPr>
-          <a:xfrm>
-            <a:off x="3061879" y="2461064"/>
-            <a:ext cx="637896" cy="1315135"/>
-          </a:xfrm>
-          <a:prstGeom prst="straightConnector1">
-            <a:avLst/>
-          </a:prstGeom>
-          <a:ln w="12700">
-            <a:solidFill>
-              <a:schemeClr val="tx1"/>
-            </a:solidFill>
-            <a:tailEnd type="triangle"/>
-          </a:ln>
-        </p:spPr>
-        <p:style>
-          <a:lnRef idx="1">
-            <a:schemeClr val="dk1"/>
-          </a:lnRef>
-          <a:fillRef idx="0">
-            <a:schemeClr val="dk1"/>
-          </a:fillRef>
-          <a:effectRef idx="0">
-            <a:schemeClr val="dk1"/>
-          </a:effectRef>
-          <a:fontRef idx="minor">
-            <a:schemeClr val="tx1"/>
-          </a:fontRef>
-        </p:style>
-      </p:cxnSp>
       <p:graphicFrame>
         <p:nvGraphicFramePr>
           <p:cNvPr id="16" name="표 4">
@@ -6404,13 +6017,13 @@
           <p:nvPr>
             <p:extLst>
               <p:ext uri="{D42A27DB-BD31-4B8C-83A1-F6EECF244321}">
-                <p14:modId xmlns:p14="http://schemas.microsoft.com/office/powerpoint/2010/main" val="1654838104"/>
+                <p14:modId xmlns:p14="http://schemas.microsoft.com/office/powerpoint/2010/main" val="2430139641"/>
               </p:ext>
             </p:extLst>
           </p:nvPr>
         </p:nvGraphicFramePr>
         <p:xfrm>
-          <a:off x="4624451" y="90395"/>
+          <a:off x="4777352" y="90395"/>
           <a:ext cx="2306691" cy="3725337"/>
         </p:xfrm>
         <a:graphic>
@@ -7868,13 +7481,13 @@
           <p:nvPr>
             <p:extLst>
               <p:ext uri="{D42A27DB-BD31-4B8C-83A1-F6EECF244321}">
-                <p14:modId xmlns:p14="http://schemas.microsoft.com/office/powerpoint/2010/main" val="893273243"/>
+                <p14:modId xmlns:p14="http://schemas.microsoft.com/office/powerpoint/2010/main" val="487950207"/>
               </p:ext>
             </p:extLst>
           </p:nvPr>
         </p:nvGraphicFramePr>
         <p:xfrm>
-          <a:off x="7109481" y="157047"/>
+          <a:off x="7376913" y="90395"/>
           <a:ext cx="2091423" cy="2596221"/>
         </p:xfrm>
         <a:graphic>
@@ -9026,13 +8639,13 @@
           <p:nvPr>
             <p:extLst>
               <p:ext uri="{D42A27DB-BD31-4B8C-83A1-F6EECF244321}">
-                <p14:modId xmlns:p14="http://schemas.microsoft.com/office/powerpoint/2010/main" val="4026279368"/>
+                <p14:modId xmlns:p14="http://schemas.microsoft.com/office/powerpoint/2010/main" val="1663446565"/>
               </p:ext>
             </p:extLst>
           </p:nvPr>
         </p:nvGraphicFramePr>
         <p:xfrm>
-          <a:off x="9419682" y="163102"/>
+          <a:off x="9617987" y="79378"/>
           <a:ext cx="1964901" cy="1605144"/>
         </p:xfrm>
         <a:graphic>
@@ -9821,13 +9434,13 @@
           <p:nvPr>
             <p:extLst>
               <p:ext uri="{D42A27DB-BD31-4B8C-83A1-F6EECF244321}">
-                <p14:modId xmlns:p14="http://schemas.microsoft.com/office/powerpoint/2010/main" val="2347953675"/>
+                <p14:modId xmlns:p14="http://schemas.microsoft.com/office/powerpoint/2010/main" val="761977956"/>
               </p:ext>
             </p:extLst>
           </p:nvPr>
         </p:nvGraphicFramePr>
         <p:xfrm>
-          <a:off x="7131594" y="2897915"/>
+          <a:off x="4777352" y="3966184"/>
           <a:ext cx="1807019" cy="1408460"/>
         </p:xfrm>
         <a:graphic>
@@ -10503,13 +10116,13 @@
           <p:nvPr>
             <p:extLst>
               <p:ext uri="{D42A27DB-BD31-4B8C-83A1-F6EECF244321}">
-                <p14:modId xmlns:p14="http://schemas.microsoft.com/office/powerpoint/2010/main" val="2921240958"/>
+                <p14:modId xmlns:p14="http://schemas.microsoft.com/office/powerpoint/2010/main" val="2091147956"/>
               </p:ext>
             </p:extLst>
           </p:nvPr>
         </p:nvGraphicFramePr>
         <p:xfrm>
-          <a:off x="9103229" y="2897915"/>
+          <a:off x="4777352" y="5449540"/>
           <a:ext cx="2067950" cy="1408460"/>
         </p:xfrm>
         <a:graphic>
@@ -11201,13 +10814,13 @@
           <p:nvPr>
             <p:extLst>
               <p:ext uri="{D42A27DB-BD31-4B8C-83A1-F6EECF244321}">
-                <p14:modId xmlns:p14="http://schemas.microsoft.com/office/powerpoint/2010/main" val="3112240355"/>
+                <p14:modId xmlns:p14="http://schemas.microsoft.com/office/powerpoint/2010/main" val="1103391130"/>
               </p:ext>
             </p:extLst>
           </p:nvPr>
         </p:nvGraphicFramePr>
         <p:xfrm>
-          <a:off x="7141890" y="4442767"/>
+          <a:off x="7376913" y="4509418"/>
           <a:ext cx="2026603" cy="2258186"/>
         </p:xfrm>
         <a:graphic>
@@ -12141,13 +11754,13 @@
           <p:nvPr>
             <p:extLst>
               <p:ext uri="{D42A27DB-BD31-4B8C-83A1-F6EECF244321}">
-                <p14:modId xmlns:p14="http://schemas.microsoft.com/office/powerpoint/2010/main" val="3025995603"/>
+                <p14:modId xmlns:p14="http://schemas.microsoft.com/office/powerpoint/2010/main" val="1738929573"/>
               </p:ext>
             </p:extLst>
           </p:nvPr>
         </p:nvGraphicFramePr>
         <p:xfrm>
-          <a:off x="33983" y="932010"/>
+          <a:off x="166184" y="965061"/>
           <a:ext cx="1666641" cy="777240"/>
         </p:xfrm>
         <a:graphic>
@@ -12565,13 +12178,13 @@
           <p:nvPr>
             <p:extLst>
               <p:ext uri="{D42A27DB-BD31-4B8C-83A1-F6EECF244321}">
-                <p14:modId xmlns:p14="http://schemas.microsoft.com/office/powerpoint/2010/main" val="3796728104"/>
+                <p14:modId xmlns:p14="http://schemas.microsoft.com/office/powerpoint/2010/main" val="3792774843"/>
               </p:ext>
             </p:extLst>
           </p:nvPr>
         </p:nvGraphicFramePr>
         <p:xfrm>
-          <a:off x="43654" y="1783730"/>
+          <a:off x="175855" y="1816781"/>
           <a:ext cx="1666640" cy="777240"/>
         </p:xfrm>
         <a:graphic>
@@ -12989,13 +12602,13 @@
           <p:nvPr>
             <p:extLst>
               <p:ext uri="{D42A27DB-BD31-4B8C-83A1-F6EECF244321}">
-                <p14:modId xmlns:p14="http://schemas.microsoft.com/office/powerpoint/2010/main" val="1284873696"/>
+                <p14:modId xmlns:p14="http://schemas.microsoft.com/office/powerpoint/2010/main" val="1142967584"/>
               </p:ext>
             </p:extLst>
           </p:nvPr>
         </p:nvGraphicFramePr>
         <p:xfrm>
-          <a:off x="38818" y="2624300"/>
+          <a:off x="171019" y="2657351"/>
           <a:ext cx="1656970" cy="777240"/>
         </p:xfrm>
         <a:graphic>
@@ -13413,13 +13026,13 @@
           <p:nvPr>
             <p:extLst>
               <p:ext uri="{D42A27DB-BD31-4B8C-83A1-F6EECF244321}">
-                <p14:modId xmlns:p14="http://schemas.microsoft.com/office/powerpoint/2010/main" val="3954074242"/>
+                <p14:modId xmlns:p14="http://schemas.microsoft.com/office/powerpoint/2010/main" val="3304066553"/>
               </p:ext>
             </p:extLst>
           </p:nvPr>
         </p:nvGraphicFramePr>
         <p:xfrm>
-          <a:off x="5123075" y="4037995"/>
+          <a:off x="7376913" y="2856187"/>
           <a:ext cx="1722805" cy="1483660"/>
         </p:xfrm>
         <a:graphic>
@@ -14080,6 +13693,60 @@
           </a:graphicData>
         </a:graphic>
       </p:graphicFrame>
+      <p:sp>
+        <p:nvSpPr>
+          <p:cNvPr id="6" name="모서리가 둥근 직사각형 5">
+            <a:extLst>
+              <a:ext uri="{FF2B5EF4-FFF2-40B4-BE49-F238E27FC236}">
+                <a16:creationId xmlns:a16="http://schemas.microsoft.com/office/drawing/2014/main" id="{F6FD5A2E-0C30-D79C-D04D-972F1AF02B13}"/>
+              </a:ext>
+            </a:extLst>
+          </p:cNvPr>
+          <p:cNvSpPr/>
+          <p:nvPr/>
+        </p:nvSpPr>
+        <p:spPr>
+          <a:xfrm>
+            <a:off x="33051" y="22034"/>
+            <a:ext cx="1947750" cy="3564545"/>
+          </a:xfrm>
+          <a:prstGeom prst="roundRect">
+            <a:avLst>
+              <a:gd name="adj" fmla="val 10445"/>
+            </a:avLst>
+          </a:prstGeom>
+          <a:noFill/>
+          <a:ln w="28575">
+            <a:solidFill>
+              <a:srgbClr val="00B050"/>
+            </a:solidFill>
+          </a:ln>
+        </p:spPr>
+        <p:style>
+          <a:lnRef idx="2">
+            <a:schemeClr val="accent1">
+              <a:shade val="50000"/>
+            </a:schemeClr>
+          </a:lnRef>
+          <a:fillRef idx="1">
+            <a:schemeClr val="accent1"/>
+          </a:fillRef>
+          <a:effectRef idx="0">
+            <a:schemeClr val="accent1"/>
+          </a:effectRef>
+          <a:fontRef idx="minor">
+            <a:schemeClr val="lt1"/>
+          </a:fontRef>
+        </p:style>
+        <p:txBody>
+          <a:bodyPr rtlCol="0" anchor="ctr"/>
+          <a:lstStyle/>
+          <a:p>
+            <a:pPr algn="ctr"/>
+            <a:endParaRPr kumimoji="1" lang="ko-Kore-KR" altLang="en-US"/>
+          </a:p>
+        </p:txBody>
+      </p:sp>
     </p:spTree>
     <p:extLst>
       <p:ext uri="{BB962C8B-B14F-4D97-AF65-F5344CB8AC3E}">

</xml_diff>